<commit_message>
Changes in the Timetable
</commit_message>
<xml_diff>
--- a/teaching/CS472/Timetable/OOD-V2.pptx
+++ b/teaching/CS472/Timetable/OOD-V2.pptx
@@ -8326,9 +8326,6 @@
           </a:bodyPr>
           <a:lstStyle/>
           <a:p>
-            <a:pPr marL="0" indent="0">
-              <a:buNone/>
-            </a:pPr>
             <a:r>
               <a:rPr lang="en-US" dirty="0"/>
               <a:t>Involves breaking down the system into smaller components or modules and designing their internal structure and interfaces.</a:t>
@@ -8404,9 +8401,6 @@
             </a:r>
           </a:p>
           <a:p>
-            <a:pPr marL="0" indent="0">
-              <a:buNone/>
-            </a:pPr>
             <a:r>
               <a:rPr lang="en-GB" b="1" i="0" dirty="0">
                 <a:solidFill>
@@ -8441,6 +8435,85 @@
   <p:clrMapOvr>
     <a:masterClrMapping/>
   </p:clrMapOvr>
+  <p:timing>
+    <p:tnLst>
+      <p:par>
+        <p:cTn id="1" dur="indefinite" restart="never" nodeType="tmRoot">
+          <p:childTnLst>
+            <p:seq concurrent="1" nextAc="seek">
+              <p:cTn id="2" dur="indefinite" nodeType="mainSeq">
+                <p:childTnLst>
+                  <p:par>
+                    <p:cTn id="3" fill="hold">
+                      <p:stCondLst>
+                        <p:cond delay="indefinite"/>
+                      </p:stCondLst>
+                      <p:childTnLst>
+                        <p:par>
+                          <p:cTn id="4" fill="hold">
+                            <p:stCondLst>
+                              <p:cond delay="0"/>
+                            </p:stCondLst>
+                            <p:childTnLst>
+                              <p:par>
+                                <p:cTn id="5" presetID="1" presetClass="entr" presetSubtype="0" fill="hold" nodeType="clickEffect">
+                                  <p:stCondLst>
+                                    <p:cond delay="0"/>
+                                  </p:stCondLst>
+                                  <p:childTnLst>
+                                    <p:set>
+                                      <p:cBhvr>
+                                        <p:cTn id="6" dur="1" fill="hold">
+                                          <p:stCondLst>
+                                            <p:cond delay="0"/>
+                                          </p:stCondLst>
+                                        </p:cTn>
+                                        <p:tgtEl>
+                                          <p:spTgt spid="3">
+                                            <p:txEl>
+                                              <p:pRg st="4" end="4"/>
+                                            </p:txEl>
+                                          </p:spTgt>
+                                        </p:tgtEl>
+                                        <p:attrNameLst>
+                                          <p:attrName>style.visibility</p:attrName>
+                                        </p:attrNameLst>
+                                      </p:cBhvr>
+                                      <p:to>
+                                        <p:strVal val="visible"/>
+                                      </p:to>
+                                    </p:set>
+                                  </p:childTnLst>
+                                </p:cTn>
+                              </p:par>
+                            </p:childTnLst>
+                          </p:cTn>
+                        </p:par>
+                      </p:childTnLst>
+                    </p:cTn>
+                  </p:par>
+                </p:childTnLst>
+              </p:cTn>
+              <p:prevCondLst>
+                <p:cond evt="onPrev" delay="0">
+                  <p:tgtEl>
+                    <p:sldTgt/>
+                  </p:tgtEl>
+                </p:cond>
+              </p:prevCondLst>
+              <p:nextCondLst>
+                <p:cond evt="onNext" delay="0">
+                  <p:tgtEl>
+                    <p:sldTgt/>
+                  </p:tgtEl>
+                </p:cond>
+              </p:nextCondLst>
+            </p:seq>
+          </p:childTnLst>
+        </p:cTn>
+      </p:par>
+    </p:tnLst>
+  </p:timing>
 </p:sld>
 </file>
 
@@ -11659,7 +11732,7 @@
         </p:nvSpPr>
         <p:spPr>
           <a:xfrm>
-            <a:off x="2432594" y="2762323"/>
+            <a:off x="2432594" y="2948067"/>
             <a:ext cx="7024915" cy="461665"/>
           </a:xfrm>
           <a:prstGeom prst="rect">
@@ -12814,8 +12887,8 @@
         </p:nvSpPr>
         <p:spPr>
           <a:xfrm>
-            <a:off x="1134065" y="5851250"/>
-            <a:ext cx="9667285" cy="707886"/>
+            <a:off x="1262357" y="5766146"/>
+            <a:ext cx="9667285" cy="969496"/>
           </a:xfrm>
           <a:prstGeom prst="rect">
             <a:avLst/>
@@ -12833,15 +12906,35 @@
           </a:bodyPr>
           <a:lstStyle/>
           <a:p>
-            <a:r>
-              <a:rPr lang="en-GB" sz="2000" b="0" i="0" dirty="0">
+            <a:pPr marL="342900" indent="-342900">
+              <a:buFont typeface="Arial" panose="020B0604020202020204" pitchFamily="34" charset="0"/>
+              <a:buChar char="•"/>
+            </a:pPr>
+            <a:r>
+              <a:rPr lang="en-GB" sz="1900" b="0" i="0" dirty="0">
                 <a:solidFill>
                   <a:srgbClr val="333333"/>
                 </a:solidFill>
                 <a:effectLst/>
                 <a:latin typeface="-apple-system"/>
               </a:rPr>
-              <a:t>In this case, when the request is made by the actor, the system enters a loop. Since the loop involves interacting repeatedly with the actor, the loop control mechanism is in the UI itself.</a:t>
+              <a:t>In this case, when the request is made by the actor, the system enters a loop. </a:t>
+            </a:r>
+          </a:p>
+          <a:p>
+            <a:pPr marL="342900" indent="-342900">
+              <a:buFont typeface="Arial" panose="020B0604020202020204" pitchFamily="34" charset="0"/>
+              <a:buChar char="•"/>
+            </a:pPr>
+            <a:r>
+              <a:rPr lang="en-GB" sz="1900" b="0" i="0" dirty="0">
+                <a:solidFill>
+                  <a:srgbClr val="333333"/>
+                </a:solidFill>
+                <a:effectLst/>
+                <a:latin typeface="-apple-system"/>
+              </a:rPr>
+              <a:t>Since the loop involves interacting repeatedly with the actor, the loop control mechanism is in the UI itself.</a:t>
             </a:r>
           </a:p>
         </p:txBody>
@@ -12980,7 +13073,7 @@
         <p:spPr>
           <a:xfrm>
             <a:off x="274322" y="2136338"/>
-            <a:ext cx="2588148" cy="2308324"/>
+            <a:ext cx="2588148" cy="2585323"/>
           </a:xfrm>
           <a:prstGeom prst="rect">
             <a:avLst/>
@@ -13071,6 +13164,16 @@
             <a:r>
               <a:rPr lang="en-BE" dirty="0"/>
               <a:t>Transaction</a:t>
+            </a:r>
+          </a:p>
+          <a:p>
+            <a:pPr marL="342900" indent="-342900">
+              <a:buFont typeface="+mj-lt"/>
+              <a:buAutoNum type="arabicPeriod"/>
+            </a:pPr>
+            <a:r>
+              <a:rPr lang="en-BE" dirty="0"/>
+              <a:t>UserInterface</a:t>
             </a:r>
           </a:p>
         </p:txBody>
@@ -18290,8 +18393,12 @@
           <a:lstStyle/>
           <a:p>
             <a:r>
+              <a:rPr lang="en-US" b="1" dirty="0"/>
+              <a:t>Conceptual design </a:t>
+            </a:r>
+            <a:r>
               <a:rPr lang="en-US" dirty="0"/>
-              <a:t>Conceptual design – sets out the stage</a:t>
+              <a:t>– sets out the stage</a:t>
             </a:r>
           </a:p>
           <a:p>
@@ -18331,8 +18438,12 @@
           </a:p>
           <a:p>
             <a:r>
+              <a:rPr lang="en-US" b="1" dirty="0"/>
+              <a:t>Technical Design </a:t>
+            </a:r>
+            <a:r>
               <a:rPr lang="en-US" dirty="0"/>
-              <a:t>Technical Design – dives deeper into specifics</a:t>
+              <a:t>– dives deeper into specifics</a:t>
             </a:r>
           </a:p>
           <a:p>
@@ -18504,7 +18615,7 @@
                             </p:stCondLst>
                             <p:childTnLst>
                               <p:par>
-                                <p:cTn id="5" presetID="2" presetClass="entr" presetSubtype="4" fill="hold" grpId="0" nodeType="clickEffect">
+                                <p:cTn id="5" presetID="1" presetClass="entr" presetSubtype="0" fill="hold" nodeType="clickEffect">
                                   <p:stCondLst>
                                     <p:cond delay="0"/>
                                   </p:stCondLst>
@@ -18512,6 +18623,179 @@
                                     <p:set>
                                       <p:cBhvr>
                                         <p:cTn id="6" dur="1" fill="hold">
+                                          <p:stCondLst>
+                                            <p:cond delay="0"/>
+                                          </p:stCondLst>
+                                        </p:cTn>
+                                        <p:tgtEl>
+                                          <p:spTgt spid="3">
+                                            <p:txEl>
+                                              <p:pRg st="6" end="6"/>
+                                            </p:txEl>
+                                          </p:spTgt>
+                                        </p:tgtEl>
+                                        <p:attrNameLst>
+                                          <p:attrName>style.visibility</p:attrName>
+                                        </p:attrNameLst>
+                                      </p:cBhvr>
+                                      <p:to>
+                                        <p:strVal val="visible"/>
+                                      </p:to>
+                                    </p:set>
+                                  </p:childTnLst>
+                                </p:cTn>
+                              </p:par>
+                              <p:par>
+                                <p:cTn id="7" presetID="1" presetClass="entr" presetSubtype="0" fill="hold" nodeType="withEffect">
+                                  <p:stCondLst>
+                                    <p:cond delay="0"/>
+                                  </p:stCondLst>
+                                  <p:childTnLst>
+                                    <p:set>
+                                      <p:cBhvr>
+                                        <p:cTn id="8" dur="1" fill="hold">
+                                          <p:stCondLst>
+                                            <p:cond delay="0"/>
+                                          </p:stCondLst>
+                                        </p:cTn>
+                                        <p:tgtEl>
+                                          <p:spTgt spid="3">
+                                            <p:txEl>
+                                              <p:pRg st="7" end="7"/>
+                                            </p:txEl>
+                                          </p:spTgt>
+                                        </p:tgtEl>
+                                        <p:attrNameLst>
+                                          <p:attrName>style.visibility</p:attrName>
+                                        </p:attrNameLst>
+                                      </p:cBhvr>
+                                      <p:to>
+                                        <p:strVal val="visible"/>
+                                      </p:to>
+                                    </p:set>
+                                  </p:childTnLst>
+                                </p:cTn>
+                              </p:par>
+                              <p:par>
+                                <p:cTn id="9" presetID="1" presetClass="entr" presetSubtype="0" fill="hold" nodeType="withEffect">
+                                  <p:stCondLst>
+                                    <p:cond delay="0"/>
+                                  </p:stCondLst>
+                                  <p:childTnLst>
+                                    <p:set>
+                                      <p:cBhvr>
+                                        <p:cTn id="10" dur="1" fill="hold">
+                                          <p:stCondLst>
+                                            <p:cond delay="0"/>
+                                          </p:stCondLst>
+                                        </p:cTn>
+                                        <p:tgtEl>
+                                          <p:spTgt spid="3">
+                                            <p:txEl>
+                                              <p:pRg st="8" end="8"/>
+                                            </p:txEl>
+                                          </p:spTgt>
+                                        </p:tgtEl>
+                                        <p:attrNameLst>
+                                          <p:attrName>style.visibility</p:attrName>
+                                        </p:attrNameLst>
+                                      </p:cBhvr>
+                                      <p:to>
+                                        <p:strVal val="visible"/>
+                                      </p:to>
+                                    </p:set>
+                                  </p:childTnLst>
+                                </p:cTn>
+                              </p:par>
+                              <p:par>
+                                <p:cTn id="11" presetID="1" presetClass="entr" presetSubtype="0" fill="hold" nodeType="withEffect">
+                                  <p:stCondLst>
+                                    <p:cond delay="0"/>
+                                  </p:stCondLst>
+                                  <p:childTnLst>
+                                    <p:set>
+                                      <p:cBhvr>
+                                        <p:cTn id="12" dur="1" fill="hold">
+                                          <p:stCondLst>
+                                            <p:cond delay="0"/>
+                                          </p:stCondLst>
+                                        </p:cTn>
+                                        <p:tgtEl>
+                                          <p:spTgt spid="3">
+                                            <p:txEl>
+                                              <p:pRg st="9" end="9"/>
+                                            </p:txEl>
+                                          </p:spTgt>
+                                        </p:tgtEl>
+                                        <p:attrNameLst>
+                                          <p:attrName>style.visibility</p:attrName>
+                                        </p:attrNameLst>
+                                      </p:cBhvr>
+                                      <p:to>
+                                        <p:strVal val="visible"/>
+                                      </p:to>
+                                    </p:set>
+                                  </p:childTnLst>
+                                </p:cTn>
+                              </p:par>
+                              <p:par>
+                                <p:cTn id="13" presetID="1" presetClass="entr" presetSubtype="0" fill="hold" nodeType="withEffect">
+                                  <p:stCondLst>
+                                    <p:cond delay="0"/>
+                                  </p:stCondLst>
+                                  <p:childTnLst>
+                                    <p:set>
+                                      <p:cBhvr>
+                                        <p:cTn id="14" dur="1" fill="hold">
+                                          <p:stCondLst>
+                                            <p:cond delay="0"/>
+                                          </p:stCondLst>
+                                        </p:cTn>
+                                        <p:tgtEl>
+                                          <p:spTgt spid="3">
+                                            <p:txEl>
+                                              <p:pRg st="10" end="10"/>
+                                            </p:txEl>
+                                          </p:spTgt>
+                                        </p:tgtEl>
+                                        <p:attrNameLst>
+                                          <p:attrName>style.visibility</p:attrName>
+                                        </p:attrNameLst>
+                                      </p:cBhvr>
+                                      <p:to>
+                                        <p:strVal val="visible"/>
+                                      </p:to>
+                                    </p:set>
+                                  </p:childTnLst>
+                                </p:cTn>
+                              </p:par>
+                            </p:childTnLst>
+                          </p:cTn>
+                        </p:par>
+                      </p:childTnLst>
+                    </p:cTn>
+                  </p:par>
+                  <p:par>
+                    <p:cTn id="15" fill="hold">
+                      <p:stCondLst>
+                        <p:cond delay="indefinite"/>
+                      </p:stCondLst>
+                      <p:childTnLst>
+                        <p:par>
+                          <p:cTn id="16" fill="hold">
+                            <p:stCondLst>
+                              <p:cond delay="0"/>
+                            </p:stCondLst>
+                            <p:childTnLst>
+                              <p:par>
+                                <p:cTn id="17" presetID="2" presetClass="entr" presetSubtype="4" fill="hold" grpId="0" nodeType="clickEffect">
+                                  <p:stCondLst>
+                                    <p:cond delay="0"/>
+                                  </p:stCondLst>
+                                  <p:childTnLst>
+                                    <p:set>
+                                      <p:cBhvr>
+                                        <p:cTn id="18" dur="1" fill="hold">
                                           <p:stCondLst>
                                             <p:cond delay="0"/>
                                           </p:stCondLst>
@@ -18529,7 +18813,7 @@
                                     </p:set>
                                     <p:anim calcmode="lin" valueType="num">
                                       <p:cBhvr additive="base">
-                                        <p:cTn id="7" dur="500" fill="hold"/>
+                                        <p:cTn id="19" dur="500" fill="hold"/>
                                         <p:tgtEl>
                                           <p:spTgt spid="5"/>
                                         </p:tgtEl>
@@ -18552,7 +18836,7 @@
                                     </p:anim>
                                     <p:anim calcmode="lin" valueType="num">
                                       <p:cBhvr additive="base">
-                                        <p:cTn id="8" dur="500" fill="hold"/>
+                                        <p:cTn id="20" dur="500" fill="hold"/>
                                         <p:tgtEl>
                                           <p:spTgt spid="5"/>
                                         </p:tgtEl>

</xml_diff>

<commit_message>
changes in the integration Lab
</commit_message>
<xml_diff>
--- a/teaching/CS472/Timetable/OOD-V2.pptx
+++ b/teaching/CS472/Timetable/OOD-V2.pptx
@@ -5,39 +5,38 @@
     <p:sldMasterId id="2147483648" r:id="rId1"/>
   </p:sldMasterIdLst>
   <p:notesMasterIdLst>
-    <p:notesMasterId r:id="rId32"/>
+    <p:notesMasterId r:id="rId31"/>
   </p:notesMasterIdLst>
   <p:sldIdLst>
     <p:sldId id="256" r:id="rId2"/>
     <p:sldId id="276" r:id="rId3"/>
-    <p:sldId id="322" r:id="rId4"/>
-    <p:sldId id="257" r:id="rId5"/>
-    <p:sldId id="277" r:id="rId6"/>
-    <p:sldId id="311" r:id="rId7"/>
-    <p:sldId id="312" r:id="rId8"/>
-    <p:sldId id="320" r:id="rId9"/>
-    <p:sldId id="317" r:id="rId10"/>
-    <p:sldId id="318" r:id="rId11"/>
-    <p:sldId id="319" r:id="rId12"/>
-    <p:sldId id="313" r:id="rId13"/>
-    <p:sldId id="258" r:id="rId14"/>
-    <p:sldId id="260" r:id="rId15"/>
-    <p:sldId id="321" r:id="rId16"/>
-    <p:sldId id="259" r:id="rId17"/>
-    <p:sldId id="261" r:id="rId18"/>
-    <p:sldId id="263" r:id="rId19"/>
-    <p:sldId id="262" r:id="rId20"/>
-    <p:sldId id="264" r:id="rId21"/>
-    <p:sldId id="265" r:id="rId22"/>
-    <p:sldId id="266" r:id="rId23"/>
-    <p:sldId id="271" r:id="rId24"/>
-    <p:sldId id="270" r:id="rId25"/>
-    <p:sldId id="272" r:id="rId26"/>
-    <p:sldId id="273" r:id="rId27"/>
-    <p:sldId id="274" r:id="rId28"/>
-    <p:sldId id="275" r:id="rId29"/>
-    <p:sldId id="314" r:id="rId30"/>
-    <p:sldId id="315" r:id="rId31"/>
+    <p:sldId id="257" r:id="rId4"/>
+    <p:sldId id="277" r:id="rId5"/>
+    <p:sldId id="311" r:id="rId6"/>
+    <p:sldId id="312" r:id="rId7"/>
+    <p:sldId id="320" r:id="rId8"/>
+    <p:sldId id="317" r:id="rId9"/>
+    <p:sldId id="318" r:id="rId10"/>
+    <p:sldId id="319" r:id="rId11"/>
+    <p:sldId id="313" r:id="rId12"/>
+    <p:sldId id="258" r:id="rId13"/>
+    <p:sldId id="260" r:id="rId14"/>
+    <p:sldId id="321" r:id="rId15"/>
+    <p:sldId id="259" r:id="rId16"/>
+    <p:sldId id="261" r:id="rId17"/>
+    <p:sldId id="263" r:id="rId18"/>
+    <p:sldId id="262" r:id="rId19"/>
+    <p:sldId id="264" r:id="rId20"/>
+    <p:sldId id="265" r:id="rId21"/>
+    <p:sldId id="266" r:id="rId22"/>
+    <p:sldId id="271" r:id="rId23"/>
+    <p:sldId id="270" r:id="rId24"/>
+    <p:sldId id="272" r:id="rId25"/>
+    <p:sldId id="273" r:id="rId26"/>
+    <p:sldId id="274" r:id="rId27"/>
+    <p:sldId id="275" r:id="rId28"/>
+    <p:sldId id="314" r:id="rId29"/>
+    <p:sldId id="315" r:id="rId30"/>
   </p:sldIdLst>
   <p:sldSz cx="12192000" cy="6858000"/>
   <p:notesSz cx="6858000" cy="9144000"/>
@@ -226,7 +225,7 @@
           <a:p>
             <a:fld id="{9D75346B-715E-CA4E-A294-01B0C7460D3C}" type="datetimeFigureOut">
               <a:rPr lang="en-BE" smtClean="0"/>
-              <a:t>18/02/2025</a:t>
+              <a:t>22/09/2025</a:t>
             </a:fld>
             <a:endParaRPr lang="en-BE"/>
           </a:p>
@@ -630,18 +629,19 @@
                 <a:effectLst/>
                 <a:latin typeface="-apple-system"/>
               </a:rPr>
-              <a:t>In this phase, we code, test, and debug the classes that implement the business logic (</a:t>
-            </a:r>
-            <a:r>
-              <a:rPr lang="en-GB" b="0" i="0" dirty="0">
-                <a:solidFill>
-                  <a:srgbClr val="333333"/>
-                </a:solidFill>
-                <a:effectLst/>
-                <a:latin typeface="Courier New" panose="02070309020205020404" pitchFamily="49" charset="0"/>
-              </a:rPr>
-              <a:t>Library</a:t>
-            </a:r>
+              <a:t>In this case, when the request is made by the actor, the system enters a loop. Since the loop involves interacting repeatedly with the actor, the loop control mechanism is in the UI itself.</a:t>
+            </a:r>
+          </a:p>
+          <a:p>
+            <a:endParaRPr lang="en-GB" b="0" i="0" dirty="0">
+              <a:solidFill>
+                <a:srgbClr val="333333"/>
+              </a:solidFill>
+              <a:effectLst/>
+              <a:latin typeface="-apple-system"/>
+            </a:endParaRPr>
+          </a:p>
+          <a:p>
             <a:r>
               <a:rPr lang="en-GB" b="0" i="0" dirty="0">
                 <a:solidFill>
@@ -650,7 +650,22 @@
                 <a:effectLst/>
                 <a:latin typeface="-apple-system"/>
               </a:rPr>
-              <a:t>, </a:t>
+              <a:t>The first operation is to get the data about the book to be added. The algorithm here consists of the following steps: </a:t>
+            </a:r>
+          </a:p>
+          <a:p>
+            <a:pPr marL="285750" indent="-285750">
+              <a:buAutoNum type="romanLcParenBoth"/>
+            </a:pPr>
+            <a:r>
+              <a:rPr lang="en-GB" b="0" i="0" dirty="0">
+                <a:solidFill>
+                  <a:srgbClr val="333333"/>
+                </a:solidFill>
+                <a:effectLst/>
+                <a:latin typeface="-apple-system"/>
+              </a:rPr>
+              <a:t>create a </a:t>
             </a:r>
             <a:r>
               <a:rPr lang="en-GB" b="0" i="0" dirty="0">
@@ -670,18 +685,13 @@
                 <a:effectLst/>
                 <a:latin typeface="-apple-system"/>
               </a:rPr>
-              <a:t>, etc.) and </a:t>
-            </a:r>
-            <a:r>
-              <a:rPr lang="en-GB" b="0" i="0" dirty="0" err="1">
-                <a:solidFill>
-                  <a:srgbClr val="333333"/>
-                </a:solidFill>
-                <a:effectLst/>
-                <a:latin typeface="Courier New" panose="02070309020205020404" pitchFamily="49" charset="0"/>
-              </a:rPr>
-              <a:t>UserInterface</a:t>
-            </a:r>
+              <a:t> object, </a:t>
+            </a:r>
+          </a:p>
+          <a:p>
+            <a:pPr marL="285750" indent="-285750">
+              <a:buAutoNum type="romanLcParenBoth"/>
+            </a:pPr>
             <a:r>
               <a:rPr lang="en-GB" b="0" i="0" dirty="0">
                 <a:solidFill>
@@ -690,7 +700,120 @@
                 <a:effectLst/>
                 <a:latin typeface="-apple-system"/>
               </a:rPr>
-              <a:t>.</a:t>
+              <a:t>add the </a:t>
+            </a:r>
+            <a:r>
+              <a:rPr lang="en-GB" b="0" i="0" dirty="0">
+                <a:solidFill>
+                  <a:srgbClr val="333333"/>
+                </a:solidFill>
+                <a:effectLst/>
+                <a:latin typeface="Courier New" panose="02070309020205020404" pitchFamily="49" charset="0"/>
+              </a:rPr>
+              <a:t>Book</a:t>
+            </a:r>
+            <a:r>
+              <a:rPr lang="en-GB" b="0" i="0" dirty="0">
+                <a:solidFill>
+                  <a:srgbClr val="333333"/>
+                </a:solidFill>
+                <a:effectLst/>
+                <a:latin typeface="-apple-system"/>
+              </a:rPr>
+              <a:t> object to the </a:t>
+            </a:r>
+            <a:r>
+              <a:rPr lang="en-GB" b="0" i="0" dirty="0" err="1">
+                <a:solidFill>
+                  <a:srgbClr val="333333"/>
+                </a:solidFill>
+                <a:effectLst/>
+                <a:latin typeface="-apple-system"/>
+              </a:rPr>
+              <a:t>catalog</a:t>
+            </a:r>
+            <a:r>
+              <a:rPr lang="en-GB" b="0" i="0" dirty="0">
+                <a:solidFill>
+                  <a:srgbClr val="333333"/>
+                </a:solidFill>
+                <a:effectLst/>
+                <a:latin typeface="-apple-system"/>
+              </a:rPr>
+              <a:t> and </a:t>
+            </a:r>
+          </a:p>
+          <a:p>
+            <a:pPr marL="285750" indent="-285750">
+              <a:buAutoNum type="romanLcParenBoth"/>
+            </a:pPr>
+            <a:r>
+              <a:rPr lang="en-GB" b="0" i="0" dirty="0">
+                <a:solidFill>
+                  <a:srgbClr val="333333"/>
+                </a:solidFill>
+                <a:effectLst/>
+                <a:latin typeface="-apple-system"/>
+              </a:rPr>
+              <a:t>return the result of the operation. </a:t>
+            </a:r>
+          </a:p>
+          <a:p>
+            <a:pPr marL="0" indent="0">
+              <a:buFontTx/>
+              <a:buNone/>
+            </a:pPr>
+            <a:endParaRPr lang="en-GB" b="0" i="0" dirty="0">
+              <a:solidFill>
+                <a:srgbClr val="333333"/>
+              </a:solidFill>
+              <a:effectLst/>
+              <a:latin typeface="-apple-system"/>
+            </a:endParaRPr>
+          </a:p>
+          <a:p>
+            <a:pPr marL="0" indent="0">
+              <a:buFontTx/>
+              <a:buNone/>
+            </a:pPr>
+            <a:r>
+              <a:rPr lang="en-GB" b="0" i="0" dirty="0">
+                <a:solidFill>
+                  <a:srgbClr val="333333"/>
+                </a:solidFill>
+                <a:effectLst/>
+                <a:latin typeface="-apple-system"/>
+              </a:rPr>
+              <a:t>The first three are is handled in a manner similar to the previous use case.</a:t>
+            </a:r>
+          </a:p>
+          <a:p>
+            <a:pPr marL="0" indent="0">
+              <a:buFontTx/>
+              <a:buNone/>
+            </a:pPr>
+            <a:endParaRPr lang="en-GB" b="0" i="0" dirty="0">
+              <a:solidFill>
+                <a:srgbClr val="333333"/>
+              </a:solidFill>
+              <a:effectLst/>
+              <a:latin typeface="-apple-system"/>
+            </a:endParaRPr>
+          </a:p>
+          <a:p>
+            <a:pPr marL="0" indent="0">
+              <a:buFontTx/>
+              <a:buNone/>
+            </a:pPr>
+            <a:r>
+              <a:rPr lang="en-GB" b="0" i="0" dirty="0">
+                <a:solidFill>
+                  <a:srgbClr val="333333"/>
+                </a:solidFill>
+                <a:effectLst/>
+                <a:latin typeface="-apple-system"/>
+              </a:rPr>
+              <a:t>(iv) The UI returns the result and continues until the actor indicates an exit.</a:t>
             </a:r>
             <a:endParaRPr lang="en-BE" dirty="0"/>
           </a:p>
@@ -713,7 +836,7 @@
           <a:p>
             <a:fld id="{29370A86-051A-7C48-98C3-08CACFB9377A}" type="slidenum">
               <a:rPr lang="en-BE" smtClean="0"/>
-              <a:t>28</a:t>
+              <a:t>24</a:t>
             </a:fld>
             <a:endParaRPr lang="en-BE"/>
           </a:p>
@@ -722,7 +845,7 @@
     </p:spTree>
     <p:extLst>
       <p:ext uri="{BB962C8B-B14F-4D97-AF65-F5344CB8AC3E}">
-        <p14:creationId xmlns:p14="http://schemas.microsoft.com/office/powerpoint/2010/main" val="714339210"/>
+        <p14:creationId xmlns:p14="http://schemas.microsoft.com/office/powerpoint/2010/main" val="2742658539"/>
       </p:ext>
     </p:extLst>
   </p:cSld>
@@ -867,7 +990,161 @@
           <a:p>
             <a:fld id="{29370A86-051A-7C48-98C3-08CACFB9377A}" type="slidenum">
               <a:rPr lang="en-BE" smtClean="0"/>
-              <a:t>29</a:t>
+              <a:t>27</a:t>
+            </a:fld>
+            <a:endParaRPr lang="en-BE"/>
+          </a:p>
+        </p:txBody>
+      </p:sp>
+    </p:spTree>
+    <p:extLst>
+      <p:ext uri="{BB962C8B-B14F-4D97-AF65-F5344CB8AC3E}">
+        <p14:creationId xmlns:p14="http://schemas.microsoft.com/office/powerpoint/2010/main" val="714339210"/>
+      </p:ext>
+    </p:extLst>
+  </p:cSld>
+  <p:clrMapOvr>
+    <a:masterClrMapping/>
+  </p:clrMapOvr>
+</p:notes>
+</file>
+
+<file path=ppt/notesSlides/notesSlide12.xml><?xml version="1.0" encoding="utf-8"?>
+<p:notes xmlns:a="http://schemas.openxmlformats.org/drawingml/2006/main" xmlns:r="http://schemas.openxmlformats.org/officeDocument/2006/relationships" xmlns:p="http://schemas.openxmlformats.org/presentationml/2006/main">
+  <p:cSld>
+    <p:spTree>
+      <p:nvGrpSpPr>
+        <p:cNvPr id="1" name=""/>
+        <p:cNvGrpSpPr/>
+        <p:nvPr/>
+      </p:nvGrpSpPr>
+      <p:grpSpPr>
+        <a:xfrm>
+          <a:off x="0" y="0"/>
+          <a:ext cx="0" cy="0"/>
+          <a:chOff x="0" y="0"/>
+          <a:chExt cx="0" cy="0"/>
+        </a:xfrm>
+      </p:grpSpPr>
+      <p:sp>
+        <p:nvSpPr>
+          <p:cNvPr id="2" name="Slide Image Placeholder 1"/>
+          <p:cNvSpPr>
+            <a:spLocks noGrp="1" noRot="1" noChangeAspect="1"/>
+          </p:cNvSpPr>
+          <p:nvPr>
+            <p:ph type="sldImg"/>
+          </p:nvPr>
+        </p:nvSpPr>
+        <p:spPr/>
+      </p:sp>
+      <p:sp>
+        <p:nvSpPr>
+          <p:cNvPr id="3" name="Notes Placeholder 2"/>
+          <p:cNvSpPr>
+            <a:spLocks noGrp="1"/>
+          </p:cNvSpPr>
+          <p:nvPr>
+            <p:ph type="body" idx="1"/>
+          </p:nvPr>
+        </p:nvSpPr>
+        <p:spPr/>
+        <p:txBody>
+          <a:bodyPr/>
+          <a:lstStyle/>
+          <a:p>
+            <a:r>
+              <a:rPr lang="en-GB" b="0" i="0" dirty="0">
+                <a:solidFill>
+                  <a:srgbClr val="333333"/>
+                </a:solidFill>
+                <a:effectLst/>
+                <a:latin typeface="-apple-system"/>
+              </a:rPr>
+              <a:t>In this phase, we code, test, and debug the classes that implement the business logic (</a:t>
+            </a:r>
+            <a:r>
+              <a:rPr lang="en-GB" b="0" i="0" dirty="0">
+                <a:solidFill>
+                  <a:srgbClr val="333333"/>
+                </a:solidFill>
+                <a:effectLst/>
+                <a:latin typeface="Courier New" panose="02070309020205020404" pitchFamily="49" charset="0"/>
+              </a:rPr>
+              <a:t>Library</a:t>
+            </a:r>
+            <a:r>
+              <a:rPr lang="en-GB" b="0" i="0" dirty="0">
+                <a:solidFill>
+                  <a:srgbClr val="333333"/>
+                </a:solidFill>
+                <a:effectLst/>
+                <a:latin typeface="-apple-system"/>
+              </a:rPr>
+              <a:t>, </a:t>
+            </a:r>
+            <a:r>
+              <a:rPr lang="en-GB" b="0" i="0" dirty="0">
+                <a:solidFill>
+                  <a:srgbClr val="333333"/>
+                </a:solidFill>
+                <a:effectLst/>
+                <a:latin typeface="Courier New" panose="02070309020205020404" pitchFamily="49" charset="0"/>
+              </a:rPr>
+              <a:t>Book</a:t>
+            </a:r>
+            <a:r>
+              <a:rPr lang="en-GB" b="0" i="0" dirty="0">
+                <a:solidFill>
+                  <a:srgbClr val="333333"/>
+                </a:solidFill>
+                <a:effectLst/>
+                <a:latin typeface="-apple-system"/>
+              </a:rPr>
+              <a:t>, etc.) and </a:t>
+            </a:r>
+            <a:r>
+              <a:rPr lang="en-GB" b="0" i="0" dirty="0" err="1">
+                <a:solidFill>
+                  <a:srgbClr val="333333"/>
+                </a:solidFill>
+                <a:effectLst/>
+                <a:latin typeface="Courier New" panose="02070309020205020404" pitchFamily="49" charset="0"/>
+              </a:rPr>
+              <a:t>UserInterface</a:t>
+            </a:r>
+            <a:r>
+              <a:rPr lang="en-GB" b="0" i="0" dirty="0">
+                <a:solidFill>
+                  <a:srgbClr val="333333"/>
+                </a:solidFill>
+                <a:effectLst/>
+                <a:latin typeface="-apple-system"/>
+              </a:rPr>
+              <a:t>.</a:t>
+            </a:r>
+            <a:endParaRPr lang="en-BE" dirty="0"/>
+          </a:p>
+        </p:txBody>
+      </p:sp>
+      <p:sp>
+        <p:nvSpPr>
+          <p:cNvPr id="4" name="Slide Number Placeholder 3"/>
+          <p:cNvSpPr>
+            <a:spLocks noGrp="1"/>
+          </p:cNvSpPr>
+          <p:nvPr>
+            <p:ph type="sldNum" sz="quarter" idx="5"/>
+          </p:nvPr>
+        </p:nvSpPr>
+        <p:spPr/>
+        <p:txBody>
+          <a:bodyPr/>
+          <a:lstStyle/>
+          <a:p>
+            <a:fld id="{29370A86-051A-7C48-98C3-08CACFB9377A}" type="slidenum">
+              <a:rPr lang="en-BE" smtClean="0"/>
+              <a:t>28</a:t>
             </a:fld>
             <a:endParaRPr lang="en-BE"/>
           </a:p>
@@ -1144,7 +1421,7 @@
             </a:pPr>
             <a:fld id="{00000000-1234-1234-1234-123412341234}" type="slidenum">
               <a:rPr lang="en-GB"/>
-              <a:t>5</a:t>
+              <a:t>4</a:t>
             </a:fld>
             <a:endParaRPr/>
           </a:p>
@@ -1337,7 +1614,7 @@
             </a:pPr>
             <a:fld id="{00000000-1234-1234-1234-123412341234}" type="slidenum">
               <a:rPr lang="en-GB"/>
-              <a:t>6</a:t>
+              <a:t>5</a:t>
             </a:fld>
             <a:endParaRPr/>
           </a:p>
@@ -1770,7 +2047,7 @@
             </a:pPr>
             <a:fld id="{00000000-1234-1234-1234-123412341234}" type="slidenum">
               <a:rPr lang="en-GB"/>
-              <a:t>7</a:t>
+              <a:t>6</a:t>
             </a:fld>
             <a:endParaRPr/>
           </a:p>
@@ -1950,7 +2227,7 @@
             </a:pPr>
             <a:fld id="{00000000-1234-1234-1234-123412341234}" type="slidenum">
               <a:rPr lang="en-GB"/>
-              <a:t>8</a:t>
+              <a:t>7</a:t>
             </a:fld>
             <a:endParaRPr/>
           </a:p>
@@ -2029,7 +2306,7 @@
           <a:p>
             <a:fld id="{29370A86-051A-7C48-98C3-08CACFB9377A}" type="slidenum">
               <a:rPr lang="en-BE" smtClean="0"/>
-              <a:t>9</a:t>
+              <a:t>8</a:t>
             </a:fld>
             <a:endParaRPr lang="en-BE"/>
           </a:p>
@@ -2092,7 +2369,7 @@
           <a:bodyPr/>
           <a:lstStyle/>
           <a:p>
-            <a:endParaRPr lang="en-BE" dirty="0"/>
+            <a:endParaRPr lang="en-US" dirty="0"/>
           </a:p>
         </p:txBody>
       </p:sp>
@@ -2113,7 +2390,7 @@
           <a:p>
             <a:fld id="{29370A86-051A-7C48-98C3-08CACFB9377A}" type="slidenum">
               <a:rPr lang="en-BE" smtClean="0"/>
-              <a:t>23</a:t>
+              <a:t>10</a:t>
             </a:fld>
             <a:endParaRPr lang="en-BE"/>
           </a:p>
@@ -2122,7 +2399,7 @@
     </p:spTree>
     <p:extLst>
       <p:ext uri="{BB962C8B-B14F-4D97-AF65-F5344CB8AC3E}">
-        <p14:creationId xmlns:p14="http://schemas.microsoft.com/office/powerpoint/2010/main" val="1366296641"/>
+        <p14:creationId xmlns:p14="http://schemas.microsoft.com/office/powerpoint/2010/main" val="1164428028"/>
       </p:ext>
     </p:extLst>
   </p:cSld>
@@ -2176,328 +2453,6 @@
           <a:bodyPr/>
           <a:lstStyle/>
           <a:p>
-            <a:r>
-              <a:rPr lang="en-GB" b="0" i="0" dirty="0">
-                <a:solidFill>
-                  <a:srgbClr val="333333"/>
-                </a:solidFill>
-                <a:effectLst/>
-                <a:latin typeface="-apple-system"/>
-              </a:rPr>
-              <a:t>Having decided on an adequate set of software classes, our next task is to assign responsibilities.</a:t>
-            </a:r>
-          </a:p>
-          <a:p>
-            <a:r>
-              <a:rPr lang="en-GB" b="0" i="0" dirty="0">
-                <a:solidFill>
-                  <a:srgbClr val="333333"/>
-                </a:solidFill>
-                <a:effectLst/>
-                <a:latin typeface="-apple-system"/>
-              </a:rPr>
-              <a:t>The next step is, therefore, to spell out the details of how the system meets its responsibilities</a:t>
-            </a:r>
-          </a:p>
-          <a:p>
-            <a:r>
-              <a:rPr lang="en-GB" b="0" i="0" dirty="0">
-                <a:solidFill>
-                  <a:srgbClr val="333333"/>
-                </a:solidFill>
-                <a:effectLst/>
-                <a:latin typeface="-apple-system"/>
-              </a:rPr>
-              <a:t>Sequence Diagrams are a great UML tool for describing responsibilities of classes</a:t>
-            </a:r>
-          </a:p>
-          <a:p>
-            <a:r>
-              <a:rPr lang="en-GB" b="0" i="0" dirty="0">
-                <a:solidFill>
-                  <a:srgbClr val="333333"/>
-                </a:solidFill>
-                <a:effectLst/>
-                <a:latin typeface="-apple-system"/>
-              </a:rPr>
-              <a:t>Back to our use case of registering users</a:t>
-            </a:r>
-          </a:p>
-          <a:p>
-            <a:endParaRPr lang="en-GB" b="0" i="0" dirty="0">
-              <a:solidFill>
-                <a:srgbClr val="333333"/>
-              </a:solidFill>
-              <a:effectLst/>
-              <a:latin typeface="-apple-system"/>
-            </a:endParaRPr>
-          </a:p>
-          <a:p>
-            <a:r>
-              <a:rPr lang="en-GB" b="0" i="0" dirty="0">
-                <a:solidFill>
-                  <a:srgbClr val="333333"/>
-                </a:solidFill>
-                <a:effectLst/>
-                <a:latin typeface="-apple-system"/>
-              </a:rPr>
-              <a:t>The clerk issues a request to the system to add a new member. The system responds by asking for the data about the new member. This interaction occurs between the library staff member and the </a:t>
-            </a:r>
-            <a:r>
-              <a:rPr lang="en-GB" b="0" i="0" dirty="0" err="1">
-                <a:solidFill>
-                  <a:srgbClr val="333333"/>
-                </a:solidFill>
-                <a:effectLst/>
-                <a:latin typeface="Courier New" panose="02070309020205020404" pitchFamily="49" charset="0"/>
-              </a:rPr>
-              <a:t>UserInterface</a:t>
-            </a:r>
-            <a:r>
-              <a:rPr lang="en-GB" b="0" i="0" dirty="0">
-                <a:solidFill>
-                  <a:srgbClr val="333333"/>
-                </a:solidFill>
-                <a:effectLst/>
-                <a:latin typeface="-apple-system"/>
-              </a:rPr>
-              <a:t> instance. The clerk enters the requested data, which the </a:t>
-            </a:r>
-            <a:r>
-              <a:rPr lang="en-GB" b="0" i="0" dirty="0" err="1">
-                <a:solidFill>
-                  <a:srgbClr val="333333"/>
-                </a:solidFill>
-                <a:effectLst/>
-                <a:latin typeface="Courier New" panose="02070309020205020404" pitchFamily="49" charset="0"/>
-              </a:rPr>
-              <a:t>UserInterface</a:t>
-            </a:r>
-            <a:r>
-              <a:rPr lang="en-GB" b="0" i="0" dirty="0">
-                <a:solidFill>
-                  <a:srgbClr val="333333"/>
-                </a:solidFill>
-                <a:effectLst/>
-                <a:latin typeface="-apple-system"/>
-              </a:rPr>
-              <a:t> accepts.</a:t>
-            </a:r>
-          </a:p>
-          <a:p>
-            <a:endParaRPr lang="en-GB" b="0" i="0" dirty="0">
-              <a:solidFill>
-                <a:srgbClr val="333333"/>
-              </a:solidFill>
-              <a:effectLst/>
-              <a:latin typeface="-apple-system"/>
-            </a:endParaRPr>
-          </a:p>
-          <a:p>
-            <a:r>
-              <a:rPr lang="en-GB" b="0" i="0" dirty="0">
-                <a:solidFill>
-                  <a:srgbClr val="333333"/>
-                </a:solidFill>
-                <a:effectLst/>
-                <a:latin typeface="-apple-system"/>
-              </a:rPr>
-              <a:t>1. </a:t>
-            </a:r>
-            <a:r>
-              <a:rPr lang="en-GB" b="0" i="0" dirty="0" err="1">
-                <a:solidFill>
-                  <a:srgbClr val="333333"/>
-                </a:solidFill>
-                <a:effectLst/>
-                <a:latin typeface="-apple-system"/>
-              </a:rPr>
-              <a:t>addMember</a:t>
-            </a:r>
-            <a:r>
-              <a:rPr lang="en-GB" b="0" i="0" dirty="0">
-                <a:solidFill>
-                  <a:srgbClr val="333333"/>
-                </a:solidFill>
-                <a:effectLst/>
-                <a:latin typeface="-apple-system"/>
-              </a:rPr>
-              <a:t> within the Library class, then</a:t>
-            </a:r>
-          </a:p>
-          <a:p>
-            <a:r>
-              <a:rPr lang="en-GB" b="0" i="0" dirty="0">
-                <a:solidFill>
-                  <a:srgbClr val="333333"/>
-                </a:solidFill>
-                <a:effectLst/>
-                <a:latin typeface="-apple-system"/>
-              </a:rPr>
-              <a:t>2. Create a Member object with the supplied parameters and return a reference to the Member object</a:t>
-            </a:r>
-          </a:p>
-          <a:p>
-            <a:r>
-              <a:rPr lang="en-GB" b="0" i="0" dirty="0">
-                <a:solidFill>
-                  <a:srgbClr val="333333"/>
-                </a:solidFill>
-                <a:effectLst/>
-                <a:latin typeface="-apple-system"/>
-              </a:rPr>
-              <a:t>3. Insert the member into the member list and return the result of the operation.</a:t>
-            </a:r>
-          </a:p>
-          <a:p>
-            <a:endParaRPr lang="en-GB" b="0" i="0" dirty="0">
-              <a:solidFill>
-                <a:srgbClr val="333333"/>
-              </a:solidFill>
-              <a:effectLst/>
-              <a:latin typeface="-apple-system"/>
-            </a:endParaRPr>
-          </a:p>
-          <a:p>
-            <a:pPr algn="l">
-              <a:buFontTx/>
-              <a:buNone/>
-            </a:pPr>
-            <a:r>
-              <a:rPr lang="en-GB" b="0" i="0" dirty="0">
-                <a:solidFill>
-                  <a:srgbClr val="333333"/>
-                </a:solidFill>
-                <a:effectLst/>
-                <a:latin typeface="-apple-system"/>
-              </a:rPr>
-              <a:t>Invoke the </a:t>
-            </a:r>
-            <a:r>
-              <a:rPr lang="en-GB" b="0" i="0" dirty="0">
-                <a:solidFill>
-                  <a:srgbClr val="333333"/>
-                </a:solidFill>
-                <a:effectLst/>
-                <a:latin typeface="Courier New" panose="02070309020205020404" pitchFamily="49" charset="0"/>
-              </a:rPr>
-              <a:t>Member</a:t>
-            </a:r>
-            <a:r>
-              <a:rPr lang="en-GB" b="0" i="0" dirty="0">
-                <a:solidFill>
-                  <a:srgbClr val="333333"/>
-                </a:solidFill>
-                <a:effectLst/>
-                <a:latin typeface="-apple-system"/>
-              </a:rPr>
-              <a:t> constructor from within the </a:t>
-            </a:r>
-            <a:r>
-              <a:rPr lang="en-GB" b="0" i="0" dirty="0" err="1">
-                <a:solidFill>
-                  <a:srgbClr val="333333"/>
-                </a:solidFill>
-                <a:effectLst/>
-                <a:latin typeface="Courier New" panose="02070309020205020404" pitchFamily="49" charset="0"/>
-              </a:rPr>
-              <a:t>addMember</a:t>
-            </a:r>
-            <a:r>
-              <a:rPr lang="en-GB" b="0" i="0" dirty="0">
-                <a:solidFill>
-                  <a:srgbClr val="333333"/>
-                </a:solidFill>
-                <a:effectLst/>
-                <a:latin typeface="-apple-system"/>
-              </a:rPr>
-              <a:t> method of </a:t>
-            </a:r>
-            <a:r>
-              <a:rPr lang="en-GB" b="0" i="0" dirty="0">
-                <a:solidFill>
-                  <a:srgbClr val="333333"/>
-                </a:solidFill>
-                <a:effectLst/>
-                <a:latin typeface="Courier New" panose="02070309020205020404" pitchFamily="49" charset="0"/>
-              </a:rPr>
-              <a:t>Library</a:t>
-            </a:r>
-            <a:r>
-              <a:rPr lang="en-GB" b="0" i="0" dirty="0">
-                <a:solidFill>
-                  <a:srgbClr val="333333"/>
-                </a:solidFill>
-                <a:effectLst/>
-                <a:latin typeface="-apple-system"/>
-              </a:rPr>
-              <a:t>. The constructor returns a reference to the </a:t>
-            </a:r>
-            <a:r>
-              <a:rPr lang="en-GB" b="0" i="0" dirty="0">
-                <a:solidFill>
-                  <a:srgbClr val="333333"/>
-                </a:solidFill>
-                <a:effectLst/>
-                <a:latin typeface="Courier New" panose="02070309020205020404" pitchFamily="49" charset="0"/>
-              </a:rPr>
-              <a:t>Member</a:t>
-            </a:r>
-            <a:r>
-              <a:rPr lang="en-GB" b="0" i="0" dirty="0">
-                <a:solidFill>
-                  <a:srgbClr val="333333"/>
-                </a:solidFill>
-                <a:effectLst/>
-                <a:latin typeface="-apple-system"/>
-              </a:rPr>
-              <a:t> object and an operation, </a:t>
-            </a:r>
-            <a:r>
-              <a:rPr lang="en-GB" b="0" i="0" dirty="0" err="1">
-                <a:solidFill>
-                  <a:srgbClr val="333333"/>
-                </a:solidFill>
-                <a:effectLst/>
-                <a:latin typeface="Courier New" panose="02070309020205020404" pitchFamily="49" charset="0"/>
-              </a:rPr>
-              <a:t>insertMember</a:t>
-            </a:r>
-            <a:r>
-              <a:rPr lang="en-GB" b="0" i="0" dirty="0">
-                <a:solidFill>
-                  <a:srgbClr val="333333"/>
-                </a:solidFill>
-                <a:effectLst/>
-                <a:latin typeface="-apple-system"/>
-              </a:rPr>
-              <a:t>, is invoked on </a:t>
-            </a:r>
-            <a:r>
-              <a:rPr lang="en-GB" b="0" i="0" dirty="0" err="1">
-                <a:solidFill>
-                  <a:srgbClr val="333333"/>
-                </a:solidFill>
-                <a:effectLst/>
-                <a:latin typeface="Courier New" panose="02070309020205020404" pitchFamily="49" charset="0"/>
-              </a:rPr>
-              <a:t>MemberList</a:t>
-            </a:r>
-            <a:r>
-              <a:rPr lang="en-GB" b="0" i="0" dirty="0">
-                <a:solidFill>
-                  <a:srgbClr val="333333"/>
-                </a:solidFill>
-                <a:effectLst/>
-                <a:latin typeface="-apple-system"/>
-              </a:rPr>
-              <a:t> to add the new member.</a:t>
-            </a:r>
-          </a:p>
-          <a:p>
-            <a:br>
-              <a:rPr lang="en-GB" dirty="0"/>
-            </a:br>
             <a:endParaRPr lang="en-BE" dirty="0"/>
           </a:p>
         </p:txBody>
@@ -2519,7 +2474,7 @@
           <a:p>
             <a:fld id="{29370A86-051A-7C48-98C3-08CACFB9377A}" type="slidenum">
               <a:rPr lang="en-BE" smtClean="0"/>
-              <a:t>24</a:t>
+              <a:t>22</a:t>
             </a:fld>
             <a:endParaRPr lang="en-BE"/>
           </a:p>
@@ -2528,7 +2483,7 @@
     </p:spTree>
     <p:extLst>
       <p:ext uri="{BB962C8B-B14F-4D97-AF65-F5344CB8AC3E}">
-        <p14:creationId xmlns:p14="http://schemas.microsoft.com/office/powerpoint/2010/main" val="2425120555"/>
+        <p14:creationId xmlns:p14="http://schemas.microsoft.com/office/powerpoint/2010/main" val="1366296641"/>
       </p:ext>
     </p:extLst>
   </p:cSld>
@@ -2590,7 +2545,43 @@
                 <a:effectLst/>
                 <a:latin typeface="-apple-system"/>
               </a:rPr>
-              <a:t>In this case, when the request is made by the actor, the system enters a loop. Since the loop involves interacting repeatedly with the actor, the loop control mechanism is in the UI itself.</a:t>
+              <a:t>Having decided on an adequate set of software classes, our next task is to assign responsibilities.</a:t>
+            </a:r>
+          </a:p>
+          <a:p>
+            <a:r>
+              <a:rPr lang="en-GB" b="0" i="0" dirty="0">
+                <a:solidFill>
+                  <a:srgbClr val="333333"/>
+                </a:solidFill>
+                <a:effectLst/>
+                <a:latin typeface="-apple-system"/>
+              </a:rPr>
+              <a:t>The next step is, therefore, to spell out the details of how the system meets its responsibilities</a:t>
+            </a:r>
+          </a:p>
+          <a:p>
+            <a:r>
+              <a:rPr lang="en-GB" b="0" i="0" dirty="0">
+                <a:solidFill>
+                  <a:srgbClr val="333333"/>
+                </a:solidFill>
+                <a:effectLst/>
+                <a:latin typeface="-apple-system"/>
+              </a:rPr>
+              <a:t>Sequence Diagrams are a great UML tool for describing responsibilities of classes</a:t>
+            </a:r>
+          </a:p>
+          <a:p>
+            <a:r>
+              <a:rPr lang="en-GB" b="0" i="0" dirty="0">
+                <a:solidFill>
+                  <a:srgbClr val="333333"/>
+                </a:solidFill>
+                <a:effectLst/>
+                <a:latin typeface="-apple-system"/>
+              </a:rPr>
+              <a:t>Back to our use case of registering users</a:t>
             </a:r>
           </a:p>
           <a:p>
@@ -2611,13 +2602,18 @@
                 <a:effectLst/>
                 <a:latin typeface="-apple-system"/>
               </a:rPr>
-              <a:t>The first operation is to get the data about the book to be added. The algorithm here consists of the following steps: </a:t>
-            </a:r>
-          </a:p>
-          <a:p>
-            <a:pPr marL="285750" indent="-285750">
-              <a:buAutoNum type="romanLcParenBoth"/>
-            </a:pPr>
+              <a:t>The clerk issues a request to the system to add a new member. The system responds by asking for the data about the new member. This interaction occurs between the library staff member and the </a:t>
+            </a:r>
+            <a:r>
+              <a:rPr lang="en-GB" b="0" i="0" dirty="0" err="1">
+                <a:solidFill>
+                  <a:srgbClr val="333333"/>
+                </a:solidFill>
+                <a:effectLst/>
+                <a:latin typeface="Courier New" panose="02070309020205020404" pitchFamily="49" charset="0"/>
+              </a:rPr>
+              <a:t>UserInterface</a:t>
+            </a:r>
             <a:r>
               <a:rPr lang="en-GB" b="0" i="0" dirty="0">
                 <a:solidFill>
@@ -2626,7 +2622,117 @@
                 <a:effectLst/>
                 <a:latin typeface="-apple-system"/>
               </a:rPr>
-              <a:t>create a </a:t>
+              <a:t> instance. The clerk enters the requested data, which the </a:t>
+            </a:r>
+            <a:r>
+              <a:rPr lang="en-GB" b="0" i="0" dirty="0" err="1">
+                <a:solidFill>
+                  <a:srgbClr val="333333"/>
+                </a:solidFill>
+                <a:effectLst/>
+                <a:latin typeface="Courier New" panose="02070309020205020404" pitchFamily="49" charset="0"/>
+              </a:rPr>
+              <a:t>UserInterface</a:t>
+            </a:r>
+            <a:r>
+              <a:rPr lang="en-GB" b="0" i="0" dirty="0">
+                <a:solidFill>
+                  <a:srgbClr val="333333"/>
+                </a:solidFill>
+                <a:effectLst/>
+                <a:latin typeface="-apple-system"/>
+              </a:rPr>
+              <a:t> accepts.</a:t>
+            </a:r>
+          </a:p>
+          <a:p>
+            <a:endParaRPr lang="en-GB" b="0" i="0" dirty="0">
+              <a:solidFill>
+                <a:srgbClr val="333333"/>
+              </a:solidFill>
+              <a:effectLst/>
+              <a:latin typeface="-apple-system"/>
+            </a:endParaRPr>
+          </a:p>
+          <a:p>
+            <a:r>
+              <a:rPr lang="en-GB" b="0" i="0" dirty="0">
+                <a:solidFill>
+                  <a:srgbClr val="333333"/>
+                </a:solidFill>
+                <a:effectLst/>
+                <a:latin typeface="-apple-system"/>
+              </a:rPr>
+              <a:t>1. </a:t>
+            </a:r>
+            <a:r>
+              <a:rPr lang="en-GB" b="0" i="0" dirty="0" err="1">
+                <a:solidFill>
+                  <a:srgbClr val="333333"/>
+                </a:solidFill>
+                <a:effectLst/>
+                <a:latin typeface="-apple-system"/>
+              </a:rPr>
+              <a:t>addMember</a:t>
+            </a:r>
+            <a:r>
+              <a:rPr lang="en-GB" b="0" i="0" dirty="0">
+                <a:solidFill>
+                  <a:srgbClr val="333333"/>
+                </a:solidFill>
+                <a:effectLst/>
+                <a:latin typeface="-apple-system"/>
+              </a:rPr>
+              <a:t> within the Library class, then</a:t>
+            </a:r>
+          </a:p>
+          <a:p>
+            <a:r>
+              <a:rPr lang="en-GB" b="0" i="0" dirty="0">
+                <a:solidFill>
+                  <a:srgbClr val="333333"/>
+                </a:solidFill>
+                <a:effectLst/>
+                <a:latin typeface="-apple-system"/>
+              </a:rPr>
+              <a:t>2. Create a Member object with the supplied parameters and return a reference to the Member object</a:t>
+            </a:r>
+          </a:p>
+          <a:p>
+            <a:r>
+              <a:rPr lang="en-GB" b="0" i="0" dirty="0">
+                <a:solidFill>
+                  <a:srgbClr val="333333"/>
+                </a:solidFill>
+                <a:effectLst/>
+                <a:latin typeface="-apple-system"/>
+              </a:rPr>
+              <a:t>3. Insert the member into the member list and return the result of the operation.</a:t>
+            </a:r>
+          </a:p>
+          <a:p>
+            <a:endParaRPr lang="en-GB" b="0" i="0" dirty="0">
+              <a:solidFill>
+                <a:srgbClr val="333333"/>
+              </a:solidFill>
+              <a:effectLst/>
+              <a:latin typeface="-apple-system"/>
+            </a:endParaRPr>
+          </a:p>
+          <a:p>
+            <a:pPr algn="l">
+              <a:buFontTx/>
+              <a:buNone/>
+            </a:pPr>
+            <a:r>
+              <a:rPr lang="en-GB" b="0" i="0" dirty="0">
+                <a:solidFill>
+                  <a:srgbClr val="333333"/>
+                </a:solidFill>
+                <a:effectLst/>
+                <a:latin typeface="-apple-system"/>
+              </a:rPr>
+              <a:t>Invoke the </a:t>
             </a:r>
             <a:r>
               <a:rPr lang="en-GB" b="0" i="0" dirty="0">
@@ -2636,7 +2742,7 @@
                 <a:effectLst/>
                 <a:latin typeface="Courier New" panose="02070309020205020404" pitchFamily="49" charset="0"/>
               </a:rPr>
-              <a:t>Book</a:t>
+              <a:t>Member</a:t>
             </a:r>
             <a:r>
               <a:rPr lang="en-GB" b="0" i="0" dirty="0">
@@ -2646,13 +2752,18 @@
                 <a:effectLst/>
                 <a:latin typeface="-apple-system"/>
               </a:rPr>
-              <a:t> object, </a:t>
-            </a:r>
-          </a:p>
-          <a:p>
-            <a:pPr marL="285750" indent="-285750">
-              <a:buAutoNum type="romanLcParenBoth"/>
-            </a:pPr>
+              <a:t> constructor from within the </a:t>
+            </a:r>
+            <a:r>
+              <a:rPr lang="en-GB" b="0" i="0" dirty="0" err="1">
+                <a:solidFill>
+                  <a:srgbClr val="333333"/>
+                </a:solidFill>
+                <a:effectLst/>
+                <a:latin typeface="Courier New" panose="02070309020205020404" pitchFamily="49" charset="0"/>
+              </a:rPr>
+              <a:t>addMember</a:t>
+            </a:r>
             <a:r>
               <a:rPr lang="en-GB" b="0" i="0" dirty="0">
                 <a:solidFill>
@@ -2661,7 +2772,7 @@
                 <a:effectLst/>
                 <a:latin typeface="-apple-system"/>
               </a:rPr>
-              <a:t>add the </a:t>
+              <a:t> method of </a:t>
             </a:r>
             <a:r>
               <a:rPr lang="en-GB" b="0" i="0" dirty="0">
@@ -2671,7 +2782,7 @@
                 <a:effectLst/>
                 <a:latin typeface="Courier New" panose="02070309020205020404" pitchFamily="49" charset="0"/>
               </a:rPr>
-              <a:t>Book</a:t>
+              <a:t>Library</a:t>
             </a:r>
             <a:r>
               <a:rPr lang="en-GB" b="0" i="0" dirty="0">
@@ -2681,17 +2792,17 @@
                 <a:effectLst/>
                 <a:latin typeface="-apple-system"/>
               </a:rPr>
-              <a:t> object to the </a:t>
-            </a:r>
-            <a:r>
-              <a:rPr lang="en-GB" b="0" i="0" dirty="0" err="1">
+              <a:t>. The constructor returns a reference to the </a:t>
+            </a:r>
+            <a:r>
+              <a:rPr lang="en-GB" b="0" i="0" dirty="0">
                 <a:solidFill>
                   <a:srgbClr val="333333"/>
                 </a:solidFill>
                 <a:effectLst/>
-                <a:latin typeface="-apple-system"/>
+                <a:latin typeface="Courier New" panose="02070309020205020404" pitchFamily="49" charset="0"/>
               </a:rPr>
-              <a:t>catalog</a:t>
+              <a:t>Member</a:t>
             </a:r>
             <a:r>
               <a:rPr lang="en-GB" b="0" i="0" dirty="0">
@@ -2701,13 +2812,18 @@
                 <a:effectLst/>
                 <a:latin typeface="-apple-system"/>
               </a:rPr>
-              <a:t> and </a:t>
-            </a:r>
-          </a:p>
-          <a:p>
-            <a:pPr marL="285750" indent="-285750">
-              <a:buAutoNum type="romanLcParenBoth"/>
-            </a:pPr>
+              <a:t> object and an operation, </a:t>
+            </a:r>
+            <a:r>
+              <a:rPr lang="en-GB" b="0" i="0" dirty="0" err="1">
+                <a:solidFill>
+                  <a:srgbClr val="333333"/>
+                </a:solidFill>
+                <a:effectLst/>
+                <a:latin typeface="Courier New" panose="02070309020205020404" pitchFamily="49" charset="0"/>
+              </a:rPr>
+              <a:t>insertMember</a:t>
+            </a:r>
             <a:r>
               <a:rPr lang="en-GB" b="0" i="0" dirty="0">
                 <a:solidFill>
@@ -2716,27 +2832,18 @@
                 <a:effectLst/>
                 <a:latin typeface="-apple-system"/>
               </a:rPr>
-              <a:t>return the result of the operation. </a:t>
-            </a:r>
-          </a:p>
-          <a:p>
-            <a:pPr marL="0" indent="0">
-              <a:buFontTx/>
-              <a:buNone/>
-            </a:pPr>
-            <a:endParaRPr lang="en-GB" b="0" i="0" dirty="0">
-              <a:solidFill>
-                <a:srgbClr val="333333"/>
-              </a:solidFill>
-              <a:effectLst/>
-              <a:latin typeface="-apple-system"/>
-            </a:endParaRPr>
-          </a:p>
-          <a:p>
-            <a:pPr marL="0" indent="0">
-              <a:buFontTx/>
-              <a:buNone/>
-            </a:pPr>
+              <a:t>, is invoked on </a:t>
+            </a:r>
+            <a:r>
+              <a:rPr lang="en-GB" b="0" i="0" dirty="0" err="1">
+                <a:solidFill>
+                  <a:srgbClr val="333333"/>
+                </a:solidFill>
+                <a:effectLst/>
+                <a:latin typeface="Courier New" panose="02070309020205020404" pitchFamily="49" charset="0"/>
+              </a:rPr>
+              <a:t>MemberList</a:t>
+            </a:r>
             <a:r>
               <a:rPr lang="en-GB" b="0" i="0" dirty="0">
                 <a:solidFill>
@@ -2745,37 +2852,13 @@
                 <a:effectLst/>
                 <a:latin typeface="-apple-system"/>
               </a:rPr>
-              <a:t>The first three are is handled in a manner similar to the previous use case.</a:t>
-            </a:r>
-          </a:p>
-          <a:p>
-            <a:pPr marL="0" indent="0">
-              <a:buFontTx/>
-              <a:buNone/>
-            </a:pPr>
-            <a:endParaRPr lang="en-GB" b="0" i="0" dirty="0">
-              <a:solidFill>
-                <a:srgbClr val="333333"/>
-              </a:solidFill>
-              <a:effectLst/>
-              <a:latin typeface="-apple-system"/>
-            </a:endParaRPr>
-          </a:p>
-          <a:p>
-            <a:pPr marL="0" indent="0">
-              <a:buFontTx/>
-              <a:buNone/>
-            </a:pPr>
-            <a:r>
-              <a:rPr lang="en-GB" b="0" i="0" dirty="0">
-                <a:solidFill>
-                  <a:srgbClr val="333333"/>
-                </a:solidFill>
-                <a:effectLst/>
-                <a:latin typeface="-apple-system"/>
-              </a:rPr>
-              <a:t>(iv) The UI returns the result and continues until the actor indicates an exit.</a:t>
-            </a:r>
+              <a:t> to add the new member.</a:t>
+            </a:r>
+          </a:p>
+          <a:p>
+            <a:br>
+              <a:rPr lang="en-GB" dirty="0"/>
+            </a:br>
             <a:endParaRPr lang="en-BE" dirty="0"/>
           </a:p>
         </p:txBody>
@@ -2797,7 +2880,7 @@
           <a:p>
             <a:fld id="{29370A86-051A-7C48-98C3-08CACFB9377A}" type="slidenum">
               <a:rPr lang="en-BE" smtClean="0"/>
-              <a:t>25</a:t>
+              <a:t>23</a:t>
             </a:fld>
             <a:endParaRPr lang="en-BE"/>
           </a:p>
@@ -2806,7 +2889,7 @@
     </p:spTree>
     <p:extLst>
       <p:ext uri="{BB962C8B-B14F-4D97-AF65-F5344CB8AC3E}">
-        <p14:creationId xmlns:p14="http://schemas.microsoft.com/office/powerpoint/2010/main" val="2742658539"/>
+        <p14:creationId xmlns:p14="http://schemas.microsoft.com/office/powerpoint/2010/main" val="2425120555"/>
       </p:ext>
     </p:extLst>
   </p:cSld>
@@ -2965,7 +3048,7 @@
           <a:p>
             <a:fld id="{915E5E83-BDD3-3F47-8DA5-8D6610ED5E3B}" type="datetimeFigureOut">
               <a:rPr lang="en-BE" smtClean="0"/>
-              <a:t>18/02/2025</a:t>
+              <a:t>22/09/2025</a:t>
             </a:fld>
             <a:endParaRPr lang="en-BE"/>
           </a:p>
@@ -3165,7 +3248,7 @@
           <a:p>
             <a:fld id="{915E5E83-BDD3-3F47-8DA5-8D6610ED5E3B}" type="datetimeFigureOut">
               <a:rPr lang="en-BE" smtClean="0"/>
-              <a:t>18/02/2025</a:t>
+              <a:t>22/09/2025</a:t>
             </a:fld>
             <a:endParaRPr lang="en-BE"/>
           </a:p>
@@ -3375,7 +3458,7 @@
           <a:p>
             <a:fld id="{915E5E83-BDD3-3F47-8DA5-8D6610ED5E3B}" type="datetimeFigureOut">
               <a:rPr lang="en-BE" smtClean="0"/>
-              <a:t>18/02/2025</a:t>
+              <a:t>22/09/2025</a:t>
             </a:fld>
             <a:endParaRPr lang="en-BE"/>
           </a:p>
@@ -3575,7 +3658,7 @@
           <a:p>
             <a:fld id="{915E5E83-BDD3-3F47-8DA5-8D6610ED5E3B}" type="datetimeFigureOut">
               <a:rPr lang="en-BE" smtClean="0"/>
-              <a:t>18/02/2025</a:t>
+              <a:t>22/09/2025</a:t>
             </a:fld>
             <a:endParaRPr lang="en-BE"/>
           </a:p>
@@ -3851,7 +3934,7 @@
           <a:p>
             <a:fld id="{915E5E83-BDD3-3F47-8DA5-8D6610ED5E3B}" type="datetimeFigureOut">
               <a:rPr lang="en-BE" smtClean="0"/>
-              <a:t>18/02/2025</a:t>
+              <a:t>22/09/2025</a:t>
             </a:fld>
             <a:endParaRPr lang="en-BE"/>
           </a:p>
@@ -4119,7 +4202,7 @@
           <a:p>
             <a:fld id="{915E5E83-BDD3-3F47-8DA5-8D6610ED5E3B}" type="datetimeFigureOut">
               <a:rPr lang="en-BE" smtClean="0"/>
-              <a:t>18/02/2025</a:t>
+              <a:t>22/09/2025</a:t>
             </a:fld>
             <a:endParaRPr lang="en-BE"/>
           </a:p>
@@ -4534,7 +4617,7 @@
           <a:p>
             <a:fld id="{915E5E83-BDD3-3F47-8DA5-8D6610ED5E3B}" type="datetimeFigureOut">
               <a:rPr lang="en-BE" smtClean="0"/>
-              <a:t>18/02/2025</a:t>
+              <a:t>22/09/2025</a:t>
             </a:fld>
             <a:endParaRPr lang="en-BE"/>
           </a:p>
@@ -4676,7 +4759,7 @@
           <a:p>
             <a:fld id="{915E5E83-BDD3-3F47-8DA5-8D6610ED5E3B}" type="datetimeFigureOut">
               <a:rPr lang="en-BE" smtClean="0"/>
-              <a:t>18/02/2025</a:t>
+              <a:t>22/09/2025</a:t>
             </a:fld>
             <a:endParaRPr lang="en-BE"/>
           </a:p>
@@ -4789,7 +4872,7 @@
           <a:p>
             <a:fld id="{915E5E83-BDD3-3F47-8DA5-8D6610ED5E3B}" type="datetimeFigureOut">
               <a:rPr lang="en-BE" smtClean="0"/>
-              <a:t>18/02/2025</a:t>
+              <a:t>22/09/2025</a:t>
             </a:fld>
             <a:endParaRPr lang="en-BE"/>
           </a:p>
@@ -5102,7 +5185,7 @@
           <a:p>
             <a:fld id="{915E5E83-BDD3-3F47-8DA5-8D6610ED5E3B}" type="datetimeFigureOut">
               <a:rPr lang="en-BE" smtClean="0"/>
-              <a:t>18/02/2025</a:t>
+              <a:t>22/09/2025</a:t>
             </a:fld>
             <a:endParaRPr lang="en-BE"/>
           </a:p>
@@ -5391,7 +5474,7 @@
           <a:p>
             <a:fld id="{915E5E83-BDD3-3F47-8DA5-8D6610ED5E3B}" type="datetimeFigureOut">
               <a:rPr lang="en-BE" smtClean="0"/>
-              <a:t>18/02/2025</a:t>
+              <a:t>22/09/2025</a:t>
             </a:fld>
             <a:endParaRPr lang="en-BE"/>
           </a:p>
@@ -5634,7 +5717,7 @@
           <a:p>
             <a:fld id="{915E5E83-BDD3-3F47-8DA5-8D6610ED5E3B}" type="datetimeFigureOut">
               <a:rPr lang="en-BE" smtClean="0"/>
-              <a:t>18/02/2025</a:t>
+              <a:t>22/09/2025</a:t>
             </a:fld>
             <a:endParaRPr lang="en-BE"/>
           </a:p>
@@ -6192,992 +6275,6 @@
 </file>
 
 <file path=ppt/slides/slide10.xml><?xml version="1.0" encoding="utf-8"?>
-<p:sld xmlns:a="http://schemas.openxmlformats.org/drawingml/2006/main" xmlns:r="http://schemas.openxmlformats.org/officeDocument/2006/relationships" xmlns:p="http://schemas.openxmlformats.org/presentationml/2006/main" show="0">
-  <p:cSld>
-    <p:spTree>
-      <p:nvGrpSpPr>
-        <p:cNvPr id="1" name=""/>
-        <p:cNvGrpSpPr/>
-        <p:nvPr/>
-      </p:nvGrpSpPr>
-      <p:grpSpPr>
-        <a:xfrm>
-          <a:off x="0" y="0"/>
-          <a:ext cx="0" cy="0"/>
-          <a:chOff x="0" y="0"/>
-          <a:chExt cx="0" cy="0"/>
-        </a:xfrm>
-      </p:grpSpPr>
-      <p:sp>
-        <p:nvSpPr>
-          <p:cNvPr id="2" name="Title 1">
-            <a:extLst>
-              <a:ext uri="{FF2B5EF4-FFF2-40B4-BE49-F238E27FC236}">
-                <a16:creationId xmlns:a16="http://schemas.microsoft.com/office/drawing/2014/main" id="{4A1894D3-33A2-4B7A-5A7D-BE8BF8C4A8B9}"/>
-              </a:ext>
-            </a:extLst>
-          </p:cNvPr>
-          <p:cNvSpPr>
-            <a:spLocks noGrp="1"/>
-          </p:cNvSpPr>
-          <p:nvPr>
-            <p:ph type="title"/>
-          </p:nvPr>
-        </p:nvSpPr>
-        <p:spPr>
-          <a:xfrm>
-            <a:off x="838200" y="365126"/>
-            <a:ext cx="10515600" cy="763588"/>
-          </a:xfrm>
-        </p:spPr>
-        <p:txBody>
-          <a:bodyPr/>
-          <a:lstStyle/>
-          <a:p>
-            <a:r>
-              <a:rPr lang="en-US" dirty="0"/>
-              <a:t>Conceptual Design vs Technical Design</a:t>
-            </a:r>
-          </a:p>
-        </p:txBody>
-      </p:sp>
-      <p:graphicFrame>
-        <p:nvGraphicFramePr>
-          <p:cNvPr id="4" name="Table 3">
-            <a:extLst>
-              <a:ext uri="{FF2B5EF4-FFF2-40B4-BE49-F238E27FC236}">
-                <a16:creationId xmlns:a16="http://schemas.microsoft.com/office/drawing/2014/main" id="{18847EB7-C485-502A-03A5-AF2233818998}"/>
-              </a:ext>
-            </a:extLst>
-          </p:cNvPr>
-          <p:cNvGraphicFramePr>
-            <a:graphicFrameLocks noGrp="1"/>
-          </p:cNvGraphicFramePr>
-          <p:nvPr>
-            <p:extLst>
-              <p:ext uri="{D42A27DB-BD31-4B8C-83A1-F6EECF244321}">
-                <p14:modId xmlns:p14="http://schemas.microsoft.com/office/powerpoint/2010/main" val="2628271176"/>
-              </p:ext>
-            </p:extLst>
-          </p:nvPr>
-        </p:nvGraphicFramePr>
-        <p:xfrm>
-          <a:off x="838200" y="1563686"/>
-          <a:ext cx="10215562" cy="4773640"/>
-        </p:xfrm>
-        <a:graphic>
-          <a:graphicData uri="http://schemas.openxmlformats.org/drawingml/2006/table">
-            <a:tbl>
-              <a:tblPr/>
-              <a:tblGrid>
-                <a:gridCol w="5107781">
-                  <a:extLst>
-                    <a:ext uri="{9D8B030D-6E8A-4147-A177-3AD203B41FA5}">
-                      <a16:colId xmlns:a16="http://schemas.microsoft.com/office/drawing/2014/main" val="1061370426"/>
-                    </a:ext>
-                  </a:extLst>
-                </a:gridCol>
-                <a:gridCol w="5107781">
-                  <a:extLst>
-                    <a:ext uri="{9D8B030D-6E8A-4147-A177-3AD203B41FA5}">
-                      <a16:colId xmlns:a16="http://schemas.microsoft.com/office/drawing/2014/main" val="3355039544"/>
-                    </a:ext>
-                  </a:extLst>
-                </a:gridCol>
-              </a:tblGrid>
-              <a:tr h="355211">
-                <a:tc>
-                  <a:txBody>
-                    <a:bodyPr/>
-                    <a:lstStyle/>
-                    <a:p>
-                      <a:pPr fontAlgn="b"/>
-                      <a:r>
-                        <a:rPr lang="en-GB" sz="2000" b="1" dirty="0">
-                          <a:solidFill>
-                            <a:schemeClr val="tx1"/>
-                          </a:solidFill>
-                          <a:effectLst/>
-                        </a:rPr>
-                        <a:t>Conceptual Design</a:t>
-                      </a:r>
-                    </a:p>
-                  </a:txBody>
-                  <a:tcPr marL="88803" marR="88803" marT="44401" marB="44401" anchor="b">
-                    <a:lnL w="9525" cap="flat" cmpd="sng" algn="ctr">
-                      <a:solidFill>
-                        <a:srgbClr val="E3E3E3"/>
-                      </a:solidFill>
-                      <a:prstDash val="solid"/>
-                      <a:round/>
-                      <a:headEnd type="none" w="med" len="med"/>
-                      <a:tailEnd type="none" w="med" len="med"/>
-                    </a:lnL>
-                    <a:lnR w="9525" cap="flat" cmpd="sng" algn="ctr">
-                      <a:solidFill>
-                        <a:srgbClr val="E3E3E3"/>
-                      </a:solidFill>
-                      <a:prstDash val="solid"/>
-                      <a:round/>
-                      <a:headEnd type="none" w="med" len="med"/>
-                      <a:tailEnd type="none" w="med" len="med"/>
-                    </a:lnR>
-                    <a:lnT w="9525" cap="flat" cmpd="sng" algn="ctr">
-                      <a:solidFill>
-                        <a:srgbClr val="E3E3E3"/>
-                      </a:solidFill>
-                      <a:prstDash val="solid"/>
-                      <a:round/>
-                      <a:headEnd type="none" w="med" len="med"/>
-                      <a:tailEnd type="none" w="med" len="med"/>
-                    </a:lnT>
-                    <a:lnB w="12700" cap="flat" cmpd="sng" algn="ctr">
-                      <a:solidFill>
-                        <a:srgbClr val="E3E3E3"/>
-                      </a:solidFill>
-                      <a:prstDash val="solid"/>
-                      <a:round/>
-                      <a:headEnd type="none" w="med" len="med"/>
-                      <a:tailEnd type="none" w="med" len="med"/>
-                    </a:lnB>
-                    <a:solidFill>
-                      <a:srgbClr val="FFFFFF"/>
-                    </a:solidFill>
-                  </a:tcPr>
-                </a:tc>
-                <a:tc>
-                  <a:txBody>
-                    <a:bodyPr/>
-                    <a:lstStyle/>
-                    <a:p>
-                      <a:pPr fontAlgn="b"/>
-                      <a:r>
-                        <a:rPr lang="en-GB" sz="2000" b="1">
-                          <a:solidFill>
-                            <a:schemeClr val="tx1"/>
-                          </a:solidFill>
-                          <a:effectLst/>
-                        </a:rPr>
-                        <a:t>Technical Design</a:t>
-                      </a:r>
-                    </a:p>
-                  </a:txBody>
-                  <a:tcPr marL="88803" marR="88803" marT="44401" marB="44401" anchor="b">
-                    <a:lnL w="9525" cap="flat" cmpd="sng" algn="ctr">
-                      <a:solidFill>
-                        <a:srgbClr val="E3E3E3"/>
-                      </a:solidFill>
-                      <a:prstDash val="solid"/>
-                      <a:round/>
-                      <a:headEnd type="none" w="med" len="med"/>
-                      <a:tailEnd type="none" w="med" len="med"/>
-                    </a:lnL>
-                    <a:lnR w="9525" cap="flat" cmpd="sng" algn="ctr">
-                      <a:solidFill>
-                        <a:srgbClr val="E3E3E3"/>
-                      </a:solidFill>
-                      <a:prstDash val="solid"/>
-                      <a:round/>
-                      <a:headEnd type="none" w="med" len="med"/>
-                      <a:tailEnd type="none" w="med" len="med"/>
-                    </a:lnR>
-                    <a:lnT w="9525" cap="flat" cmpd="sng" algn="ctr">
-                      <a:solidFill>
-                        <a:srgbClr val="E3E3E3"/>
-                      </a:solidFill>
-                      <a:prstDash val="solid"/>
-                      <a:round/>
-                      <a:headEnd type="none" w="med" len="med"/>
-                      <a:tailEnd type="none" w="med" len="med"/>
-                    </a:lnT>
-                    <a:lnB w="12700" cap="flat" cmpd="sng" algn="ctr">
-                      <a:solidFill>
-                        <a:srgbClr val="E3E3E3"/>
-                      </a:solidFill>
-                      <a:prstDash val="solid"/>
-                      <a:round/>
-                      <a:headEnd type="none" w="med" len="med"/>
-                      <a:tailEnd type="none" w="med" len="med"/>
-                    </a:lnB>
-                    <a:solidFill>
-                      <a:srgbClr val="FFFFFF"/>
-                    </a:solidFill>
-                  </a:tcPr>
-                </a:tc>
-                <a:extLst>
-                  <a:ext uri="{0D108BD9-81ED-4DB2-BD59-A6C34878D82A}">
-                    <a16:rowId xmlns:a16="http://schemas.microsoft.com/office/drawing/2014/main" val="545554010"/>
-                  </a:ext>
-                </a:extLst>
-              </a:tr>
-              <a:tr h="888028">
-                <a:tc>
-                  <a:txBody>
-                    <a:bodyPr/>
-                    <a:lstStyle/>
-                    <a:p>
-                      <a:pPr fontAlgn="base"/>
-                      <a:r>
-                        <a:rPr lang="en-GB" sz="2000" dirty="0">
-                          <a:solidFill>
-                            <a:schemeClr val="tx1"/>
-                          </a:solidFill>
-                          <a:effectLst/>
-                        </a:rPr>
-                        <a:t>Focuses on high-level ideas, goals, and requirements</a:t>
-                      </a:r>
-                    </a:p>
-                  </a:txBody>
-                  <a:tcPr marL="88803" marR="88803" marT="44401" marB="44401" anchor="ctr">
-                    <a:lnL w="9525" cap="flat" cmpd="sng" algn="ctr">
-                      <a:solidFill>
-                        <a:srgbClr val="E3E3E3"/>
-                      </a:solidFill>
-                      <a:prstDash val="solid"/>
-                      <a:round/>
-                      <a:headEnd type="none" w="med" len="med"/>
-                      <a:tailEnd type="none" w="med" len="med"/>
-                    </a:lnL>
-                    <a:lnR w="9525" cap="flat" cmpd="sng" algn="ctr">
-                      <a:solidFill>
-                        <a:srgbClr val="E3E3E3"/>
-                      </a:solidFill>
-                      <a:prstDash val="solid"/>
-                      <a:round/>
-                      <a:headEnd type="none" w="med" len="med"/>
-                      <a:tailEnd type="none" w="med" len="med"/>
-                    </a:lnR>
-                    <a:lnT w="12700" cap="flat" cmpd="sng" algn="ctr">
-                      <a:solidFill>
-                        <a:srgbClr val="E3E3E3"/>
-                      </a:solidFill>
-                      <a:prstDash val="solid"/>
-                      <a:round/>
-                      <a:headEnd type="none" w="med" len="med"/>
-                      <a:tailEnd type="none" w="med" len="med"/>
-                    </a:lnT>
-                    <a:lnB w="12700" cap="flat" cmpd="sng" algn="ctr">
-                      <a:solidFill>
-                        <a:srgbClr val="E3E3E3"/>
-                      </a:solidFill>
-                      <a:prstDash val="solid"/>
-                      <a:round/>
-                      <a:headEnd type="none" w="med" len="med"/>
-                      <a:tailEnd type="none" w="med" len="med"/>
-                    </a:lnB>
-                    <a:solidFill>
-                      <a:srgbClr val="FFFFFF"/>
-                    </a:solidFill>
-                  </a:tcPr>
-                </a:tc>
-                <a:tc>
-                  <a:txBody>
-                    <a:bodyPr/>
-                    <a:lstStyle/>
-                    <a:p>
-                      <a:pPr fontAlgn="base"/>
-                      <a:r>
-                        <a:rPr lang="en-GB" sz="2000">
-                          <a:solidFill>
-                            <a:schemeClr val="tx1"/>
-                          </a:solidFill>
-                          <a:effectLst/>
-                        </a:rPr>
-                        <a:t>Focuses on detailed specifications and implementation details</a:t>
-                      </a:r>
-                    </a:p>
-                  </a:txBody>
-                  <a:tcPr marL="88803" marR="88803" marT="44401" marB="44401" anchor="ctr">
-                    <a:lnL w="9525" cap="flat" cmpd="sng" algn="ctr">
-                      <a:solidFill>
-                        <a:srgbClr val="E3E3E3"/>
-                      </a:solidFill>
-                      <a:prstDash val="solid"/>
-                      <a:round/>
-                      <a:headEnd type="none" w="med" len="med"/>
-                      <a:tailEnd type="none" w="med" len="med"/>
-                    </a:lnL>
-                    <a:lnR w="9525" cap="flat" cmpd="sng" algn="ctr">
-                      <a:solidFill>
-                        <a:srgbClr val="E3E3E3"/>
-                      </a:solidFill>
-                      <a:prstDash val="solid"/>
-                      <a:round/>
-                      <a:headEnd type="none" w="med" len="med"/>
-                      <a:tailEnd type="none" w="med" len="med"/>
-                    </a:lnR>
-                    <a:lnT w="12700" cap="flat" cmpd="sng" algn="ctr">
-                      <a:solidFill>
-                        <a:srgbClr val="E3E3E3"/>
-                      </a:solidFill>
-                      <a:prstDash val="solid"/>
-                      <a:round/>
-                      <a:headEnd type="none" w="med" len="med"/>
-                      <a:tailEnd type="none" w="med" len="med"/>
-                    </a:lnT>
-                    <a:lnB w="12700" cap="flat" cmpd="sng" algn="ctr">
-                      <a:solidFill>
-                        <a:srgbClr val="E3E3E3"/>
-                      </a:solidFill>
-                      <a:prstDash val="solid"/>
-                      <a:round/>
-                      <a:headEnd type="none" w="med" len="med"/>
-                      <a:tailEnd type="none" w="med" len="med"/>
-                    </a:lnB>
-                    <a:solidFill>
-                      <a:srgbClr val="FFFFFF"/>
-                    </a:solidFill>
-                  </a:tcPr>
-                </a:tc>
-                <a:extLst>
-                  <a:ext uri="{0D108BD9-81ED-4DB2-BD59-A6C34878D82A}">
-                    <a16:rowId xmlns:a16="http://schemas.microsoft.com/office/drawing/2014/main" val="3821555425"/>
-                  </a:ext>
-                </a:extLst>
-              </a:tr>
-              <a:tr h="621620">
-                <a:tc>
-                  <a:txBody>
-                    <a:bodyPr/>
-                    <a:lstStyle/>
-                    <a:p>
-                      <a:pPr fontAlgn="base"/>
-                      <a:r>
-                        <a:rPr lang="en-GB" sz="2000" dirty="0">
-                          <a:solidFill>
-                            <a:schemeClr val="tx1"/>
-                          </a:solidFill>
-                          <a:effectLst/>
-                        </a:rPr>
-                        <a:t>Captures the essence and purpose of the system</a:t>
-                      </a:r>
-                    </a:p>
-                  </a:txBody>
-                  <a:tcPr marL="88803" marR="88803" marT="44401" marB="44401" anchor="ctr">
-                    <a:lnL w="9525" cap="flat" cmpd="sng" algn="ctr">
-                      <a:solidFill>
-                        <a:srgbClr val="E3E3E3"/>
-                      </a:solidFill>
-                      <a:prstDash val="solid"/>
-                      <a:round/>
-                      <a:headEnd type="none" w="med" len="med"/>
-                      <a:tailEnd type="none" w="med" len="med"/>
-                    </a:lnL>
-                    <a:lnR w="9525" cap="flat" cmpd="sng" algn="ctr">
-                      <a:solidFill>
-                        <a:srgbClr val="E3E3E3"/>
-                      </a:solidFill>
-                      <a:prstDash val="solid"/>
-                      <a:round/>
-                      <a:headEnd type="none" w="med" len="med"/>
-                      <a:tailEnd type="none" w="med" len="med"/>
-                    </a:lnR>
-                    <a:lnT w="12700" cap="flat" cmpd="sng" algn="ctr">
-                      <a:solidFill>
-                        <a:srgbClr val="E3E3E3"/>
-                      </a:solidFill>
-                      <a:prstDash val="solid"/>
-                      <a:round/>
-                      <a:headEnd type="none" w="med" len="med"/>
-                      <a:tailEnd type="none" w="med" len="med"/>
-                    </a:lnT>
-                    <a:lnB w="12700" cap="flat" cmpd="sng" algn="ctr">
-                      <a:solidFill>
-                        <a:srgbClr val="E3E3E3"/>
-                      </a:solidFill>
-                      <a:prstDash val="solid"/>
-                      <a:round/>
-                      <a:headEnd type="none" w="med" len="med"/>
-                      <a:tailEnd type="none" w="med" len="med"/>
-                    </a:lnB>
-                    <a:solidFill>
-                      <a:srgbClr val="FFFFFF"/>
-                    </a:solidFill>
-                  </a:tcPr>
-                </a:tc>
-                <a:tc>
-                  <a:txBody>
-                    <a:bodyPr/>
-                    <a:lstStyle/>
-                    <a:p>
-                      <a:pPr fontAlgn="base"/>
-                      <a:r>
-                        <a:rPr lang="en-GB" sz="2000">
-                          <a:solidFill>
-                            <a:schemeClr val="tx1"/>
-                          </a:solidFill>
-                          <a:effectLst/>
-                        </a:rPr>
-                        <a:t>Specifies how the system will be built and function</a:t>
-                      </a:r>
-                    </a:p>
-                  </a:txBody>
-                  <a:tcPr marL="88803" marR="88803" marT="44401" marB="44401" anchor="ctr">
-                    <a:lnL w="9525" cap="flat" cmpd="sng" algn="ctr">
-                      <a:solidFill>
-                        <a:srgbClr val="E3E3E3"/>
-                      </a:solidFill>
-                      <a:prstDash val="solid"/>
-                      <a:round/>
-                      <a:headEnd type="none" w="med" len="med"/>
-                      <a:tailEnd type="none" w="med" len="med"/>
-                    </a:lnL>
-                    <a:lnR w="9525" cap="flat" cmpd="sng" algn="ctr">
-                      <a:solidFill>
-                        <a:srgbClr val="E3E3E3"/>
-                      </a:solidFill>
-                      <a:prstDash val="solid"/>
-                      <a:round/>
-                      <a:headEnd type="none" w="med" len="med"/>
-                      <a:tailEnd type="none" w="med" len="med"/>
-                    </a:lnR>
-                    <a:lnT w="12700" cap="flat" cmpd="sng" algn="ctr">
-                      <a:solidFill>
-                        <a:srgbClr val="E3E3E3"/>
-                      </a:solidFill>
-                      <a:prstDash val="solid"/>
-                      <a:round/>
-                      <a:headEnd type="none" w="med" len="med"/>
-                      <a:tailEnd type="none" w="med" len="med"/>
-                    </a:lnT>
-                    <a:lnB w="12700" cap="flat" cmpd="sng" algn="ctr">
-                      <a:solidFill>
-                        <a:srgbClr val="E3E3E3"/>
-                      </a:solidFill>
-                      <a:prstDash val="solid"/>
-                      <a:round/>
-                      <a:headEnd type="none" w="med" len="med"/>
-                      <a:tailEnd type="none" w="med" len="med"/>
-                    </a:lnB>
-                    <a:solidFill>
-                      <a:srgbClr val="FFFFFF"/>
-                    </a:solidFill>
-                  </a:tcPr>
-                </a:tc>
-                <a:extLst>
-                  <a:ext uri="{0D108BD9-81ED-4DB2-BD59-A6C34878D82A}">
-                    <a16:rowId xmlns:a16="http://schemas.microsoft.com/office/drawing/2014/main" val="798187894"/>
-                  </a:ext>
-                </a:extLst>
-              </a:tr>
-              <a:tr h="621620">
-                <a:tc>
-                  <a:txBody>
-                    <a:bodyPr/>
-                    <a:lstStyle/>
-                    <a:p>
-                      <a:pPr fontAlgn="base"/>
-                      <a:r>
-                        <a:rPr lang="en-GB" sz="2000" dirty="0">
-                          <a:solidFill>
-                            <a:schemeClr val="tx1"/>
-                          </a:solidFill>
-                          <a:effectLst/>
-                        </a:rPr>
-                        <a:t>Emphasizes the "what" of the system</a:t>
-                      </a:r>
-                    </a:p>
-                  </a:txBody>
-                  <a:tcPr marL="88803" marR="88803" marT="44401" marB="44401" anchor="ctr">
-                    <a:lnL w="9525" cap="flat" cmpd="sng" algn="ctr">
-                      <a:solidFill>
-                        <a:srgbClr val="E3E3E3"/>
-                      </a:solidFill>
-                      <a:prstDash val="solid"/>
-                      <a:round/>
-                      <a:headEnd type="none" w="med" len="med"/>
-                      <a:tailEnd type="none" w="med" len="med"/>
-                    </a:lnL>
-                    <a:lnR w="9525" cap="flat" cmpd="sng" algn="ctr">
-                      <a:solidFill>
-                        <a:srgbClr val="E3E3E3"/>
-                      </a:solidFill>
-                      <a:prstDash val="solid"/>
-                      <a:round/>
-                      <a:headEnd type="none" w="med" len="med"/>
-                      <a:tailEnd type="none" w="med" len="med"/>
-                    </a:lnR>
-                    <a:lnT w="12700" cap="flat" cmpd="sng" algn="ctr">
-                      <a:solidFill>
-                        <a:srgbClr val="E3E3E3"/>
-                      </a:solidFill>
-                      <a:prstDash val="solid"/>
-                      <a:round/>
-                      <a:headEnd type="none" w="med" len="med"/>
-                      <a:tailEnd type="none" w="med" len="med"/>
-                    </a:lnT>
-                    <a:lnB w="12700" cap="flat" cmpd="sng" algn="ctr">
-                      <a:solidFill>
-                        <a:srgbClr val="E3E3E3"/>
-                      </a:solidFill>
-                      <a:prstDash val="solid"/>
-                      <a:round/>
-                      <a:headEnd type="none" w="med" len="med"/>
-                      <a:tailEnd type="none" w="med" len="med"/>
-                    </a:lnB>
-                    <a:solidFill>
-                      <a:srgbClr val="FFFFFF"/>
-                    </a:solidFill>
-                  </a:tcPr>
-                </a:tc>
-                <a:tc>
-                  <a:txBody>
-                    <a:bodyPr/>
-                    <a:lstStyle/>
-                    <a:p>
-                      <a:pPr fontAlgn="base"/>
-                      <a:r>
-                        <a:rPr lang="en-GB" sz="2000">
-                          <a:solidFill>
-                            <a:schemeClr val="tx1"/>
-                          </a:solidFill>
-                          <a:effectLst/>
-                        </a:rPr>
-                        <a:t>Emphasizes the "how" of implementing the system</a:t>
-                      </a:r>
-                    </a:p>
-                  </a:txBody>
-                  <a:tcPr marL="88803" marR="88803" marT="44401" marB="44401" anchor="ctr">
-                    <a:lnL w="9525" cap="flat" cmpd="sng" algn="ctr">
-                      <a:solidFill>
-                        <a:srgbClr val="E3E3E3"/>
-                      </a:solidFill>
-                      <a:prstDash val="solid"/>
-                      <a:round/>
-                      <a:headEnd type="none" w="med" len="med"/>
-                      <a:tailEnd type="none" w="med" len="med"/>
-                    </a:lnL>
-                    <a:lnR w="9525" cap="flat" cmpd="sng" algn="ctr">
-                      <a:solidFill>
-                        <a:srgbClr val="E3E3E3"/>
-                      </a:solidFill>
-                      <a:prstDash val="solid"/>
-                      <a:round/>
-                      <a:headEnd type="none" w="med" len="med"/>
-                      <a:tailEnd type="none" w="med" len="med"/>
-                    </a:lnR>
-                    <a:lnT w="12700" cap="flat" cmpd="sng" algn="ctr">
-                      <a:solidFill>
-                        <a:srgbClr val="E3E3E3"/>
-                      </a:solidFill>
-                      <a:prstDash val="solid"/>
-                      <a:round/>
-                      <a:headEnd type="none" w="med" len="med"/>
-                      <a:tailEnd type="none" w="med" len="med"/>
-                    </a:lnT>
-                    <a:lnB w="12700" cap="flat" cmpd="sng" algn="ctr">
-                      <a:solidFill>
-                        <a:srgbClr val="E3E3E3"/>
-                      </a:solidFill>
-                      <a:prstDash val="solid"/>
-                      <a:round/>
-                      <a:headEnd type="none" w="med" len="med"/>
-                      <a:tailEnd type="none" w="med" len="med"/>
-                    </a:lnB>
-                    <a:solidFill>
-                      <a:srgbClr val="FFFFFF"/>
-                    </a:solidFill>
-                  </a:tcPr>
-                </a:tc>
-                <a:extLst>
-                  <a:ext uri="{0D108BD9-81ED-4DB2-BD59-A6C34878D82A}">
-                    <a16:rowId xmlns:a16="http://schemas.microsoft.com/office/drawing/2014/main" val="2484308898"/>
-                  </a:ext>
-                </a:extLst>
-              </a:tr>
-              <a:tr h="621620">
-                <a:tc>
-                  <a:txBody>
-                    <a:bodyPr/>
-                    <a:lstStyle/>
-                    <a:p>
-                      <a:pPr fontAlgn="base"/>
-                      <a:r>
-                        <a:rPr lang="en-GB" sz="2000" dirty="0">
-                          <a:solidFill>
-                            <a:schemeClr val="tx1"/>
-                          </a:solidFill>
-                          <a:effectLst/>
-                        </a:rPr>
-                        <a:t>Typically expressed through diagrams and narratives</a:t>
-                      </a:r>
-                    </a:p>
-                  </a:txBody>
-                  <a:tcPr marL="88803" marR="88803" marT="44401" marB="44401" anchor="ctr">
-                    <a:lnL w="9525" cap="flat" cmpd="sng" algn="ctr">
-                      <a:solidFill>
-                        <a:srgbClr val="E3E3E3"/>
-                      </a:solidFill>
-                      <a:prstDash val="solid"/>
-                      <a:round/>
-                      <a:headEnd type="none" w="med" len="med"/>
-                      <a:tailEnd type="none" w="med" len="med"/>
-                    </a:lnL>
-                    <a:lnR w="9525" cap="flat" cmpd="sng" algn="ctr">
-                      <a:solidFill>
-                        <a:srgbClr val="E3E3E3"/>
-                      </a:solidFill>
-                      <a:prstDash val="solid"/>
-                      <a:round/>
-                      <a:headEnd type="none" w="med" len="med"/>
-                      <a:tailEnd type="none" w="med" len="med"/>
-                    </a:lnR>
-                    <a:lnT w="12700" cap="flat" cmpd="sng" algn="ctr">
-                      <a:solidFill>
-                        <a:srgbClr val="E3E3E3"/>
-                      </a:solidFill>
-                      <a:prstDash val="solid"/>
-                      <a:round/>
-                      <a:headEnd type="none" w="med" len="med"/>
-                      <a:tailEnd type="none" w="med" len="med"/>
-                    </a:lnT>
-                    <a:lnB w="12700" cap="flat" cmpd="sng" algn="ctr">
-                      <a:solidFill>
-                        <a:srgbClr val="E3E3E3"/>
-                      </a:solidFill>
-                      <a:prstDash val="solid"/>
-                      <a:round/>
-                      <a:headEnd type="none" w="med" len="med"/>
-                      <a:tailEnd type="none" w="med" len="med"/>
-                    </a:lnB>
-                    <a:solidFill>
-                      <a:srgbClr val="FFFFFF"/>
-                    </a:solidFill>
-                  </a:tcPr>
-                </a:tc>
-                <a:tc>
-                  <a:txBody>
-                    <a:bodyPr/>
-                    <a:lstStyle/>
-                    <a:p>
-                      <a:pPr fontAlgn="base"/>
-                      <a:r>
-                        <a:rPr lang="en-GB" sz="2000">
-                          <a:solidFill>
-                            <a:schemeClr val="tx1"/>
-                          </a:solidFill>
-                          <a:effectLst/>
-                        </a:rPr>
-                        <a:t>Typically expressed through diagrams and documentation</a:t>
-                      </a:r>
-                    </a:p>
-                  </a:txBody>
-                  <a:tcPr marL="88803" marR="88803" marT="44401" marB="44401" anchor="ctr">
-                    <a:lnL w="9525" cap="flat" cmpd="sng" algn="ctr">
-                      <a:solidFill>
-                        <a:srgbClr val="E3E3E3"/>
-                      </a:solidFill>
-                      <a:prstDash val="solid"/>
-                      <a:round/>
-                      <a:headEnd type="none" w="med" len="med"/>
-                      <a:tailEnd type="none" w="med" len="med"/>
-                    </a:lnL>
-                    <a:lnR w="9525" cap="flat" cmpd="sng" algn="ctr">
-                      <a:solidFill>
-                        <a:srgbClr val="E3E3E3"/>
-                      </a:solidFill>
-                      <a:prstDash val="solid"/>
-                      <a:round/>
-                      <a:headEnd type="none" w="med" len="med"/>
-                      <a:tailEnd type="none" w="med" len="med"/>
-                    </a:lnR>
-                    <a:lnT w="12700" cap="flat" cmpd="sng" algn="ctr">
-                      <a:solidFill>
-                        <a:srgbClr val="E3E3E3"/>
-                      </a:solidFill>
-                      <a:prstDash val="solid"/>
-                      <a:round/>
-                      <a:headEnd type="none" w="med" len="med"/>
-                      <a:tailEnd type="none" w="med" len="med"/>
-                    </a:lnT>
-                    <a:lnB w="12700" cap="flat" cmpd="sng" algn="ctr">
-                      <a:solidFill>
-                        <a:srgbClr val="E3E3E3"/>
-                      </a:solidFill>
-                      <a:prstDash val="solid"/>
-                      <a:round/>
-                      <a:headEnd type="none" w="med" len="med"/>
-                      <a:tailEnd type="none" w="med" len="med"/>
-                    </a:lnB>
-                    <a:solidFill>
-                      <a:srgbClr val="FFFFFF"/>
-                    </a:solidFill>
-                  </a:tcPr>
-                </a:tc>
-                <a:extLst>
-                  <a:ext uri="{0D108BD9-81ED-4DB2-BD59-A6C34878D82A}">
-                    <a16:rowId xmlns:a16="http://schemas.microsoft.com/office/drawing/2014/main" val="1736528481"/>
-                  </a:ext>
-                </a:extLst>
-              </a:tr>
-              <a:tr h="621620">
-                <a:tc>
-                  <a:txBody>
-                    <a:bodyPr/>
-                    <a:lstStyle/>
-                    <a:p>
-                      <a:pPr fontAlgn="base"/>
-                      <a:r>
-                        <a:rPr lang="en-GB" sz="2000" dirty="0">
-                          <a:solidFill>
-                            <a:schemeClr val="tx1"/>
-                          </a:solidFill>
-                          <a:effectLst/>
-                        </a:rPr>
-                        <a:t>Helps stakeholders understand the scope and vision</a:t>
-                      </a:r>
-                    </a:p>
-                  </a:txBody>
-                  <a:tcPr marL="88803" marR="88803" marT="44401" marB="44401" anchor="ctr">
-                    <a:lnL w="9525" cap="flat" cmpd="sng" algn="ctr">
-                      <a:solidFill>
-                        <a:srgbClr val="E3E3E3"/>
-                      </a:solidFill>
-                      <a:prstDash val="solid"/>
-                      <a:round/>
-                      <a:headEnd type="none" w="med" len="med"/>
-                      <a:tailEnd type="none" w="med" len="med"/>
-                    </a:lnL>
-                    <a:lnR w="9525" cap="flat" cmpd="sng" algn="ctr">
-                      <a:solidFill>
-                        <a:srgbClr val="E3E3E3"/>
-                      </a:solidFill>
-                      <a:prstDash val="solid"/>
-                      <a:round/>
-                      <a:headEnd type="none" w="med" len="med"/>
-                      <a:tailEnd type="none" w="med" len="med"/>
-                    </a:lnR>
-                    <a:lnT w="12700" cap="flat" cmpd="sng" algn="ctr">
-                      <a:solidFill>
-                        <a:srgbClr val="E3E3E3"/>
-                      </a:solidFill>
-                      <a:prstDash val="solid"/>
-                      <a:round/>
-                      <a:headEnd type="none" w="med" len="med"/>
-                      <a:tailEnd type="none" w="med" len="med"/>
-                    </a:lnT>
-                    <a:lnB w="12700" cap="flat" cmpd="sng" algn="ctr">
-                      <a:solidFill>
-                        <a:srgbClr val="E3E3E3"/>
-                      </a:solidFill>
-                      <a:prstDash val="solid"/>
-                      <a:round/>
-                      <a:headEnd type="none" w="med" len="med"/>
-                      <a:tailEnd type="none" w="med" len="med"/>
-                    </a:lnB>
-                    <a:solidFill>
-                      <a:srgbClr val="FFFFFF"/>
-                    </a:solidFill>
-                  </a:tcPr>
-                </a:tc>
-                <a:tc>
-                  <a:txBody>
-                    <a:bodyPr/>
-                    <a:lstStyle/>
-                    <a:p>
-                      <a:pPr fontAlgn="base"/>
-                      <a:r>
-                        <a:rPr lang="en-GB" sz="2000">
-                          <a:solidFill>
-                            <a:schemeClr val="tx1"/>
-                          </a:solidFill>
-                          <a:effectLst/>
-                        </a:rPr>
-                        <a:t>Guides developers in building the system components</a:t>
-                      </a:r>
-                    </a:p>
-                  </a:txBody>
-                  <a:tcPr marL="88803" marR="88803" marT="44401" marB="44401" anchor="ctr">
-                    <a:lnL w="9525" cap="flat" cmpd="sng" algn="ctr">
-                      <a:solidFill>
-                        <a:srgbClr val="E3E3E3"/>
-                      </a:solidFill>
-                      <a:prstDash val="solid"/>
-                      <a:round/>
-                      <a:headEnd type="none" w="med" len="med"/>
-                      <a:tailEnd type="none" w="med" len="med"/>
-                    </a:lnL>
-                    <a:lnR w="9525" cap="flat" cmpd="sng" algn="ctr">
-                      <a:solidFill>
-                        <a:srgbClr val="E3E3E3"/>
-                      </a:solidFill>
-                      <a:prstDash val="solid"/>
-                      <a:round/>
-                      <a:headEnd type="none" w="med" len="med"/>
-                      <a:tailEnd type="none" w="med" len="med"/>
-                    </a:lnR>
-                    <a:lnT w="12700" cap="flat" cmpd="sng" algn="ctr">
-                      <a:solidFill>
-                        <a:srgbClr val="E3E3E3"/>
-                      </a:solidFill>
-                      <a:prstDash val="solid"/>
-                      <a:round/>
-                      <a:headEnd type="none" w="med" len="med"/>
-                      <a:tailEnd type="none" w="med" len="med"/>
-                    </a:lnT>
-                    <a:lnB w="12700" cap="flat" cmpd="sng" algn="ctr">
-                      <a:solidFill>
-                        <a:srgbClr val="E3E3E3"/>
-                      </a:solidFill>
-                      <a:prstDash val="solid"/>
-                      <a:round/>
-                      <a:headEnd type="none" w="med" len="med"/>
-                      <a:tailEnd type="none" w="med" len="med"/>
-                    </a:lnB>
-                    <a:solidFill>
-                      <a:srgbClr val="FFFFFF"/>
-                    </a:solidFill>
-                  </a:tcPr>
-                </a:tc>
-                <a:extLst>
-                  <a:ext uri="{0D108BD9-81ED-4DB2-BD59-A6C34878D82A}">
-                    <a16:rowId xmlns:a16="http://schemas.microsoft.com/office/drawing/2014/main" val="700628358"/>
-                  </a:ext>
-                </a:extLst>
-              </a:tr>
-              <a:tr h="621620">
-                <a:tc>
-                  <a:txBody>
-                    <a:bodyPr/>
-                    <a:lstStyle/>
-                    <a:p>
-                      <a:pPr fontAlgn="base"/>
-                      <a:r>
-                        <a:rPr lang="en-GB" sz="2000">
-                          <a:solidFill>
-                            <a:schemeClr val="tx1"/>
-                          </a:solidFill>
-                          <a:effectLst/>
-                        </a:rPr>
-                        <a:t>May involve brainstorming sessions and user interviews</a:t>
-                      </a:r>
-                    </a:p>
-                  </a:txBody>
-                  <a:tcPr marL="88803" marR="88803" marT="44401" marB="44401" anchor="ctr">
-                    <a:lnL w="9525" cap="flat" cmpd="sng" algn="ctr">
-                      <a:solidFill>
-                        <a:srgbClr val="E3E3E3"/>
-                      </a:solidFill>
-                      <a:prstDash val="solid"/>
-                      <a:round/>
-                      <a:headEnd type="none" w="med" len="med"/>
-                      <a:tailEnd type="none" w="med" len="med"/>
-                    </a:lnL>
-                    <a:lnR w="9525" cap="flat" cmpd="sng" algn="ctr">
-                      <a:solidFill>
-                        <a:srgbClr val="E3E3E3"/>
-                      </a:solidFill>
-                      <a:prstDash val="solid"/>
-                      <a:round/>
-                      <a:headEnd type="none" w="med" len="med"/>
-                      <a:tailEnd type="none" w="med" len="med"/>
-                    </a:lnR>
-                    <a:lnT w="12700" cap="flat" cmpd="sng" algn="ctr">
-                      <a:solidFill>
-                        <a:srgbClr val="E3E3E3"/>
-                      </a:solidFill>
-                      <a:prstDash val="solid"/>
-                      <a:round/>
-                      <a:headEnd type="none" w="med" len="med"/>
-                      <a:tailEnd type="none" w="med" len="med"/>
-                    </a:lnT>
-                    <a:lnB w="9525" cap="flat" cmpd="sng" algn="ctr">
-                      <a:solidFill>
-                        <a:srgbClr val="E3E3E3"/>
-                      </a:solidFill>
-                      <a:prstDash val="solid"/>
-                      <a:round/>
-                      <a:headEnd type="none" w="med" len="med"/>
-                      <a:tailEnd type="none" w="med" len="med"/>
-                    </a:lnB>
-                    <a:solidFill>
-                      <a:srgbClr val="FFFFFF"/>
-                    </a:solidFill>
-                  </a:tcPr>
-                </a:tc>
-                <a:tc>
-                  <a:txBody>
-                    <a:bodyPr/>
-                    <a:lstStyle/>
-                    <a:p>
-                      <a:pPr fontAlgn="base"/>
-                      <a:r>
-                        <a:rPr lang="en-GB" sz="2000" dirty="0">
-                          <a:solidFill>
-                            <a:schemeClr val="tx1"/>
-                          </a:solidFill>
-                          <a:effectLst/>
-                        </a:rPr>
-                        <a:t>Involves architectural decisions and technical trade-offs</a:t>
-                      </a:r>
-                    </a:p>
-                  </a:txBody>
-                  <a:tcPr marL="88803" marR="88803" marT="44401" marB="44401" anchor="ctr">
-                    <a:lnL w="9525" cap="flat" cmpd="sng" algn="ctr">
-                      <a:solidFill>
-                        <a:srgbClr val="E3E3E3"/>
-                      </a:solidFill>
-                      <a:prstDash val="solid"/>
-                      <a:round/>
-                      <a:headEnd type="none" w="med" len="med"/>
-                      <a:tailEnd type="none" w="med" len="med"/>
-                    </a:lnL>
-                    <a:lnR w="9525" cap="flat" cmpd="sng" algn="ctr">
-                      <a:solidFill>
-                        <a:srgbClr val="E3E3E3"/>
-                      </a:solidFill>
-                      <a:prstDash val="solid"/>
-                      <a:round/>
-                      <a:headEnd type="none" w="med" len="med"/>
-                      <a:tailEnd type="none" w="med" len="med"/>
-                    </a:lnR>
-                    <a:lnT w="12700" cap="flat" cmpd="sng" algn="ctr">
-                      <a:solidFill>
-                        <a:srgbClr val="E3E3E3"/>
-                      </a:solidFill>
-                      <a:prstDash val="solid"/>
-                      <a:round/>
-                      <a:headEnd type="none" w="med" len="med"/>
-                      <a:tailEnd type="none" w="med" len="med"/>
-                    </a:lnT>
-                    <a:lnB w="9525" cap="flat" cmpd="sng" algn="ctr">
-                      <a:solidFill>
-                        <a:srgbClr val="E3E3E3"/>
-                      </a:solidFill>
-                      <a:prstDash val="solid"/>
-                      <a:round/>
-                      <a:headEnd type="none" w="med" len="med"/>
-                      <a:tailEnd type="none" w="med" len="med"/>
-                    </a:lnB>
-                    <a:solidFill>
-                      <a:srgbClr val="FFFFFF"/>
-                    </a:solidFill>
-                  </a:tcPr>
-                </a:tc>
-                <a:extLst>
-                  <a:ext uri="{0D108BD9-81ED-4DB2-BD59-A6C34878D82A}">
-                    <a16:rowId xmlns:a16="http://schemas.microsoft.com/office/drawing/2014/main" val="3023893508"/>
-                  </a:ext>
-                </a:extLst>
-              </a:tr>
-            </a:tbl>
-          </a:graphicData>
-        </a:graphic>
-      </p:graphicFrame>
-    </p:spTree>
-    <p:extLst>
-      <p:ext uri="{BB962C8B-B14F-4D97-AF65-F5344CB8AC3E}">
-        <p14:creationId xmlns:p14="http://schemas.microsoft.com/office/powerpoint/2010/main" val="3924461794"/>
-      </p:ext>
-    </p:extLst>
-  </p:cSld>
-  <p:clrMapOvr>
-    <a:masterClrMapping/>
-  </p:clrMapOvr>
-</p:sld>
-</file>
-
-<file path=ppt/slides/slide11.xml><?xml version="1.0" encoding="utf-8"?>
 <p:sld xmlns:a="http://schemas.openxmlformats.org/drawingml/2006/main" xmlns:r="http://schemas.openxmlformats.org/officeDocument/2006/relationships" xmlns:p="http://schemas.openxmlformats.org/presentationml/2006/main" show="0">
   <p:cSld>
     <p:spTree>
@@ -8583,7 +7680,7 @@
 </p:sld>
 </file>
 
-<file path=ppt/slides/slide12.xml><?xml version="1.0" encoding="utf-8"?>
+<file path=ppt/slides/slide11.xml><?xml version="1.0" encoding="utf-8"?>
 <p:sld xmlns:a="http://schemas.openxmlformats.org/drawingml/2006/main" xmlns:r="http://schemas.openxmlformats.org/officeDocument/2006/relationships" xmlns:p="http://schemas.openxmlformats.org/presentationml/2006/main">
   <p:cSld>
     <p:spTree>
@@ -8679,7 +7776,7 @@
 </p:sld>
 </file>
 
-<file path=ppt/slides/slide13.xml><?xml version="1.0" encoding="utf-8"?>
+<file path=ppt/slides/slide12.xml><?xml version="1.0" encoding="utf-8"?>
 <p:sld xmlns:a="http://schemas.openxmlformats.org/drawingml/2006/main" xmlns:r="http://schemas.openxmlformats.org/officeDocument/2006/relationships" xmlns:p="http://schemas.openxmlformats.org/presentationml/2006/main">
   <p:cSld>
     <p:spTree>
@@ -8804,7 +7901,7 @@
 </p:sld>
 </file>
 
-<file path=ppt/slides/slide14.xml><?xml version="1.0" encoding="utf-8"?>
+<file path=ppt/slides/slide13.xml><?xml version="1.0" encoding="utf-8"?>
 <p:sld xmlns:a="http://schemas.openxmlformats.org/drawingml/2006/main" xmlns:r="http://schemas.openxmlformats.org/officeDocument/2006/relationships" xmlns:p="http://schemas.openxmlformats.org/presentationml/2006/main">
   <p:cSld>
     <p:spTree>
@@ -9234,7 +8331,7 @@
 </p:sld>
 </file>
 
-<file path=ppt/slides/slide15.xml><?xml version="1.0" encoding="utf-8"?>
+<file path=ppt/slides/slide14.xml><?xml version="1.0" encoding="utf-8"?>
 <p:sld xmlns:a="http://schemas.openxmlformats.org/drawingml/2006/main" xmlns:r="http://schemas.openxmlformats.org/officeDocument/2006/relationships" xmlns:p="http://schemas.openxmlformats.org/presentationml/2006/main">
   <p:cSld>
     <p:spTree>
@@ -9498,7 +8595,7 @@
 </p:sld>
 </file>
 
-<file path=ppt/slides/slide16.xml><?xml version="1.0" encoding="utf-8"?>
+<file path=ppt/slides/slide15.xml><?xml version="1.0" encoding="utf-8"?>
 <p:sld xmlns:a="http://schemas.openxmlformats.org/drawingml/2006/main" xmlns:r="http://schemas.openxmlformats.org/officeDocument/2006/relationships" xmlns:p="http://schemas.openxmlformats.org/presentationml/2006/main">
   <p:cSld>
     <p:spTree>
@@ -9807,7 +8904,7 @@
 </p:sld>
 </file>
 
-<file path=ppt/slides/slide17.xml><?xml version="1.0" encoding="utf-8"?>
+<file path=ppt/slides/slide16.xml><?xml version="1.0" encoding="utf-8"?>
 <p:sld xmlns:a="http://schemas.openxmlformats.org/drawingml/2006/main" xmlns:r="http://schemas.openxmlformats.org/officeDocument/2006/relationships" xmlns:p="http://schemas.openxmlformats.org/presentationml/2006/main">
   <p:cSld>
     <p:spTree>
@@ -9948,7 +9045,7 @@
 </p:sld>
 </file>
 
-<file path=ppt/slides/slide18.xml><?xml version="1.0" encoding="utf-8"?>
+<file path=ppt/slides/slide17.xml><?xml version="1.0" encoding="utf-8"?>
 <p:sld xmlns:a="http://schemas.openxmlformats.org/drawingml/2006/main" xmlns:r="http://schemas.openxmlformats.org/officeDocument/2006/relationships" xmlns:p="http://schemas.openxmlformats.org/presentationml/2006/main">
   <p:cSld>
     <p:spTree>
@@ -10163,7 +9260,7 @@
 </p:sld>
 </file>
 
-<file path=ppt/slides/slide19.xml><?xml version="1.0" encoding="utf-8"?>
+<file path=ppt/slides/slide18.xml><?xml version="1.0" encoding="utf-8"?>
 <p:sld xmlns:a="http://schemas.openxmlformats.org/drawingml/2006/main" xmlns:r="http://schemas.openxmlformats.org/officeDocument/2006/relationships" xmlns:p="http://schemas.openxmlformats.org/presentationml/2006/main">
   <p:cSld>
     <p:spTree>
@@ -11220,132 +10317,7 @@
 </p:sld>
 </file>
 
-<file path=ppt/slides/slide2.xml><?xml version="1.0" encoding="utf-8"?>
-<p:sld xmlns:a="http://schemas.openxmlformats.org/drawingml/2006/main" xmlns:r="http://schemas.openxmlformats.org/officeDocument/2006/relationships" xmlns:p="http://schemas.openxmlformats.org/presentationml/2006/main">
-  <p:cSld>
-    <p:spTree>
-      <p:nvGrpSpPr>
-        <p:cNvPr id="1" name=""/>
-        <p:cNvGrpSpPr/>
-        <p:nvPr/>
-      </p:nvGrpSpPr>
-      <p:grpSpPr>
-        <a:xfrm>
-          <a:off x="0" y="0"/>
-          <a:ext cx="0" cy="0"/>
-          <a:chOff x="0" y="0"/>
-          <a:chExt cx="0" cy="0"/>
-        </a:xfrm>
-      </p:grpSpPr>
-      <p:sp>
-        <p:nvSpPr>
-          <p:cNvPr id="2" name="Title 1">
-            <a:extLst>
-              <a:ext uri="{FF2B5EF4-FFF2-40B4-BE49-F238E27FC236}">
-                <a16:creationId xmlns:a16="http://schemas.microsoft.com/office/drawing/2014/main" id="{C052B02A-6D2C-8593-D1D2-0F7F93D99A00}"/>
-              </a:ext>
-            </a:extLst>
-          </p:cNvPr>
-          <p:cNvSpPr>
-            <a:spLocks noGrp="1"/>
-          </p:cNvSpPr>
-          <p:nvPr>
-            <p:ph type="title"/>
-          </p:nvPr>
-        </p:nvSpPr>
-        <p:spPr/>
-        <p:txBody>
-          <a:bodyPr/>
-          <a:lstStyle/>
-          <a:p>
-            <a:r>
-              <a:rPr lang="en-BE" dirty="0"/>
-              <a:t>Announcements</a:t>
-            </a:r>
-          </a:p>
-        </p:txBody>
-      </p:sp>
-      <p:sp>
-        <p:nvSpPr>
-          <p:cNvPr id="3" name="Content Placeholder 2">
-            <a:extLst>
-              <a:ext uri="{FF2B5EF4-FFF2-40B4-BE49-F238E27FC236}">
-                <a16:creationId xmlns:a16="http://schemas.microsoft.com/office/drawing/2014/main" id="{0ADB13C0-2F22-7B03-F87C-066C9440C4DF}"/>
-              </a:ext>
-            </a:extLst>
-          </p:cNvPr>
-          <p:cNvSpPr>
-            <a:spLocks noGrp="1"/>
-          </p:cNvSpPr>
-          <p:nvPr>
-            <p:ph idx="1"/>
-          </p:nvPr>
-        </p:nvSpPr>
-        <p:spPr/>
-        <p:txBody>
-          <a:bodyPr/>
-          <a:lstStyle/>
-          <a:p>
-            <a:r>
-              <a:rPr lang="en-BE" dirty="0"/>
-              <a:t>Today is the last Face-to-face</a:t>
-            </a:r>
-          </a:p>
-          <a:p>
-            <a:r>
-              <a:rPr lang="en-BE" dirty="0"/>
-              <a:t>Submit your DP I today on Canvas and pin the Google doc on Discord</a:t>
-            </a:r>
-          </a:p>
-          <a:p>
-            <a:r>
-              <a:rPr lang="en-BE" dirty="0"/>
-              <a:t>Testing and CI grades will be posted end of this week.</a:t>
-            </a:r>
-          </a:p>
-          <a:p>
-            <a:r>
-              <a:rPr lang="en-BE" dirty="0"/>
-              <a:t>Focus on DP II and III – Its both team and individual</a:t>
-            </a:r>
-          </a:p>
-          <a:p>
-            <a:pPr lvl="1"/>
-            <a:r>
-              <a:rPr lang="en-BE" dirty="0"/>
-              <a:t>Individual 60%</a:t>
-            </a:r>
-          </a:p>
-          <a:p>
-            <a:pPr lvl="1"/>
-            <a:r>
-              <a:rPr lang="en-BE" dirty="0"/>
-              <a:t>Team 40%</a:t>
-            </a:r>
-          </a:p>
-          <a:p>
-            <a:r>
-              <a:rPr lang="en-US" dirty="0"/>
-              <a:t>Starting next week, aim for at least two meetings per week</a:t>
-            </a:r>
-            <a:endParaRPr lang="en-BE" dirty="0"/>
-          </a:p>
-        </p:txBody>
-      </p:sp>
-    </p:spTree>
-    <p:extLst>
-      <p:ext uri="{BB962C8B-B14F-4D97-AF65-F5344CB8AC3E}">
-        <p14:creationId xmlns:p14="http://schemas.microsoft.com/office/powerpoint/2010/main" val="2495615062"/>
-      </p:ext>
-    </p:extLst>
-  </p:cSld>
-  <p:clrMapOvr>
-    <a:masterClrMapping/>
-  </p:clrMapOvr>
-</p:sld>
-</file>
-
-<file path=ppt/slides/slide20.xml><?xml version="1.0" encoding="utf-8"?>
+<file path=ppt/slides/slide19.xml><?xml version="1.0" encoding="utf-8"?>
 <p:sld xmlns:a="http://schemas.openxmlformats.org/drawingml/2006/main" xmlns:r="http://schemas.openxmlformats.org/officeDocument/2006/relationships" xmlns:p="http://schemas.openxmlformats.org/presentationml/2006/main">
   <p:cSld>
     <p:spTree>
@@ -11510,7 +10482,195 @@
 </p:sld>
 </file>
 
-<file path=ppt/slides/slide21.xml><?xml version="1.0" encoding="utf-8"?>
+<file path=ppt/slides/slide2.xml><?xml version="1.0" encoding="utf-8"?>
+<p:sld xmlns:a="http://schemas.openxmlformats.org/drawingml/2006/main" xmlns:r="http://schemas.openxmlformats.org/officeDocument/2006/relationships" xmlns:p="http://schemas.openxmlformats.org/presentationml/2006/main">
+  <p:cSld>
+    <p:spTree>
+      <p:nvGrpSpPr>
+        <p:cNvPr id="1" name=""/>
+        <p:cNvGrpSpPr/>
+        <p:nvPr/>
+      </p:nvGrpSpPr>
+      <p:grpSpPr>
+        <a:xfrm>
+          <a:off x="0" y="0"/>
+          <a:ext cx="0" cy="0"/>
+          <a:chOff x="0" y="0"/>
+          <a:chExt cx="0" cy="0"/>
+        </a:xfrm>
+      </p:grpSpPr>
+      <p:sp>
+        <p:nvSpPr>
+          <p:cNvPr id="2" name="Title 1">
+            <a:extLst>
+              <a:ext uri="{FF2B5EF4-FFF2-40B4-BE49-F238E27FC236}">
+                <a16:creationId xmlns:a16="http://schemas.microsoft.com/office/drawing/2014/main" id="{C052B02A-6D2C-8593-D1D2-0F7F93D99A00}"/>
+              </a:ext>
+            </a:extLst>
+          </p:cNvPr>
+          <p:cNvSpPr>
+            <a:spLocks noGrp="1"/>
+          </p:cNvSpPr>
+          <p:nvPr>
+            <p:ph type="title"/>
+          </p:nvPr>
+        </p:nvSpPr>
+        <p:spPr/>
+        <p:txBody>
+          <a:bodyPr/>
+          <a:lstStyle/>
+          <a:p>
+            <a:r>
+              <a:rPr lang="en-BE" dirty="0"/>
+              <a:t>Announcements</a:t>
+            </a:r>
+          </a:p>
+        </p:txBody>
+      </p:sp>
+      <p:sp>
+        <p:nvSpPr>
+          <p:cNvPr id="3" name="Content Placeholder 2">
+            <a:extLst>
+              <a:ext uri="{FF2B5EF4-FFF2-40B4-BE49-F238E27FC236}">
+                <a16:creationId xmlns:a16="http://schemas.microsoft.com/office/drawing/2014/main" id="{0ADB13C0-2F22-7B03-F87C-066C9440C4DF}"/>
+              </a:ext>
+            </a:extLst>
+          </p:cNvPr>
+          <p:cNvSpPr>
+            <a:spLocks noGrp="1"/>
+          </p:cNvSpPr>
+          <p:nvPr>
+            <p:ph idx="1"/>
+          </p:nvPr>
+        </p:nvSpPr>
+        <p:spPr/>
+        <p:txBody>
+          <a:bodyPr/>
+          <a:lstStyle/>
+          <a:p>
+            <a:r>
+              <a:rPr lang="en-BE" dirty="0"/>
+              <a:t>Submit your DP I Tomorrow on Canvas and pin the Google doc on Discord</a:t>
+            </a:r>
+          </a:p>
+          <a:p>
+            <a:r>
+              <a:rPr lang="en-BE" dirty="0"/>
+              <a:t>Focus on DP II and III – Its both team and individual</a:t>
+            </a:r>
+          </a:p>
+          <a:p>
+            <a:pPr lvl="1"/>
+            <a:r>
+              <a:rPr lang="en-BE" dirty="0"/>
+              <a:t>Individual 60%</a:t>
+            </a:r>
+          </a:p>
+          <a:p>
+            <a:pPr lvl="1"/>
+            <a:r>
+              <a:rPr lang="en-BE" dirty="0"/>
+              <a:t>Team 40%</a:t>
+            </a:r>
+          </a:p>
+        </p:txBody>
+      </p:sp>
+      <p:pic>
+        <p:nvPicPr>
+          <p:cNvPr id="5" name="Picture 4" descr="A screenshot of a computer&#10;&#10;AI-generated content may be incorrect.">
+            <a:extLst>
+              <a:ext uri="{FF2B5EF4-FFF2-40B4-BE49-F238E27FC236}">
+                <a16:creationId xmlns:a16="http://schemas.microsoft.com/office/drawing/2014/main" id="{295659BA-58C9-A0EC-85F5-73A7A2353F3F}"/>
+              </a:ext>
+            </a:extLst>
+          </p:cNvPr>
+          <p:cNvPicPr>
+            <a:picLocks noChangeAspect="1"/>
+          </p:cNvPicPr>
+          <p:nvPr/>
+        </p:nvPicPr>
+        <p:blipFill>
+          <a:blip r:embed="rId2"/>
+          <a:stretch>
+            <a:fillRect/>
+          </a:stretch>
+        </p:blipFill>
+        <p:spPr>
+          <a:xfrm>
+            <a:off x="838200" y="4001294"/>
+            <a:ext cx="7035800" cy="2540000"/>
+          </a:xfrm>
+          <a:prstGeom prst="rect">
+            <a:avLst/>
+          </a:prstGeom>
+          <a:solidFill>
+            <a:schemeClr val="tx1"/>
+          </a:solidFill>
+          <a:ln>
+            <a:solidFill>
+              <a:schemeClr val="tx1"/>
+            </a:solidFill>
+          </a:ln>
+        </p:spPr>
+      </p:pic>
+      <p:cxnSp>
+        <p:nvCxnSpPr>
+          <p:cNvPr id="7" name="Straight Arrow Connector 6">
+            <a:extLst>
+              <a:ext uri="{FF2B5EF4-FFF2-40B4-BE49-F238E27FC236}">
+                <a16:creationId xmlns:a16="http://schemas.microsoft.com/office/drawing/2014/main" id="{E83B6E9F-AEB4-0930-EE64-B16D90017A21}"/>
+              </a:ext>
+            </a:extLst>
+          </p:cNvPr>
+          <p:cNvCxnSpPr>
+            <a:cxnSpLocks/>
+          </p:cNvCxnSpPr>
+          <p:nvPr/>
+        </p:nvCxnSpPr>
+        <p:spPr>
+          <a:xfrm flipH="1">
+            <a:off x="4476998" y="5983814"/>
+            <a:ext cx="3028207" cy="0"/>
+          </a:xfrm>
+          <a:prstGeom prst="straightConnector1">
+            <a:avLst/>
+          </a:prstGeom>
+          <a:ln w="57150">
+            <a:solidFill>
+              <a:schemeClr val="tx1"/>
+            </a:solidFill>
+            <a:tailEnd type="triangle"/>
+          </a:ln>
+        </p:spPr>
+        <p:style>
+          <a:lnRef idx="1">
+            <a:schemeClr val="accent1"/>
+          </a:lnRef>
+          <a:fillRef idx="0">
+            <a:schemeClr val="accent1"/>
+          </a:fillRef>
+          <a:effectRef idx="0">
+            <a:schemeClr val="accent1"/>
+          </a:effectRef>
+          <a:fontRef idx="minor">
+            <a:schemeClr val="tx1"/>
+          </a:fontRef>
+        </p:style>
+      </p:cxnSp>
+    </p:spTree>
+    <p:extLst>
+      <p:ext uri="{BB962C8B-B14F-4D97-AF65-F5344CB8AC3E}">
+        <p14:creationId xmlns:p14="http://schemas.microsoft.com/office/powerpoint/2010/main" val="2495615062"/>
+      </p:ext>
+    </p:extLst>
+  </p:cSld>
+  <p:clrMapOvr>
+    <a:masterClrMapping/>
+  </p:clrMapOvr>
+</p:sld>
+</file>
+
+<file path=ppt/slides/slide20.xml><?xml version="1.0" encoding="utf-8"?>
 <p:sld xmlns:a="http://schemas.openxmlformats.org/drawingml/2006/main" xmlns:r="http://schemas.openxmlformats.org/officeDocument/2006/relationships" xmlns:p="http://schemas.openxmlformats.org/presentationml/2006/main">
   <p:cSld>
     <p:spTree>
@@ -11876,7 +11036,7 @@
 </p:sld>
 </file>
 
-<file path=ppt/slides/slide22.xml><?xml version="1.0" encoding="utf-8"?>
+<file path=ppt/slides/slide21.xml><?xml version="1.0" encoding="utf-8"?>
 <p:sld xmlns:a="http://schemas.openxmlformats.org/drawingml/2006/main" xmlns:r="http://schemas.openxmlformats.org/officeDocument/2006/relationships" xmlns:p="http://schemas.openxmlformats.org/presentationml/2006/main">
   <p:cSld>
     <p:spTree>
@@ -12413,7 +11573,7 @@
 </p:sld>
 </file>
 
-<file path=ppt/slides/slide23.xml><?xml version="1.0" encoding="utf-8"?>
+<file path=ppt/slides/slide22.xml><?xml version="1.0" encoding="utf-8"?>
 <p:sld xmlns:a="http://schemas.openxmlformats.org/drawingml/2006/main" xmlns:r="http://schemas.openxmlformats.org/officeDocument/2006/relationships" xmlns:p="http://schemas.openxmlformats.org/presentationml/2006/main">
   <p:cSld>
     <p:spTree>
@@ -13206,7 +12366,7 @@
 </p:sld>
 </file>
 
-<file path=ppt/slides/slide24.xml><?xml version="1.0" encoding="utf-8"?>
+<file path=ppt/slides/slide23.xml><?xml version="1.0" encoding="utf-8"?>
 <p:sld xmlns:a="http://schemas.openxmlformats.org/drawingml/2006/main" xmlns:r="http://schemas.openxmlformats.org/officeDocument/2006/relationships" xmlns:p="http://schemas.openxmlformats.org/presentationml/2006/main">
   <p:cSld>
     <p:spTree>
@@ -14622,7 +13782,7 @@
 </p:sld>
 </file>
 
-<file path=ppt/slides/slide25.xml><?xml version="1.0" encoding="utf-8"?>
+<file path=ppt/slides/slide24.xml><?xml version="1.0" encoding="utf-8"?>
 <p:sld xmlns:a="http://schemas.openxmlformats.org/drawingml/2006/main" xmlns:r="http://schemas.openxmlformats.org/officeDocument/2006/relationships" xmlns:p="http://schemas.openxmlformats.org/presentationml/2006/main">
   <p:cSld>
     <p:spTree>
@@ -14843,7 +14003,7 @@
 </p:sld>
 </file>
 
-<file path=ppt/slides/slide26.xml><?xml version="1.0" encoding="utf-8"?>
+<file path=ppt/slides/slide25.xml><?xml version="1.0" encoding="utf-8"?>
 <p:sld xmlns:a="http://schemas.openxmlformats.org/drawingml/2006/main" xmlns:r="http://schemas.openxmlformats.org/officeDocument/2006/relationships" xmlns:p="http://schemas.openxmlformats.org/presentationml/2006/main">
   <p:cSld>
     <p:spTree>
@@ -15357,7 +14517,7 @@
 </p:sld>
 </file>
 
-<file path=ppt/slides/slide27.xml><?xml version="1.0" encoding="utf-8"?>
+<file path=ppt/slides/slide26.xml><?xml version="1.0" encoding="utf-8"?>
 <p:sld xmlns:a="http://schemas.openxmlformats.org/drawingml/2006/main" xmlns:r="http://schemas.openxmlformats.org/officeDocument/2006/relationships" xmlns:p="http://schemas.openxmlformats.org/presentationml/2006/main">
   <p:cSld>
     <p:spTree>
@@ -15663,7 +14823,7 @@
 </p:sld>
 </file>
 
-<file path=ppt/slides/slide28.xml><?xml version="1.0" encoding="utf-8"?>
+<file path=ppt/slides/slide27.xml><?xml version="1.0" encoding="utf-8"?>
 <p:sld xmlns:a="http://schemas.openxmlformats.org/drawingml/2006/main" xmlns:r="http://schemas.openxmlformats.org/officeDocument/2006/relationships" xmlns:p="http://schemas.openxmlformats.org/presentationml/2006/main">
   <p:cSld>
     <p:spTree>
@@ -16379,7 +15539,7 @@
 </p:sld>
 </file>
 
-<file path=ppt/slides/slide29.xml><?xml version="1.0" encoding="utf-8"?>
+<file path=ppt/slides/slide28.xml><?xml version="1.0" encoding="utf-8"?>
 <p:sld xmlns:a="http://schemas.openxmlformats.org/drawingml/2006/main" xmlns:r="http://schemas.openxmlformats.org/officeDocument/2006/relationships" xmlns:p="http://schemas.openxmlformats.org/presentationml/2006/main">
   <p:cSld>
     <p:spTree>
@@ -17735,105 +16895,7 @@
 </p:sld>
 </file>
 
-<file path=ppt/slides/slide3.xml><?xml version="1.0" encoding="utf-8"?>
-<p:sld xmlns:a="http://schemas.openxmlformats.org/drawingml/2006/main" xmlns:r="http://schemas.openxmlformats.org/officeDocument/2006/relationships" xmlns:p="http://schemas.openxmlformats.org/presentationml/2006/main">
-  <p:cSld>
-    <p:spTree>
-      <p:nvGrpSpPr>
-        <p:cNvPr id="1" name=""/>
-        <p:cNvGrpSpPr/>
-        <p:nvPr/>
-      </p:nvGrpSpPr>
-      <p:grpSpPr>
-        <a:xfrm>
-          <a:off x="0" y="0"/>
-          <a:ext cx="0" cy="0"/>
-          <a:chOff x="0" y="0"/>
-          <a:chExt cx="0" cy="0"/>
-        </a:xfrm>
-      </p:grpSpPr>
-      <p:sp>
-        <p:nvSpPr>
-          <p:cNvPr id="2" name="Title 1">
-            <a:extLst>
-              <a:ext uri="{FF2B5EF4-FFF2-40B4-BE49-F238E27FC236}">
-                <a16:creationId xmlns:a16="http://schemas.microsoft.com/office/drawing/2014/main" id="{122DE6B9-ED28-F606-E858-5664D6CD9749}"/>
-              </a:ext>
-            </a:extLst>
-          </p:cNvPr>
-          <p:cNvSpPr>
-            <a:spLocks noGrp="1"/>
-          </p:cNvSpPr>
-          <p:nvPr>
-            <p:ph type="title"/>
-          </p:nvPr>
-        </p:nvSpPr>
-        <p:spPr/>
-        <p:txBody>
-          <a:bodyPr/>
-          <a:lstStyle/>
-          <a:p>
-            <a:r>
-              <a:rPr lang="en-US" dirty="0"/>
-              <a:t>Senior Design Competition </a:t>
-            </a:r>
-          </a:p>
-        </p:txBody>
-      </p:sp>
-      <p:sp>
-        <p:nvSpPr>
-          <p:cNvPr id="3" name="Content Placeholder 2">
-            <a:extLst>
-              <a:ext uri="{FF2B5EF4-FFF2-40B4-BE49-F238E27FC236}">
-                <a16:creationId xmlns:a16="http://schemas.microsoft.com/office/drawing/2014/main" id="{B070E083-3CB0-9D6C-21AF-771AE53575F6}"/>
-              </a:ext>
-            </a:extLst>
-          </p:cNvPr>
-          <p:cNvSpPr>
-            <a:spLocks noGrp="1"/>
-          </p:cNvSpPr>
-          <p:nvPr>
-            <p:ph idx="1"/>
-          </p:nvPr>
-        </p:nvSpPr>
-        <p:spPr/>
-        <p:txBody>
-          <a:bodyPr/>
-          <a:lstStyle/>
-          <a:p>
-            <a:r>
-              <a:rPr lang="en-US" dirty="0">
-                <a:hlinkClick r:id="rId2"/>
-              </a:rPr>
-              <a:t>https://johnxu21.github.io/teaching/CS472/project/Competition/</a:t>
-            </a:r>
-            <a:r>
-              <a:rPr lang="en-US" dirty="0"/>
-              <a:t>?</a:t>
-            </a:r>
-          </a:p>
-          <a:p>
-            <a:endParaRPr lang="en-US" dirty="0"/>
-          </a:p>
-          <a:p>
-            <a:endParaRPr lang="en-US" dirty="0"/>
-          </a:p>
-        </p:txBody>
-      </p:sp>
-    </p:spTree>
-    <p:extLst>
-      <p:ext uri="{BB962C8B-B14F-4D97-AF65-F5344CB8AC3E}">
-        <p14:creationId xmlns:p14="http://schemas.microsoft.com/office/powerpoint/2010/main" val="1732481751"/>
-      </p:ext>
-    </p:extLst>
-  </p:cSld>
-  <p:clrMapOvr>
-    <a:masterClrMapping/>
-  </p:clrMapOvr>
-</p:sld>
-</file>
-
-<file path=ppt/slides/slide30.xml><?xml version="1.0" encoding="utf-8"?>
+<file path=ppt/slides/slide29.xml><?xml version="1.0" encoding="utf-8"?>
 <p:sld xmlns:a="http://schemas.openxmlformats.org/drawingml/2006/main" xmlns:r="http://schemas.openxmlformats.org/officeDocument/2006/relationships" xmlns:p="http://schemas.openxmlformats.org/presentationml/2006/main">
   <p:cSld>
     <p:spTree>
@@ -17993,7 +17055,7 @@
 </p:sld>
 </file>
 
-<file path=ppt/slides/slide4.xml><?xml version="1.0" encoding="utf-8"?>
+<file path=ppt/slides/slide3.xml><?xml version="1.0" encoding="utf-8"?>
 <p:sld xmlns:a="http://schemas.openxmlformats.org/drawingml/2006/main" xmlns:r="http://schemas.openxmlformats.org/officeDocument/2006/relationships" xmlns:p="http://schemas.openxmlformats.org/presentationml/2006/main">
   <p:cSld>
     <p:spTree>
@@ -18209,6 +17271,447 @@
 </p:sld>
 </file>
 
+<file path=ppt/slides/slide4.xml><?xml version="1.0" encoding="utf-8"?>
+<p:sld xmlns:a="http://schemas.openxmlformats.org/drawingml/2006/main" xmlns:r="http://schemas.openxmlformats.org/officeDocument/2006/relationships" xmlns:p="http://schemas.openxmlformats.org/presentationml/2006/main" show="0">
+  <p:cSld>
+    <p:spTree>
+      <p:nvGrpSpPr>
+        <p:cNvPr id="1" name="Shape 94"/>
+        <p:cNvGrpSpPr/>
+        <p:nvPr/>
+      </p:nvGrpSpPr>
+      <p:grpSpPr>
+        <a:xfrm>
+          <a:off x="0" y="0"/>
+          <a:ext cx="0" cy="0"/>
+          <a:chOff x="0" y="0"/>
+          <a:chExt cx="0" cy="0"/>
+        </a:xfrm>
+      </p:grpSpPr>
+      <p:sp>
+        <p:nvSpPr>
+          <p:cNvPr id="95" name="Google Shape;95;p2"/>
+          <p:cNvSpPr txBox="1">
+            <a:spLocks noGrp="1"/>
+          </p:cNvSpPr>
+          <p:nvPr>
+            <p:ph type="title"/>
+          </p:nvPr>
+        </p:nvSpPr>
+        <p:spPr>
+          <a:xfrm>
+            <a:off x="838200" y="365125"/>
+            <a:ext cx="10515600" cy="639427"/>
+          </a:xfrm>
+          <a:prstGeom prst="rect">
+            <a:avLst/>
+          </a:prstGeom>
+          <a:noFill/>
+          <a:ln>
+            <a:noFill/>
+          </a:ln>
+        </p:spPr>
+        <p:txBody>
+          <a:bodyPr spcFirstLastPara="1" wrap="square" lIns="91425" tIns="45700" rIns="91425" bIns="45700" anchor="ctr" anchorCtr="0">
+            <a:normAutofit fontScale="90000"/>
+          </a:bodyPr>
+          <a:lstStyle/>
+          <a:p>
+            <a:pPr marL="0" lvl="0" indent="0" algn="l" rtl="0">
+              <a:lnSpc>
+                <a:spcPct val="90000"/>
+              </a:lnSpc>
+              <a:spcBef>
+                <a:spcPts val="0"/>
+              </a:spcBef>
+              <a:spcAft>
+                <a:spcPts val="0"/>
+              </a:spcAft>
+              <a:buClr>
+                <a:schemeClr val="dk1"/>
+              </a:buClr>
+              <a:buSzPct val="100000"/>
+              <a:buFont typeface="Calibri"/>
+              <a:buNone/>
+            </a:pPr>
+            <a:r>
+              <a:rPr lang="en-GB" dirty="0"/>
+              <a:t>Software design questions</a:t>
+            </a:r>
+            <a:endParaRPr dirty="0"/>
+          </a:p>
+        </p:txBody>
+      </p:sp>
+      <p:sp>
+        <p:nvSpPr>
+          <p:cNvPr id="96" name="Google Shape;96;p2"/>
+          <p:cNvSpPr txBox="1">
+            <a:spLocks noGrp="1"/>
+          </p:cNvSpPr>
+          <p:nvPr>
+            <p:ph type="body" idx="1"/>
+          </p:nvPr>
+        </p:nvSpPr>
+        <p:spPr>
+          <a:xfrm>
+            <a:off x="838200" y="1457325"/>
+            <a:ext cx="10515600" cy="5200650"/>
+          </a:xfrm>
+          <a:prstGeom prst="rect">
+            <a:avLst/>
+          </a:prstGeom>
+          <a:noFill/>
+          <a:ln>
+            <a:noFill/>
+          </a:ln>
+        </p:spPr>
+        <p:txBody>
+          <a:bodyPr spcFirstLastPara="1" wrap="square" lIns="91425" tIns="45700" rIns="91425" bIns="45700" anchor="t" anchorCtr="0">
+            <a:normAutofit lnSpcReduction="10000"/>
+          </a:bodyPr>
+          <a:lstStyle/>
+          <a:p>
+            <a:pPr marL="0" lvl="0" indent="0" algn="l" rtl="0">
+              <a:lnSpc>
+                <a:spcPct val="90000"/>
+              </a:lnSpc>
+              <a:spcBef>
+                <a:spcPts val="0"/>
+              </a:spcBef>
+              <a:spcAft>
+                <a:spcPts val="0"/>
+              </a:spcAft>
+              <a:buClr>
+                <a:srgbClr val="166623"/>
+              </a:buClr>
+              <a:buSzPts val="2800"/>
+              <a:buNone/>
+            </a:pPr>
+            <a:r>
+              <a:rPr lang="en-GB" b="1" i="0" dirty="0">
+                <a:solidFill>
+                  <a:srgbClr val="1F1F1F"/>
+                </a:solidFill>
+                <a:latin typeface="Source Sans Pro"/>
+                <a:ea typeface="Source Sans Pro"/>
+                <a:cs typeface="Source Sans Pro"/>
+                <a:sym typeface="Source Sans Pro"/>
+              </a:rPr>
+              <a:t>Take a minute and think of the projects that you worked on</a:t>
+            </a:r>
+          </a:p>
+          <a:p>
+            <a:pPr marL="0" lvl="0" indent="0" algn="l" rtl="0">
+              <a:lnSpc>
+                <a:spcPct val="90000"/>
+              </a:lnSpc>
+              <a:spcBef>
+                <a:spcPts val="0"/>
+              </a:spcBef>
+              <a:spcAft>
+                <a:spcPts val="0"/>
+              </a:spcAft>
+              <a:buClr>
+                <a:srgbClr val="166623"/>
+              </a:buClr>
+              <a:buSzPts val="2800"/>
+              <a:buNone/>
+            </a:pPr>
+            <a:endParaRPr lang="en-GB" b="0" i="0" dirty="0">
+              <a:latin typeface="Source Sans Pro"/>
+              <a:ea typeface="Source Sans Pro"/>
+              <a:cs typeface="Source Sans Pro"/>
+              <a:sym typeface="Source Sans Pro"/>
+            </a:endParaRPr>
+          </a:p>
+          <a:p>
+            <a:pPr marL="228600" lvl="0" indent="-228600" algn="l" rtl="0">
+              <a:lnSpc>
+                <a:spcPct val="90000"/>
+              </a:lnSpc>
+              <a:spcBef>
+                <a:spcPts val="0"/>
+              </a:spcBef>
+              <a:spcAft>
+                <a:spcPts val="0"/>
+              </a:spcAft>
+              <a:buClr>
+                <a:srgbClr val="166623"/>
+              </a:buClr>
+              <a:buSzPts val="2800"/>
+              <a:buChar char="•"/>
+            </a:pPr>
+            <a:r>
+              <a:rPr lang="en-GB" b="0" i="0" dirty="0">
+                <a:latin typeface="Source Sans Pro"/>
+                <a:ea typeface="Source Sans Pro"/>
+                <a:cs typeface="Source Sans Pro"/>
+                <a:sym typeface="Source Sans Pro"/>
+              </a:rPr>
+              <a:t>Did they have a good design? </a:t>
+            </a:r>
+            <a:endParaRPr dirty="0"/>
+          </a:p>
+          <a:p>
+            <a:pPr marL="228600" lvl="0" indent="-228600" algn="l" rtl="0">
+              <a:lnSpc>
+                <a:spcPct val="90000"/>
+              </a:lnSpc>
+              <a:spcBef>
+                <a:spcPts val="1000"/>
+              </a:spcBef>
+              <a:spcAft>
+                <a:spcPts val="0"/>
+              </a:spcAft>
+              <a:buClr>
+                <a:srgbClr val="166623"/>
+              </a:buClr>
+              <a:buSzPts val="2800"/>
+              <a:buChar char="•"/>
+            </a:pPr>
+            <a:r>
+              <a:rPr lang="en-GB" b="0" i="0" dirty="0">
+                <a:latin typeface="Source Sans Pro"/>
+                <a:ea typeface="Source Sans Pro"/>
+                <a:cs typeface="Source Sans Pro"/>
+                <a:sym typeface="Source Sans Pro"/>
+              </a:rPr>
+              <a:t>Could the design be done better? </a:t>
+            </a:r>
+            <a:endParaRPr b="0" i="0" dirty="0">
+              <a:latin typeface="Open Sans"/>
+              <a:ea typeface="Open Sans"/>
+              <a:cs typeface="Open Sans"/>
+              <a:sym typeface="Open Sans"/>
+            </a:endParaRPr>
+          </a:p>
+          <a:p>
+            <a:pPr marL="228600" lvl="0" indent="-228600" algn="l" rtl="0">
+              <a:lnSpc>
+                <a:spcPct val="90000"/>
+              </a:lnSpc>
+              <a:spcBef>
+                <a:spcPts val="1000"/>
+              </a:spcBef>
+              <a:spcAft>
+                <a:spcPts val="0"/>
+              </a:spcAft>
+              <a:buClr>
+                <a:srgbClr val="166623"/>
+              </a:buClr>
+              <a:buSzPts val="2800"/>
+              <a:buChar char="•"/>
+            </a:pPr>
+            <a:r>
+              <a:rPr lang="en-GB" b="0" i="0" dirty="0">
+                <a:latin typeface="Source Sans Pro"/>
+                <a:ea typeface="Source Sans Pro"/>
+                <a:cs typeface="Source Sans Pro"/>
+                <a:sym typeface="Source Sans Pro"/>
+              </a:rPr>
+              <a:t>Was there even a design at all? </a:t>
+            </a:r>
+            <a:endParaRPr b="0" i="0" dirty="0">
+              <a:latin typeface="Open Sans"/>
+              <a:ea typeface="Open Sans"/>
+              <a:cs typeface="Open Sans"/>
+              <a:sym typeface="Open Sans"/>
+            </a:endParaRPr>
+          </a:p>
+          <a:p>
+            <a:pPr marL="228600" lvl="0" indent="-228600" algn="l" rtl="0">
+              <a:lnSpc>
+                <a:spcPct val="90000"/>
+              </a:lnSpc>
+              <a:spcBef>
+                <a:spcPts val="1000"/>
+              </a:spcBef>
+              <a:spcAft>
+                <a:spcPts val="0"/>
+              </a:spcAft>
+              <a:buClr>
+                <a:srgbClr val="166623"/>
+              </a:buClr>
+              <a:buSzPts val="2800"/>
+              <a:buChar char="•"/>
+            </a:pPr>
+            <a:r>
+              <a:rPr lang="en-GB" b="0" i="0" dirty="0">
+                <a:latin typeface="Source Sans Pro"/>
+                <a:ea typeface="Source Sans Pro"/>
+                <a:cs typeface="Source Sans Pro"/>
+                <a:sym typeface="Source Sans Pro"/>
+              </a:rPr>
+              <a:t>How do you know if the software was well-designed? </a:t>
+            </a:r>
+            <a:endParaRPr b="0" i="0" dirty="0">
+              <a:latin typeface="Open Sans"/>
+              <a:ea typeface="Open Sans"/>
+              <a:cs typeface="Open Sans"/>
+              <a:sym typeface="Open Sans"/>
+            </a:endParaRPr>
+          </a:p>
+          <a:p>
+            <a:pPr marL="228600" lvl="0" indent="-228600" algn="l" rtl="0">
+              <a:lnSpc>
+                <a:spcPct val="90000"/>
+              </a:lnSpc>
+              <a:spcBef>
+                <a:spcPts val="1000"/>
+              </a:spcBef>
+              <a:spcAft>
+                <a:spcPts val="0"/>
+              </a:spcAft>
+              <a:buClr>
+                <a:srgbClr val="166623"/>
+              </a:buClr>
+              <a:buSzPts val="2800"/>
+              <a:buChar char="•"/>
+            </a:pPr>
+            <a:r>
+              <a:rPr lang="en-GB" b="0" i="0" dirty="0">
+                <a:latin typeface="Source Sans Pro"/>
+                <a:ea typeface="Source Sans Pro"/>
+                <a:cs typeface="Source Sans Pro"/>
+                <a:sym typeface="Source Sans Pro"/>
+              </a:rPr>
+              <a:t>Think of how easy it was to make changes to your code. </a:t>
+            </a:r>
+            <a:endParaRPr b="0" i="0" dirty="0">
+              <a:latin typeface="Open Sans"/>
+              <a:ea typeface="Open Sans"/>
+              <a:cs typeface="Open Sans"/>
+              <a:sym typeface="Open Sans"/>
+            </a:endParaRPr>
+          </a:p>
+          <a:p>
+            <a:pPr marL="228600" lvl="0" indent="-228600" algn="l" rtl="0">
+              <a:lnSpc>
+                <a:spcPct val="90000"/>
+              </a:lnSpc>
+              <a:spcBef>
+                <a:spcPts val="1000"/>
+              </a:spcBef>
+              <a:spcAft>
+                <a:spcPts val="0"/>
+              </a:spcAft>
+              <a:buClr>
+                <a:srgbClr val="166623"/>
+              </a:buClr>
+              <a:buSzPts val="2800"/>
+              <a:buChar char="•"/>
+            </a:pPr>
+            <a:r>
+              <a:rPr lang="en-GB" b="0" i="0" dirty="0">
+                <a:latin typeface="Source Sans Pro"/>
+                <a:ea typeface="Source Sans Pro"/>
+                <a:cs typeface="Source Sans Pro"/>
+                <a:sym typeface="Source Sans Pro"/>
+              </a:rPr>
+              <a:t>Did a small code change produce a ripple-effect for changes elsewhere in the code? </a:t>
+            </a:r>
+            <a:endParaRPr b="0" i="0" dirty="0">
+              <a:latin typeface="Open Sans"/>
+              <a:ea typeface="Open Sans"/>
+              <a:cs typeface="Open Sans"/>
+              <a:sym typeface="Open Sans"/>
+            </a:endParaRPr>
+          </a:p>
+          <a:p>
+            <a:pPr marL="228600" lvl="0" indent="-228600" algn="l" rtl="0">
+              <a:lnSpc>
+                <a:spcPct val="90000"/>
+              </a:lnSpc>
+              <a:spcBef>
+                <a:spcPts val="1000"/>
+              </a:spcBef>
+              <a:spcAft>
+                <a:spcPts val="0"/>
+              </a:spcAft>
+              <a:buClr>
+                <a:srgbClr val="166623"/>
+              </a:buClr>
+              <a:buSzPts val="2800"/>
+              <a:buChar char="•"/>
+            </a:pPr>
+            <a:r>
+              <a:rPr lang="en-GB" b="0" i="0" dirty="0">
+                <a:latin typeface="Source Sans Pro"/>
+                <a:ea typeface="Source Sans Pro"/>
+                <a:cs typeface="Source Sans Pro"/>
+                <a:sym typeface="Source Sans Pro"/>
+              </a:rPr>
+              <a:t>Was your code hard to reuse? </a:t>
+            </a:r>
+            <a:endParaRPr b="0" i="0" dirty="0">
+              <a:latin typeface="Open Sans"/>
+              <a:ea typeface="Open Sans"/>
+              <a:cs typeface="Open Sans"/>
+              <a:sym typeface="Open Sans"/>
+            </a:endParaRPr>
+          </a:p>
+          <a:p>
+            <a:pPr marL="228600" lvl="0" indent="-228600" algn="l" rtl="0">
+              <a:lnSpc>
+                <a:spcPct val="90000"/>
+              </a:lnSpc>
+              <a:spcBef>
+                <a:spcPts val="1000"/>
+              </a:spcBef>
+              <a:spcAft>
+                <a:spcPts val="0"/>
+              </a:spcAft>
+              <a:buClr>
+                <a:srgbClr val="166623"/>
+              </a:buClr>
+              <a:buSzPts val="2800"/>
+              <a:buChar char="•"/>
+            </a:pPr>
+            <a:r>
+              <a:rPr lang="en-GB" b="0" i="0" dirty="0">
+                <a:latin typeface="Source Sans Pro"/>
+                <a:ea typeface="Source Sans Pro"/>
+                <a:cs typeface="Source Sans Pro"/>
+                <a:sym typeface="Source Sans Pro"/>
+              </a:rPr>
+              <a:t>Was the software difficult to maintain after a release? </a:t>
+            </a:r>
+            <a:endParaRPr b="0" i="0" dirty="0">
+              <a:latin typeface="Open Sans"/>
+              <a:ea typeface="Open Sans"/>
+              <a:cs typeface="Open Sans"/>
+              <a:sym typeface="Open Sans"/>
+            </a:endParaRPr>
+          </a:p>
+          <a:p>
+            <a:pPr marL="228600" lvl="0" indent="-50800" algn="l" rtl="0">
+              <a:lnSpc>
+                <a:spcPct val="90000"/>
+              </a:lnSpc>
+              <a:spcBef>
+                <a:spcPts val="1000"/>
+              </a:spcBef>
+              <a:spcAft>
+                <a:spcPts val="0"/>
+              </a:spcAft>
+              <a:buClr>
+                <a:schemeClr val="dk1"/>
+              </a:buClr>
+              <a:buSzPts val="2800"/>
+              <a:buNone/>
+            </a:pPr>
+            <a:endParaRPr dirty="0"/>
+          </a:p>
+        </p:txBody>
+      </p:sp>
+    </p:spTree>
+  </p:cSld>
+  <p:clrMapOvr>
+    <a:masterClrMapping/>
+  </p:clrMapOvr>
+</p:sld>
+</file>
+
 <file path=ppt/slides/slide5.xml><?xml version="1.0" encoding="utf-8"?>
 <p:sld xmlns:a="http://schemas.openxmlformats.org/drawingml/2006/main" xmlns:r="http://schemas.openxmlformats.org/officeDocument/2006/relationships" xmlns:p="http://schemas.openxmlformats.org/presentationml/2006/main" show="0">
   <p:cSld>
@@ -18274,447 +17777,6 @@
             </a:pPr>
             <a:r>
               <a:rPr lang="en-GB" dirty="0"/>
-              <a:t>Software design questions</a:t>
-            </a:r>
-            <a:endParaRPr dirty="0"/>
-          </a:p>
-        </p:txBody>
-      </p:sp>
-      <p:sp>
-        <p:nvSpPr>
-          <p:cNvPr id="96" name="Google Shape;96;p2"/>
-          <p:cNvSpPr txBox="1">
-            <a:spLocks noGrp="1"/>
-          </p:cNvSpPr>
-          <p:nvPr>
-            <p:ph type="body" idx="1"/>
-          </p:nvPr>
-        </p:nvSpPr>
-        <p:spPr>
-          <a:xfrm>
-            <a:off x="838200" y="1457325"/>
-            <a:ext cx="10515600" cy="5200650"/>
-          </a:xfrm>
-          <a:prstGeom prst="rect">
-            <a:avLst/>
-          </a:prstGeom>
-          <a:noFill/>
-          <a:ln>
-            <a:noFill/>
-          </a:ln>
-        </p:spPr>
-        <p:txBody>
-          <a:bodyPr spcFirstLastPara="1" wrap="square" lIns="91425" tIns="45700" rIns="91425" bIns="45700" anchor="t" anchorCtr="0">
-            <a:normAutofit lnSpcReduction="10000"/>
-          </a:bodyPr>
-          <a:lstStyle/>
-          <a:p>
-            <a:pPr marL="0" lvl="0" indent="0" algn="l" rtl="0">
-              <a:lnSpc>
-                <a:spcPct val="90000"/>
-              </a:lnSpc>
-              <a:spcBef>
-                <a:spcPts val="0"/>
-              </a:spcBef>
-              <a:spcAft>
-                <a:spcPts val="0"/>
-              </a:spcAft>
-              <a:buClr>
-                <a:srgbClr val="166623"/>
-              </a:buClr>
-              <a:buSzPts val="2800"/>
-              <a:buNone/>
-            </a:pPr>
-            <a:r>
-              <a:rPr lang="en-GB" b="1" i="0" dirty="0">
-                <a:solidFill>
-                  <a:srgbClr val="1F1F1F"/>
-                </a:solidFill>
-                <a:latin typeface="Source Sans Pro"/>
-                <a:ea typeface="Source Sans Pro"/>
-                <a:cs typeface="Source Sans Pro"/>
-                <a:sym typeface="Source Sans Pro"/>
-              </a:rPr>
-              <a:t>Take a minute and think of the projects that you worked on</a:t>
-            </a:r>
-          </a:p>
-          <a:p>
-            <a:pPr marL="0" lvl="0" indent="0" algn="l" rtl="0">
-              <a:lnSpc>
-                <a:spcPct val="90000"/>
-              </a:lnSpc>
-              <a:spcBef>
-                <a:spcPts val="0"/>
-              </a:spcBef>
-              <a:spcAft>
-                <a:spcPts val="0"/>
-              </a:spcAft>
-              <a:buClr>
-                <a:srgbClr val="166623"/>
-              </a:buClr>
-              <a:buSzPts val="2800"/>
-              <a:buNone/>
-            </a:pPr>
-            <a:endParaRPr lang="en-GB" b="0" i="0" dirty="0">
-              <a:latin typeface="Source Sans Pro"/>
-              <a:ea typeface="Source Sans Pro"/>
-              <a:cs typeface="Source Sans Pro"/>
-              <a:sym typeface="Source Sans Pro"/>
-            </a:endParaRPr>
-          </a:p>
-          <a:p>
-            <a:pPr marL="228600" lvl="0" indent="-228600" algn="l" rtl="0">
-              <a:lnSpc>
-                <a:spcPct val="90000"/>
-              </a:lnSpc>
-              <a:spcBef>
-                <a:spcPts val="0"/>
-              </a:spcBef>
-              <a:spcAft>
-                <a:spcPts val="0"/>
-              </a:spcAft>
-              <a:buClr>
-                <a:srgbClr val="166623"/>
-              </a:buClr>
-              <a:buSzPts val="2800"/>
-              <a:buChar char="•"/>
-            </a:pPr>
-            <a:r>
-              <a:rPr lang="en-GB" b="0" i="0" dirty="0">
-                <a:latin typeface="Source Sans Pro"/>
-                <a:ea typeface="Source Sans Pro"/>
-                <a:cs typeface="Source Sans Pro"/>
-                <a:sym typeface="Source Sans Pro"/>
-              </a:rPr>
-              <a:t>Did they have a good design? </a:t>
-            </a:r>
-            <a:endParaRPr dirty="0"/>
-          </a:p>
-          <a:p>
-            <a:pPr marL="228600" lvl="0" indent="-228600" algn="l" rtl="0">
-              <a:lnSpc>
-                <a:spcPct val="90000"/>
-              </a:lnSpc>
-              <a:spcBef>
-                <a:spcPts val="1000"/>
-              </a:spcBef>
-              <a:spcAft>
-                <a:spcPts val="0"/>
-              </a:spcAft>
-              <a:buClr>
-                <a:srgbClr val="166623"/>
-              </a:buClr>
-              <a:buSzPts val="2800"/>
-              <a:buChar char="•"/>
-            </a:pPr>
-            <a:r>
-              <a:rPr lang="en-GB" b="0" i="0" dirty="0">
-                <a:latin typeface="Source Sans Pro"/>
-                <a:ea typeface="Source Sans Pro"/>
-                <a:cs typeface="Source Sans Pro"/>
-                <a:sym typeface="Source Sans Pro"/>
-              </a:rPr>
-              <a:t>Could the design be done better? </a:t>
-            </a:r>
-            <a:endParaRPr b="0" i="0" dirty="0">
-              <a:latin typeface="Open Sans"/>
-              <a:ea typeface="Open Sans"/>
-              <a:cs typeface="Open Sans"/>
-              <a:sym typeface="Open Sans"/>
-            </a:endParaRPr>
-          </a:p>
-          <a:p>
-            <a:pPr marL="228600" lvl="0" indent="-228600" algn="l" rtl="0">
-              <a:lnSpc>
-                <a:spcPct val="90000"/>
-              </a:lnSpc>
-              <a:spcBef>
-                <a:spcPts val="1000"/>
-              </a:spcBef>
-              <a:spcAft>
-                <a:spcPts val="0"/>
-              </a:spcAft>
-              <a:buClr>
-                <a:srgbClr val="166623"/>
-              </a:buClr>
-              <a:buSzPts val="2800"/>
-              <a:buChar char="•"/>
-            </a:pPr>
-            <a:r>
-              <a:rPr lang="en-GB" b="0" i="0" dirty="0">
-                <a:latin typeface="Source Sans Pro"/>
-                <a:ea typeface="Source Sans Pro"/>
-                <a:cs typeface="Source Sans Pro"/>
-                <a:sym typeface="Source Sans Pro"/>
-              </a:rPr>
-              <a:t>Was there even a design at all? </a:t>
-            </a:r>
-            <a:endParaRPr b="0" i="0" dirty="0">
-              <a:latin typeface="Open Sans"/>
-              <a:ea typeface="Open Sans"/>
-              <a:cs typeface="Open Sans"/>
-              <a:sym typeface="Open Sans"/>
-            </a:endParaRPr>
-          </a:p>
-          <a:p>
-            <a:pPr marL="228600" lvl="0" indent="-228600" algn="l" rtl="0">
-              <a:lnSpc>
-                <a:spcPct val="90000"/>
-              </a:lnSpc>
-              <a:spcBef>
-                <a:spcPts val="1000"/>
-              </a:spcBef>
-              <a:spcAft>
-                <a:spcPts val="0"/>
-              </a:spcAft>
-              <a:buClr>
-                <a:srgbClr val="166623"/>
-              </a:buClr>
-              <a:buSzPts val="2800"/>
-              <a:buChar char="•"/>
-            </a:pPr>
-            <a:r>
-              <a:rPr lang="en-GB" b="0" i="0" dirty="0">
-                <a:latin typeface="Source Sans Pro"/>
-                <a:ea typeface="Source Sans Pro"/>
-                <a:cs typeface="Source Sans Pro"/>
-                <a:sym typeface="Source Sans Pro"/>
-              </a:rPr>
-              <a:t>How do you know if the software was well-designed? </a:t>
-            </a:r>
-            <a:endParaRPr b="0" i="0" dirty="0">
-              <a:latin typeface="Open Sans"/>
-              <a:ea typeface="Open Sans"/>
-              <a:cs typeface="Open Sans"/>
-              <a:sym typeface="Open Sans"/>
-            </a:endParaRPr>
-          </a:p>
-          <a:p>
-            <a:pPr marL="228600" lvl="0" indent="-228600" algn="l" rtl="0">
-              <a:lnSpc>
-                <a:spcPct val="90000"/>
-              </a:lnSpc>
-              <a:spcBef>
-                <a:spcPts val="1000"/>
-              </a:spcBef>
-              <a:spcAft>
-                <a:spcPts val="0"/>
-              </a:spcAft>
-              <a:buClr>
-                <a:srgbClr val="166623"/>
-              </a:buClr>
-              <a:buSzPts val="2800"/>
-              <a:buChar char="•"/>
-            </a:pPr>
-            <a:r>
-              <a:rPr lang="en-GB" b="0" i="0" dirty="0">
-                <a:latin typeface="Source Sans Pro"/>
-                <a:ea typeface="Source Sans Pro"/>
-                <a:cs typeface="Source Sans Pro"/>
-                <a:sym typeface="Source Sans Pro"/>
-              </a:rPr>
-              <a:t>Think of how easy it was to make changes to your code. </a:t>
-            </a:r>
-            <a:endParaRPr b="0" i="0" dirty="0">
-              <a:latin typeface="Open Sans"/>
-              <a:ea typeface="Open Sans"/>
-              <a:cs typeface="Open Sans"/>
-              <a:sym typeface="Open Sans"/>
-            </a:endParaRPr>
-          </a:p>
-          <a:p>
-            <a:pPr marL="228600" lvl="0" indent="-228600" algn="l" rtl="0">
-              <a:lnSpc>
-                <a:spcPct val="90000"/>
-              </a:lnSpc>
-              <a:spcBef>
-                <a:spcPts val="1000"/>
-              </a:spcBef>
-              <a:spcAft>
-                <a:spcPts val="0"/>
-              </a:spcAft>
-              <a:buClr>
-                <a:srgbClr val="166623"/>
-              </a:buClr>
-              <a:buSzPts val="2800"/>
-              <a:buChar char="•"/>
-            </a:pPr>
-            <a:r>
-              <a:rPr lang="en-GB" b="0" i="0" dirty="0">
-                <a:latin typeface="Source Sans Pro"/>
-                <a:ea typeface="Source Sans Pro"/>
-                <a:cs typeface="Source Sans Pro"/>
-                <a:sym typeface="Source Sans Pro"/>
-              </a:rPr>
-              <a:t>Did a small code change produce a ripple-effect for changes elsewhere in the code? </a:t>
-            </a:r>
-            <a:endParaRPr b="0" i="0" dirty="0">
-              <a:latin typeface="Open Sans"/>
-              <a:ea typeface="Open Sans"/>
-              <a:cs typeface="Open Sans"/>
-              <a:sym typeface="Open Sans"/>
-            </a:endParaRPr>
-          </a:p>
-          <a:p>
-            <a:pPr marL="228600" lvl="0" indent="-228600" algn="l" rtl="0">
-              <a:lnSpc>
-                <a:spcPct val="90000"/>
-              </a:lnSpc>
-              <a:spcBef>
-                <a:spcPts val="1000"/>
-              </a:spcBef>
-              <a:spcAft>
-                <a:spcPts val="0"/>
-              </a:spcAft>
-              <a:buClr>
-                <a:srgbClr val="166623"/>
-              </a:buClr>
-              <a:buSzPts val="2800"/>
-              <a:buChar char="•"/>
-            </a:pPr>
-            <a:r>
-              <a:rPr lang="en-GB" b="0" i="0" dirty="0">
-                <a:latin typeface="Source Sans Pro"/>
-                <a:ea typeface="Source Sans Pro"/>
-                <a:cs typeface="Source Sans Pro"/>
-                <a:sym typeface="Source Sans Pro"/>
-              </a:rPr>
-              <a:t>Was your code hard to reuse? </a:t>
-            </a:r>
-            <a:endParaRPr b="0" i="0" dirty="0">
-              <a:latin typeface="Open Sans"/>
-              <a:ea typeface="Open Sans"/>
-              <a:cs typeface="Open Sans"/>
-              <a:sym typeface="Open Sans"/>
-            </a:endParaRPr>
-          </a:p>
-          <a:p>
-            <a:pPr marL="228600" lvl="0" indent="-228600" algn="l" rtl="0">
-              <a:lnSpc>
-                <a:spcPct val="90000"/>
-              </a:lnSpc>
-              <a:spcBef>
-                <a:spcPts val="1000"/>
-              </a:spcBef>
-              <a:spcAft>
-                <a:spcPts val="0"/>
-              </a:spcAft>
-              <a:buClr>
-                <a:srgbClr val="166623"/>
-              </a:buClr>
-              <a:buSzPts val="2800"/>
-              <a:buChar char="•"/>
-            </a:pPr>
-            <a:r>
-              <a:rPr lang="en-GB" b="0" i="0" dirty="0">
-                <a:latin typeface="Source Sans Pro"/>
-                <a:ea typeface="Source Sans Pro"/>
-                <a:cs typeface="Source Sans Pro"/>
-                <a:sym typeface="Source Sans Pro"/>
-              </a:rPr>
-              <a:t>Was the software difficult to maintain after a release? </a:t>
-            </a:r>
-            <a:endParaRPr b="0" i="0" dirty="0">
-              <a:latin typeface="Open Sans"/>
-              <a:ea typeface="Open Sans"/>
-              <a:cs typeface="Open Sans"/>
-              <a:sym typeface="Open Sans"/>
-            </a:endParaRPr>
-          </a:p>
-          <a:p>
-            <a:pPr marL="228600" lvl="0" indent="-50800" algn="l" rtl="0">
-              <a:lnSpc>
-                <a:spcPct val="90000"/>
-              </a:lnSpc>
-              <a:spcBef>
-                <a:spcPts val="1000"/>
-              </a:spcBef>
-              <a:spcAft>
-                <a:spcPts val="0"/>
-              </a:spcAft>
-              <a:buClr>
-                <a:schemeClr val="dk1"/>
-              </a:buClr>
-              <a:buSzPts val="2800"/>
-              <a:buNone/>
-            </a:pPr>
-            <a:endParaRPr dirty="0"/>
-          </a:p>
-        </p:txBody>
-      </p:sp>
-    </p:spTree>
-  </p:cSld>
-  <p:clrMapOvr>
-    <a:masterClrMapping/>
-  </p:clrMapOvr>
-</p:sld>
-</file>
-
-<file path=ppt/slides/slide6.xml><?xml version="1.0" encoding="utf-8"?>
-<p:sld xmlns:a="http://schemas.openxmlformats.org/drawingml/2006/main" xmlns:r="http://schemas.openxmlformats.org/officeDocument/2006/relationships" xmlns:p="http://schemas.openxmlformats.org/presentationml/2006/main" show="0">
-  <p:cSld>
-    <p:spTree>
-      <p:nvGrpSpPr>
-        <p:cNvPr id="1" name="Shape 94"/>
-        <p:cNvGrpSpPr/>
-        <p:nvPr/>
-      </p:nvGrpSpPr>
-      <p:grpSpPr>
-        <a:xfrm>
-          <a:off x="0" y="0"/>
-          <a:ext cx="0" cy="0"/>
-          <a:chOff x="0" y="0"/>
-          <a:chExt cx="0" cy="0"/>
-        </a:xfrm>
-      </p:grpSpPr>
-      <p:sp>
-        <p:nvSpPr>
-          <p:cNvPr id="95" name="Google Shape;95;p2"/>
-          <p:cNvSpPr txBox="1">
-            <a:spLocks noGrp="1"/>
-          </p:cNvSpPr>
-          <p:nvPr>
-            <p:ph type="title"/>
-          </p:nvPr>
-        </p:nvSpPr>
-        <p:spPr>
-          <a:xfrm>
-            <a:off x="838200" y="365125"/>
-            <a:ext cx="10515600" cy="639427"/>
-          </a:xfrm>
-          <a:prstGeom prst="rect">
-            <a:avLst/>
-          </a:prstGeom>
-          <a:noFill/>
-          <a:ln>
-            <a:noFill/>
-          </a:ln>
-        </p:spPr>
-        <p:txBody>
-          <a:bodyPr spcFirstLastPara="1" wrap="square" lIns="91425" tIns="45700" rIns="91425" bIns="45700" anchor="ctr" anchorCtr="0">
-            <a:normAutofit fontScale="90000"/>
-          </a:bodyPr>
-          <a:lstStyle/>
-          <a:p>
-            <a:pPr marL="0" lvl="0" indent="0" algn="l" rtl="0">
-              <a:lnSpc>
-                <a:spcPct val="90000"/>
-              </a:lnSpc>
-              <a:spcBef>
-                <a:spcPts val="0"/>
-              </a:spcBef>
-              <a:spcAft>
-                <a:spcPts val="0"/>
-              </a:spcAft>
-              <a:buClr>
-                <a:schemeClr val="dk1"/>
-              </a:buClr>
-              <a:buSzPct val="100000"/>
-              <a:buFont typeface="Calibri"/>
-              <a:buNone/>
-            </a:pPr>
-            <a:r>
-              <a:rPr lang="en-GB" dirty="0"/>
               <a:t>The Design Process Questions</a:t>
             </a:r>
             <a:endParaRPr dirty="0"/>
@@ -18944,7 +18006,7 @@
 </p:sld>
 </file>
 
-<file path=ppt/slides/slide7.xml><?xml version="1.0" encoding="utf-8"?>
+<file path=ppt/slides/slide6.xml><?xml version="1.0" encoding="utf-8"?>
 <p:sld xmlns:a="http://schemas.openxmlformats.org/drawingml/2006/main" xmlns:r="http://schemas.openxmlformats.org/officeDocument/2006/relationships" xmlns:p="http://schemas.openxmlformats.org/presentationml/2006/main">
   <p:cSld>
     <p:spTree>
@@ -19005,7 +18067,7 @@
                 <a:cs typeface="Calibri"/>
                 <a:sym typeface="Calibri"/>
               </a:rPr>
-              <a:t>7</a:t>
+              <a:t>6</a:t>
             </a:fld>
             <a:endParaRPr sz="1200" b="0" u="none">
               <a:solidFill>
@@ -19219,7 +18281,7 @@
 </p:sld>
 </file>
 
-<file path=ppt/slides/slide8.xml><?xml version="1.0" encoding="utf-8"?>
+<file path=ppt/slides/slide7.xml><?xml version="1.0" encoding="utf-8"?>
 <p:sld xmlns:a="http://schemas.openxmlformats.org/drawingml/2006/main" xmlns:r="http://schemas.openxmlformats.org/officeDocument/2006/relationships" xmlns:p="http://schemas.openxmlformats.org/presentationml/2006/main">
   <p:cSld>
     <p:spTree>
@@ -20159,7 +19221,7 @@
 </p:sld>
 </file>
 
-<file path=ppt/slides/slide9.xml><?xml version="1.0" encoding="utf-8"?>
+<file path=ppt/slides/slide8.xml><?xml version="1.0" encoding="utf-8"?>
 <p:sld xmlns:a="http://schemas.openxmlformats.org/drawingml/2006/main" xmlns:r="http://schemas.openxmlformats.org/officeDocument/2006/relationships" xmlns:p="http://schemas.openxmlformats.org/presentationml/2006/main">
   <p:cSld>
     <p:spTree>
@@ -20736,6 +19798,992 @@
       <p:bldP spid="5" grpId="0" animBg="1"/>
     </p:bldLst>
   </p:timing>
+</p:sld>
+</file>
+
+<file path=ppt/slides/slide9.xml><?xml version="1.0" encoding="utf-8"?>
+<p:sld xmlns:a="http://schemas.openxmlformats.org/drawingml/2006/main" xmlns:r="http://schemas.openxmlformats.org/officeDocument/2006/relationships" xmlns:p="http://schemas.openxmlformats.org/presentationml/2006/main" show="0">
+  <p:cSld>
+    <p:spTree>
+      <p:nvGrpSpPr>
+        <p:cNvPr id="1" name=""/>
+        <p:cNvGrpSpPr/>
+        <p:nvPr/>
+      </p:nvGrpSpPr>
+      <p:grpSpPr>
+        <a:xfrm>
+          <a:off x="0" y="0"/>
+          <a:ext cx="0" cy="0"/>
+          <a:chOff x="0" y="0"/>
+          <a:chExt cx="0" cy="0"/>
+        </a:xfrm>
+      </p:grpSpPr>
+      <p:sp>
+        <p:nvSpPr>
+          <p:cNvPr id="2" name="Title 1">
+            <a:extLst>
+              <a:ext uri="{FF2B5EF4-FFF2-40B4-BE49-F238E27FC236}">
+                <a16:creationId xmlns:a16="http://schemas.microsoft.com/office/drawing/2014/main" id="{4A1894D3-33A2-4B7A-5A7D-BE8BF8C4A8B9}"/>
+              </a:ext>
+            </a:extLst>
+          </p:cNvPr>
+          <p:cNvSpPr>
+            <a:spLocks noGrp="1"/>
+          </p:cNvSpPr>
+          <p:nvPr>
+            <p:ph type="title"/>
+          </p:nvPr>
+        </p:nvSpPr>
+        <p:spPr>
+          <a:xfrm>
+            <a:off x="838200" y="365126"/>
+            <a:ext cx="10515600" cy="763588"/>
+          </a:xfrm>
+        </p:spPr>
+        <p:txBody>
+          <a:bodyPr/>
+          <a:lstStyle/>
+          <a:p>
+            <a:r>
+              <a:rPr lang="en-US" dirty="0"/>
+              <a:t>Conceptual Design vs Technical Design</a:t>
+            </a:r>
+          </a:p>
+        </p:txBody>
+      </p:sp>
+      <p:graphicFrame>
+        <p:nvGraphicFramePr>
+          <p:cNvPr id="4" name="Table 3">
+            <a:extLst>
+              <a:ext uri="{FF2B5EF4-FFF2-40B4-BE49-F238E27FC236}">
+                <a16:creationId xmlns:a16="http://schemas.microsoft.com/office/drawing/2014/main" id="{18847EB7-C485-502A-03A5-AF2233818998}"/>
+              </a:ext>
+            </a:extLst>
+          </p:cNvPr>
+          <p:cNvGraphicFramePr>
+            <a:graphicFrameLocks noGrp="1"/>
+          </p:cNvGraphicFramePr>
+          <p:nvPr>
+            <p:extLst>
+              <p:ext uri="{D42A27DB-BD31-4B8C-83A1-F6EECF244321}">
+                <p14:modId xmlns:p14="http://schemas.microsoft.com/office/powerpoint/2010/main" val="2628271176"/>
+              </p:ext>
+            </p:extLst>
+          </p:nvPr>
+        </p:nvGraphicFramePr>
+        <p:xfrm>
+          <a:off x="838200" y="1563686"/>
+          <a:ext cx="10215562" cy="4773640"/>
+        </p:xfrm>
+        <a:graphic>
+          <a:graphicData uri="http://schemas.openxmlformats.org/drawingml/2006/table">
+            <a:tbl>
+              <a:tblPr/>
+              <a:tblGrid>
+                <a:gridCol w="5107781">
+                  <a:extLst>
+                    <a:ext uri="{9D8B030D-6E8A-4147-A177-3AD203B41FA5}">
+                      <a16:colId xmlns:a16="http://schemas.microsoft.com/office/drawing/2014/main" val="1061370426"/>
+                    </a:ext>
+                  </a:extLst>
+                </a:gridCol>
+                <a:gridCol w="5107781">
+                  <a:extLst>
+                    <a:ext uri="{9D8B030D-6E8A-4147-A177-3AD203B41FA5}">
+                      <a16:colId xmlns:a16="http://schemas.microsoft.com/office/drawing/2014/main" val="3355039544"/>
+                    </a:ext>
+                  </a:extLst>
+                </a:gridCol>
+              </a:tblGrid>
+              <a:tr h="355211">
+                <a:tc>
+                  <a:txBody>
+                    <a:bodyPr/>
+                    <a:lstStyle/>
+                    <a:p>
+                      <a:pPr fontAlgn="b"/>
+                      <a:r>
+                        <a:rPr lang="en-GB" sz="2000" b="1" dirty="0">
+                          <a:solidFill>
+                            <a:schemeClr val="tx1"/>
+                          </a:solidFill>
+                          <a:effectLst/>
+                        </a:rPr>
+                        <a:t>Conceptual Design</a:t>
+                      </a:r>
+                    </a:p>
+                  </a:txBody>
+                  <a:tcPr marL="88803" marR="88803" marT="44401" marB="44401" anchor="b">
+                    <a:lnL w="9525" cap="flat" cmpd="sng" algn="ctr">
+                      <a:solidFill>
+                        <a:srgbClr val="E3E3E3"/>
+                      </a:solidFill>
+                      <a:prstDash val="solid"/>
+                      <a:round/>
+                      <a:headEnd type="none" w="med" len="med"/>
+                      <a:tailEnd type="none" w="med" len="med"/>
+                    </a:lnL>
+                    <a:lnR w="9525" cap="flat" cmpd="sng" algn="ctr">
+                      <a:solidFill>
+                        <a:srgbClr val="E3E3E3"/>
+                      </a:solidFill>
+                      <a:prstDash val="solid"/>
+                      <a:round/>
+                      <a:headEnd type="none" w="med" len="med"/>
+                      <a:tailEnd type="none" w="med" len="med"/>
+                    </a:lnR>
+                    <a:lnT w="9525" cap="flat" cmpd="sng" algn="ctr">
+                      <a:solidFill>
+                        <a:srgbClr val="E3E3E3"/>
+                      </a:solidFill>
+                      <a:prstDash val="solid"/>
+                      <a:round/>
+                      <a:headEnd type="none" w="med" len="med"/>
+                      <a:tailEnd type="none" w="med" len="med"/>
+                    </a:lnT>
+                    <a:lnB w="12700" cap="flat" cmpd="sng" algn="ctr">
+                      <a:solidFill>
+                        <a:srgbClr val="E3E3E3"/>
+                      </a:solidFill>
+                      <a:prstDash val="solid"/>
+                      <a:round/>
+                      <a:headEnd type="none" w="med" len="med"/>
+                      <a:tailEnd type="none" w="med" len="med"/>
+                    </a:lnB>
+                    <a:solidFill>
+                      <a:srgbClr val="FFFFFF"/>
+                    </a:solidFill>
+                  </a:tcPr>
+                </a:tc>
+                <a:tc>
+                  <a:txBody>
+                    <a:bodyPr/>
+                    <a:lstStyle/>
+                    <a:p>
+                      <a:pPr fontAlgn="b"/>
+                      <a:r>
+                        <a:rPr lang="en-GB" sz="2000" b="1">
+                          <a:solidFill>
+                            <a:schemeClr val="tx1"/>
+                          </a:solidFill>
+                          <a:effectLst/>
+                        </a:rPr>
+                        <a:t>Technical Design</a:t>
+                      </a:r>
+                    </a:p>
+                  </a:txBody>
+                  <a:tcPr marL="88803" marR="88803" marT="44401" marB="44401" anchor="b">
+                    <a:lnL w="9525" cap="flat" cmpd="sng" algn="ctr">
+                      <a:solidFill>
+                        <a:srgbClr val="E3E3E3"/>
+                      </a:solidFill>
+                      <a:prstDash val="solid"/>
+                      <a:round/>
+                      <a:headEnd type="none" w="med" len="med"/>
+                      <a:tailEnd type="none" w="med" len="med"/>
+                    </a:lnL>
+                    <a:lnR w="9525" cap="flat" cmpd="sng" algn="ctr">
+                      <a:solidFill>
+                        <a:srgbClr val="E3E3E3"/>
+                      </a:solidFill>
+                      <a:prstDash val="solid"/>
+                      <a:round/>
+                      <a:headEnd type="none" w="med" len="med"/>
+                      <a:tailEnd type="none" w="med" len="med"/>
+                    </a:lnR>
+                    <a:lnT w="9525" cap="flat" cmpd="sng" algn="ctr">
+                      <a:solidFill>
+                        <a:srgbClr val="E3E3E3"/>
+                      </a:solidFill>
+                      <a:prstDash val="solid"/>
+                      <a:round/>
+                      <a:headEnd type="none" w="med" len="med"/>
+                      <a:tailEnd type="none" w="med" len="med"/>
+                    </a:lnT>
+                    <a:lnB w="12700" cap="flat" cmpd="sng" algn="ctr">
+                      <a:solidFill>
+                        <a:srgbClr val="E3E3E3"/>
+                      </a:solidFill>
+                      <a:prstDash val="solid"/>
+                      <a:round/>
+                      <a:headEnd type="none" w="med" len="med"/>
+                      <a:tailEnd type="none" w="med" len="med"/>
+                    </a:lnB>
+                    <a:solidFill>
+                      <a:srgbClr val="FFFFFF"/>
+                    </a:solidFill>
+                  </a:tcPr>
+                </a:tc>
+                <a:extLst>
+                  <a:ext uri="{0D108BD9-81ED-4DB2-BD59-A6C34878D82A}">
+                    <a16:rowId xmlns:a16="http://schemas.microsoft.com/office/drawing/2014/main" val="545554010"/>
+                  </a:ext>
+                </a:extLst>
+              </a:tr>
+              <a:tr h="888028">
+                <a:tc>
+                  <a:txBody>
+                    <a:bodyPr/>
+                    <a:lstStyle/>
+                    <a:p>
+                      <a:pPr fontAlgn="base"/>
+                      <a:r>
+                        <a:rPr lang="en-GB" sz="2000" dirty="0">
+                          <a:solidFill>
+                            <a:schemeClr val="tx1"/>
+                          </a:solidFill>
+                          <a:effectLst/>
+                        </a:rPr>
+                        <a:t>Focuses on high-level ideas, goals, and requirements</a:t>
+                      </a:r>
+                    </a:p>
+                  </a:txBody>
+                  <a:tcPr marL="88803" marR="88803" marT="44401" marB="44401" anchor="ctr">
+                    <a:lnL w="9525" cap="flat" cmpd="sng" algn="ctr">
+                      <a:solidFill>
+                        <a:srgbClr val="E3E3E3"/>
+                      </a:solidFill>
+                      <a:prstDash val="solid"/>
+                      <a:round/>
+                      <a:headEnd type="none" w="med" len="med"/>
+                      <a:tailEnd type="none" w="med" len="med"/>
+                    </a:lnL>
+                    <a:lnR w="9525" cap="flat" cmpd="sng" algn="ctr">
+                      <a:solidFill>
+                        <a:srgbClr val="E3E3E3"/>
+                      </a:solidFill>
+                      <a:prstDash val="solid"/>
+                      <a:round/>
+                      <a:headEnd type="none" w="med" len="med"/>
+                      <a:tailEnd type="none" w="med" len="med"/>
+                    </a:lnR>
+                    <a:lnT w="12700" cap="flat" cmpd="sng" algn="ctr">
+                      <a:solidFill>
+                        <a:srgbClr val="E3E3E3"/>
+                      </a:solidFill>
+                      <a:prstDash val="solid"/>
+                      <a:round/>
+                      <a:headEnd type="none" w="med" len="med"/>
+                      <a:tailEnd type="none" w="med" len="med"/>
+                    </a:lnT>
+                    <a:lnB w="12700" cap="flat" cmpd="sng" algn="ctr">
+                      <a:solidFill>
+                        <a:srgbClr val="E3E3E3"/>
+                      </a:solidFill>
+                      <a:prstDash val="solid"/>
+                      <a:round/>
+                      <a:headEnd type="none" w="med" len="med"/>
+                      <a:tailEnd type="none" w="med" len="med"/>
+                    </a:lnB>
+                    <a:solidFill>
+                      <a:srgbClr val="FFFFFF"/>
+                    </a:solidFill>
+                  </a:tcPr>
+                </a:tc>
+                <a:tc>
+                  <a:txBody>
+                    <a:bodyPr/>
+                    <a:lstStyle/>
+                    <a:p>
+                      <a:pPr fontAlgn="base"/>
+                      <a:r>
+                        <a:rPr lang="en-GB" sz="2000">
+                          <a:solidFill>
+                            <a:schemeClr val="tx1"/>
+                          </a:solidFill>
+                          <a:effectLst/>
+                        </a:rPr>
+                        <a:t>Focuses on detailed specifications and implementation details</a:t>
+                      </a:r>
+                    </a:p>
+                  </a:txBody>
+                  <a:tcPr marL="88803" marR="88803" marT="44401" marB="44401" anchor="ctr">
+                    <a:lnL w="9525" cap="flat" cmpd="sng" algn="ctr">
+                      <a:solidFill>
+                        <a:srgbClr val="E3E3E3"/>
+                      </a:solidFill>
+                      <a:prstDash val="solid"/>
+                      <a:round/>
+                      <a:headEnd type="none" w="med" len="med"/>
+                      <a:tailEnd type="none" w="med" len="med"/>
+                    </a:lnL>
+                    <a:lnR w="9525" cap="flat" cmpd="sng" algn="ctr">
+                      <a:solidFill>
+                        <a:srgbClr val="E3E3E3"/>
+                      </a:solidFill>
+                      <a:prstDash val="solid"/>
+                      <a:round/>
+                      <a:headEnd type="none" w="med" len="med"/>
+                      <a:tailEnd type="none" w="med" len="med"/>
+                    </a:lnR>
+                    <a:lnT w="12700" cap="flat" cmpd="sng" algn="ctr">
+                      <a:solidFill>
+                        <a:srgbClr val="E3E3E3"/>
+                      </a:solidFill>
+                      <a:prstDash val="solid"/>
+                      <a:round/>
+                      <a:headEnd type="none" w="med" len="med"/>
+                      <a:tailEnd type="none" w="med" len="med"/>
+                    </a:lnT>
+                    <a:lnB w="12700" cap="flat" cmpd="sng" algn="ctr">
+                      <a:solidFill>
+                        <a:srgbClr val="E3E3E3"/>
+                      </a:solidFill>
+                      <a:prstDash val="solid"/>
+                      <a:round/>
+                      <a:headEnd type="none" w="med" len="med"/>
+                      <a:tailEnd type="none" w="med" len="med"/>
+                    </a:lnB>
+                    <a:solidFill>
+                      <a:srgbClr val="FFFFFF"/>
+                    </a:solidFill>
+                  </a:tcPr>
+                </a:tc>
+                <a:extLst>
+                  <a:ext uri="{0D108BD9-81ED-4DB2-BD59-A6C34878D82A}">
+                    <a16:rowId xmlns:a16="http://schemas.microsoft.com/office/drawing/2014/main" val="3821555425"/>
+                  </a:ext>
+                </a:extLst>
+              </a:tr>
+              <a:tr h="621620">
+                <a:tc>
+                  <a:txBody>
+                    <a:bodyPr/>
+                    <a:lstStyle/>
+                    <a:p>
+                      <a:pPr fontAlgn="base"/>
+                      <a:r>
+                        <a:rPr lang="en-GB" sz="2000" dirty="0">
+                          <a:solidFill>
+                            <a:schemeClr val="tx1"/>
+                          </a:solidFill>
+                          <a:effectLst/>
+                        </a:rPr>
+                        <a:t>Captures the essence and purpose of the system</a:t>
+                      </a:r>
+                    </a:p>
+                  </a:txBody>
+                  <a:tcPr marL="88803" marR="88803" marT="44401" marB="44401" anchor="ctr">
+                    <a:lnL w="9525" cap="flat" cmpd="sng" algn="ctr">
+                      <a:solidFill>
+                        <a:srgbClr val="E3E3E3"/>
+                      </a:solidFill>
+                      <a:prstDash val="solid"/>
+                      <a:round/>
+                      <a:headEnd type="none" w="med" len="med"/>
+                      <a:tailEnd type="none" w="med" len="med"/>
+                    </a:lnL>
+                    <a:lnR w="9525" cap="flat" cmpd="sng" algn="ctr">
+                      <a:solidFill>
+                        <a:srgbClr val="E3E3E3"/>
+                      </a:solidFill>
+                      <a:prstDash val="solid"/>
+                      <a:round/>
+                      <a:headEnd type="none" w="med" len="med"/>
+                      <a:tailEnd type="none" w="med" len="med"/>
+                    </a:lnR>
+                    <a:lnT w="12700" cap="flat" cmpd="sng" algn="ctr">
+                      <a:solidFill>
+                        <a:srgbClr val="E3E3E3"/>
+                      </a:solidFill>
+                      <a:prstDash val="solid"/>
+                      <a:round/>
+                      <a:headEnd type="none" w="med" len="med"/>
+                      <a:tailEnd type="none" w="med" len="med"/>
+                    </a:lnT>
+                    <a:lnB w="12700" cap="flat" cmpd="sng" algn="ctr">
+                      <a:solidFill>
+                        <a:srgbClr val="E3E3E3"/>
+                      </a:solidFill>
+                      <a:prstDash val="solid"/>
+                      <a:round/>
+                      <a:headEnd type="none" w="med" len="med"/>
+                      <a:tailEnd type="none" w="med" len="med"/>
+                    </a:lnB>
+                    <a:solidFill>
+                      <a:srgbClr val="FFFFFF"/>
+                    </a:solidFill>
+                  </a:tcPr>
+                </a:tc>
+                <a:tc>
+                  <a:txBody>
+                    <a:bodyPr/>
+                    <a:lstStyle/>
+                    <a:p>
+                      <a:pPr fontAlgn="base"/>
+                      <a:r>
+                        <a:rPr lang="en-GB" sz="2000">
+                          <a:solidFill>
+                            <a:schemeClr val="tx1"/>
+                          </a:solidFill>
+                          <a:effectLst/>
+                        </a:rPr>
+                        <a:t>Specifies how the system will be built and function</a:t>
+                      </a:r>
+                    </a:p>
+                  </a:txBody>
+                  <a:tcPr marL="88803" marR="88803" marT="44401" marB="44401" anchor="ctr">
+                    <a:lnL w="9525" cap="flat" cmpd="sng" algn="ctr">
+                      <a:solidFill>
+                        <a:srgbClr val="E3E3E3"/>
+                      </a:solidFill>
+                      <a:prstDash val="solid"/>
+                      <a:round/>
+                      <a:headEnd type="none" w="med" len="med"/>
+                      <a:tailEnd type="none" w="med" len="med"/>
+                    </a:lnL>
+                    <a:lnR w="9525" cap="flat" cmpd="sng" algn="ctr">
+                      <a:solidFill>
+                        <a:srgbClr val="E3E3E3"/>
+                      </a:solidFill>
+                      <a:prstDash val="solid"/>
+                      <a:round/>
+                      <a:headEnd type="none" w="med" len="med"/>
+                      <a:tailEnd type="none" w="med" len="med"/>
+                    </a:lnR>
+                    <a:lnT w="12700" cap="flat" cmpd="sng" algn="ctr">
+                      <a:solidFill>
+                        <a:srgbClr val="E3E3E3"/>
+                      </a:solidFill>
+                      <a:prstDash val="solid"/>
+                      <a:round/>
+                      <a:headEnd type="none" w="med" len="med"/>
+                      <a:tailEnd type="none" w="med" len="med"/>
+                    </a:lnT>
+                    <a:lnB w="12700" cap="flat" cmpd="sng" algn="ctr">
+                      <a:solidFill>
+                        <a:srgbClr val="E3E3E3"/>
+                      </a:solidFill>
+                      <a:prstDash val="solid"/>
+                      <a:round/>
+                      <a:headEnd type="none" w="med" len="med"/>
+                      <a:tailEnd type="none" w="med" len="med"/>
+                    </a:lnB>
+                    <a:solidFill>
+                      <a:srgbClr val="FFFFFF"/>
+                    </a:solidFill>
+                  </a:tcPr>
+                </a:tc>
+                <a:extLst>
+                  <a:ext uri="{0D108BD9-81ED-4DB2-BD59-A6C34878D82A}">
+                    <a16:rowId xmlns:a16="http://schemas.microsoft.com/office/drawing/2014/main" val="798187894"/>
+                  </a:ext>
+                </a:extLst>
+              </a:tr>
+              <a:tr h="621620">
+                <a:tc>
+                  <a:txBody>
+                    <a:bodyPr/>
+                    <a:lstStyle/>
+                    <a:p>
+                      <a:pPr fontAlgn="base"/>
+                      <a:r>
+                        <a:rPr lang="en-GB" sz="2000" dirty="0">
+                          <a:solidFill>
+                            <a:schemeClr val="tx1"/>
+                          </a:solidFill>
+                          <a:effectLst/>
+                        </a:rPr>
+                        <a:t>Emphasizes the "what" of the system</a:t>
+                      </a:r>
+                    </a:p>
+                  </a:txBody>
+                  <a:tcPr marL="88803" marR="88803" marT="44401" marB="44401" anchor="ctr">
+                    <a:lnL w="9525" cap="flat" cmpd="sng" algn="ctr">
+                      <a:solidFill>
+                        <a:srgbClr val="E3E3E3"/>
+                      </a:solidFill>
+                      <a:prstDash val="solid"/>
+                      <a:round/>
+                      <a:headEnd type="none" w="med" len="med"/>
+                      <a:tailEnd type="none" w="med" len="med"/>
+                    </a:lnL>
+                    <a:lnR w="9525" cap="flat" cmpd="sng" algn="ctr">
+                      <a:solidFill>
+                        <a:srgbClr val="E3E3E3"/>
+                      </a:solidFill>
+                      <a:prstDash val="solid"/>
+                      <a:round/>
+                      <a:headEnd type="none" w="med" len="med"/>
+                      <a:tailEnd type="none" w="med" len="med"/>
+                    </a:lnR>
+                    <a:lnT w="12700" cap="flat" cmpd="sng" algn="ctr">
+                      <a:solidFill>
+                        <a:srgbClr val="E3E3E3"/>
+                      </a:solidFill>
+                      <a:prstDash val="solid"/>
+                      <a:round/>
+                      <a:headEnd type="none" w="med" len="med"/>
+                      <a:tailEnd type="none" w="med" len="med"/>
+                    </a:lnT>
+                    <a:lnB w="12700" cap="flat" cmpd="sng" algn="ctr">
+                      <a:solidFill>
+                        <a:srgbClr val="E3E3E3"/>
+                      </a:solidFill>
+                      <a:prstDash val="solid"/>
+                      <a:round/>
+                      <a:headEnd type="none" w="med" len="med"/>
+                      <a:tailEnd type="none" w="med" len="med"/>
+                    </a:lnB>
+                    <a:solidFill>
+                      <a:srgbClr val="FFFFFF"/>
+                    </a:solidFill>
+                  </a:tcPr>
+                </a:tc>
+                <a:tc>
+                  <a:txBody>
+                    <a:bodyPr/>
+                    <a:lstStyle/>
+                    <a:p>
+                      <a:pPr fontAlgn="base"/>
+                      <a:r>
+                        <a:rPr lang="en-GB" sz="2000">
+                          <a:solidFill>
+                            <a:schemeClr val="tx1"/>
+                          </a:solidFill>
+                          <a:effectLst/>
+                        </a:rPr>
+                        <a:t>Emphasizes the "how" of implementing the system</a:t>
+                      </a:r>
+                    </a:p>
+                  </a:txBody>
+                  <a:tcPr marL="88803" marR="88803" marT="44401" marB="44401" anchor="ctr">
+                    <a:lnL w="9525" cap="flat" cmpd="sng" algn="ctr">
+                      <a:solidFill>
+                        <a:srgbClr val="E3E3E3"/>
+                      </a:solidFill>
+                      <a:prstDash val="solid"/>
+                      <a:round/>
+                      <a:headEnd type="none" w="med" len="med"/>
+                      <a:tailEnd type="none" w="med" len="med"/>
+                    </a:lnL>
+                    <a:lnR w="9525" cap="flat" cmpd="sng" algn="ctr">
+                      <a:solidFill>
+                        <a:srgbClr val="E3E3E3"/>
+                      </a:solidFill>
+                      <a:prstDash val="solid"/>
+                      <a:round/>
+                      <a:headEnd type="none" w="med" len="med"/>
+                      <a:tailEnd type="none" w="med" len="med"/>
+                    </a:lnR>
+                    <a:lnT w="12700" cap="flat" cmpd="sng" algn="ctr">
+                      <a:solidFill>
+                        <a:srgbClr val="E3E3E3"/>
+                      </a:solidFill>
+                      <a:prstDash val="solid"/>
+                      <a:round/>
+                      <a:headEnd type="none" w="med" len="med"/>
+                      <a:tailEnd type="none" w="med" len="med"/>
+                    </a:lnT>
+                    <a:lnB w="12700" cap="flat" cmpd="sng" algn="ctr">
+                      <a:solidFill>
+                        <a:srgbClr val="E3E3E3"/>
+                      </a:solidFill>
+                      <a:prstDash val="solid"/>
+                      <a:round/>
+                      <a:headEnd type="none" w="med" len="med"/>
+                      <a:tailEnd type="none" w="med" len="med"/>
+                    </a:lnB>
+                    <a:solidFill>
+                      <a:srgbClr val="FFFFFF"/>
+                    </a:solidFill>
+                  </a:tcPr>
+                </a:tc>
+                <a:extLst>
+                  <a:ext uri="{0D108BD9-81ED-4DB2-BD59-A6C34878D82A}">
+                    <a16:rowId xmlns:a16="http://schemas.microsoft.com/office/drawing/2014/main" val="2484308898"/>
+                  </a:ext>
+                </a:extLst>
+              </a:tr>
+              <a:tr h="621620">
+                <a:tc>
+                  <a:txBody>
+                    <a:bodyPr/>
+                    <a:lstStyle/>
+                    <a:p>
+                      <a:pPr fontAlgn="base"/>
+                      <a:r>
+                        <a:rPr lang="en-GB" sz="2000" dirty="0">
+                          <a:solidFill>
+                            <a:schemeClr val="tx1"/>
+                          </a:solidFill>
+                          <a:effectLst/>
+                        </a:rPr>
+                        <a:t>Typically expressed through diagrams and narratives</a:t>
+                      </a:r>
+                    </a:p>
+                  </a:txBody>
+                  <a:tcPr marL="88803" marR="88803" marT="44401" marB="44401" anchor="ctr">
+                    <a:lnL w="9525" cap="flat" cmpd="sng" algn="ctr">
+                      <a:solidFill>
+                        <a:srgbClr val="E3E3E3"/>
+                      </a:solidFill>
+                      <a:prstDash val="solid"/>
+                      <a:round/>
+                      <a:headEnd type="none" w="med" len="med"/>
+                      <a:tailEnd type="none" w="med" len="med"/>
+                    </a:lnL>
+                    <a:lnR w="9525" cap="flat" cmpd="sng" algn="ctr">
+                      <a:solidFill>
+                        <a:srgbClr val="E3E3E3"/>
+                      </a:solidFill>
+                      <a:prstDash val="solid"/>
+                      <a:round/>
+                      <a:headEnd type="none" w="med" len="med"/>
+                      <a:tailEnd type="none" w="med" len="med"/>
+                    </a:lnR>
+                    <a:lnT w="12700" cap="flat" cmpd="sng" algn="ctr">
+                      <a:solidFill>
+                        <a:srgbClr val="E3E3E3"/>
+                      </a:solidFill>
+                      <a:prstDash val="solid"/>
+                      <a:round/>
+                      <a:headEnd type="none" w="med" len="med"/>
+                      <a:tailEnd type="none" w="med" len="med"/>
+                    </a:lnT>
+                    <a:lnB w="12700" cap="flat" cmpd="sng" algn="ctr">
+                      <a:solidFill>
+                        <a:srgbClr val="E3E3E3"/>
+                      </a:solidFill>
+                      <a:prstDash val="solid"/>
+                      <a:round/>
+                      <a:headEnd type="none" w="med" len="med"/>
+                      <a:tailEnd type="none" w="med" len="med"/>
+                    </a:lnB>
+                    <a:solidFill>
+                      <a:srgbClr val="FFFFFF"/>
+                    </a:solidFill>
+                  </a:tcPr>
+                </a:tc>
+                <a:tc>
+                  <a:txBody>
+                    <a:bodyPr/>
+                    <a:lstStyle/>
+                    <a:p>
+                      <a:pPr fontAlgn="base"/>
+                      <a:r>
+                        <a:rPr lang="en-GB" sz="2000">
+                          <a:solidFill>
+                            <a:schemeClr val="tx1"/>
+                          </a:solidFill>
+                          <a:effectLst/>
+                        </a:rPr>
+                        <a:t>Typically expressed through diagrams and documentation</a:t>
+                      </a:r>
+                    </a:p>
+                  </a:txBody>
+                  <a:tcPr marL="88803" marR="88803" marT="44401" marB="44401" anchor="ctr">
+                    <a:lnL w="9525" cap="flat" cmpd="sng" algn="ctr">
+                      <a:solidFill>
+                        <a:srgbClr val="E3E3E3"/>
+                      </a:solidFill>
+                      <a:prstDash val="solid"/>
+                      <a:round/>
+                      <a:headEnd type="none" w="med" len="med"/>
+                      <a:tailEnd type="none" w="med" len="med"/>
+                    </a:lnL>
+                    <a:lnR w="9525" cap="flat" cmpd="sng" algn="ctr">
+                      <a:solidFill>
+                        <a:srgbClr val="E3E3E3"/>
+                      </a:solidFill>
+                      <a:prstDash val="solid"/>
+                      <a:round/>
+                      <a:headEnd type="none" w="med" len="med"/>
+                      <a:tailEnd type="none" w="med" len="med"/>
+                    </a:lnR>
+                    <a:lnT w="12700" cap="flat" cmpd="sng" algn="ctr">
+                      <a:solidFill>
+                        <a:srgbClr val="E3E3E3"/>
+                      </a:solidFill>
+                      <a:prstDash val="solid"/>
+                      <a:round/>
+                      <a:headEnd type="none" w="med" len="med"/>
+                      <a:tailEnd type="none" w="med" len="med"/>
+                    </a:lnT>
+                    <a:lnB w="12700" cap="flat" cmpd="sng" algn="ctr">
+                      <a:solidFill>
+                        <a:srgbClr val="E3E3E3"/>
+                      </a:solidFill>
+                      <a:prstDash val="solid"/>
+                      <a:round/>
+                      <a:headEnd type="none" w="med" len="med"/>
+                      <a:tailEnd type="none" w="med" len="med"/>
+                    </a:lnB>
+                    <a:solidFill>
+                      <a:srgbClr val="FFFFFF"/>
+                    </a:solidFill>
+                  </a:tcPr>
+                </a:tc>
+                <a:extLst>
+                  <a:ext uri="{0D108BD9-81ED-4DB2-BD59-A6C34878D82A}">
+                    <a16:rowId xmlns:a16="http://schemas.microsoft.com/office/drawing/2014/main" val="1736528481"/>
+                  </a:ext>
+                </a:extLst>
+              </a:tr>
+              <a:tr h="621620">
+                <a:tc>
+                  <a:txBody>
+                    <a:bodyPr/>
+                    <a:lstStyle/>
+                    <a:p>
+                      <a:pPr fontAlgn="base"/>
+                      <a:r>
+                        <a:rPr lang="en-GB" sz="2000" dirty="0">
+                          <a:solidFill>
+                            <a:schemeClr val="tx1"/>
+                          </a:solidFill>
+                          <a:effectLst/>
+                        </a:rPr>
+                        <a:t>Helps stakeholders understand the scope and vision</a:t>
+                      </a:r>
+                    </a:p>
+                  </a:txBody>
+                  <a:tcPr marL="88803" marR="88803" marT="44401" marB="44401" anchor="ctr">
+                    <a:lnL w="9525" cap="flat" cmpd="sng" algn="ctr">
+                      <a:solidFill>
+                        <a:srgbClr val="E3E3E3"/>
+                      </a:solidFill>
+                      <a:prstDash val="solid"/>
+                      <a:round/>
+                      <a:headEnd type="none" w="med" len="med"/>
+                      <a:tailEnd type="none" w="med" len="med"/>
+                    </a:lnL>
+                    <a:lnR w="9525" cap="flat" cmpd="sng" algn="ctr">
+                      <a:solidFill>
+                        <a:srgbClr val="E3E3E3"/>
+                      </a:solidFill>
+                      <a:prstDash val="solid"/>
+                      <a:round/>
+                      <a:headEnd type="none" w="med" len="med"/>
+                      <a:tailEnd type="none" w="med" len="med"/>
+                    </a:lnR>
+                    <a:lnT w="12700" cap="flat" cmpd="sng" algn="ctr">
+                      <a:solidFill>
+                        <a:srgbClr val="E3E3E3"/>
+                      </a:solidFill>
+                      <a:prstDash val="solid"/>
+                      <a:round/>
+                      <a:headEnd type="none" w="med" len="med"/>
+                      <a:tailEnd type="none" w="med" len="med"/>
+                    </a:lnT>
+                    <a:lnB w="12700" cap="flat" cmpd="sng" algn="ctr">
+                      <a:solidFill>
+                        <a:srgbClr val="E3E3E3"/>
+                      </a:solidFill>
+                      <a:prstDash val="solid"/>
+                      <a:round/>
+                      <a:headEnd type="none" w="med" len="med"/>
+                      <a:tailEnd type="none" w="med" len="med"/>
+                    </a:lnB>
+                    <a:solidFill>
+                      <a:srgbClr val="FFFFFF"/>
+                    </a:solidFill>
+                  </a:tcPr>
+                </a:tc>
+                <a:tc>
+                  <a:txBody>
+                    <a:bodyPr/>
+                    <a:lstStyle/>
+                    <a:p>
+                      <a:pPr fontAlgn="base"/>
+                      <a:r>
+                        <a:rPr lang="en-GB" sz="2000">
+                          <a:solidFill>
+                            <a:schemeClr val="tx1"/>
+                          </a:solidFill>
+                          <a:effectLst/>
+                        </a:rPr>
+                        <a:t>Guides developers in building the system components</a:t>
+                      </a:r>
+                    </a:p>
+                  </a:txBody>
+                  <a:tcPr marL="88803" marR="88803" marT="44401" marB="44401" anchor="ctr">
+                    <a:lnL w="9525" cap="flat" cmpd="sng" algn="ctr">
+                      <a:solidFill>
+                        <a:srgbClr val="E3E3E3"/>
+                      </a:solidFill>
+                      <a:prstDash val="solid"/>
+                      <a:round/>
+                      <a:headEnd type="none" w="med" len="med"/>
+                      <a:tailEnd type="none" w="med" len="med"/>
+                    </a:lnL>
+                    <a:lnR w="9525" cap="flat" cmpd="sng" algn="ctr">
+                      <a:solidFill>
+                        <a:srgbClr val="E3E3E3"/>
+                      </a:solidFill>
+                      <a:prstDash val="solid"/>
+                      <a:round/>
+                      <a:headEnd type="none" w="med" len="med"/>
+                      <a:tailEnd type="none" w="med" len="med"/>
+                    </a:lnR>
+                    <a:lnT w="12700" cap="flat" cmpd="sng" algn="ctr">
+                      <a:solidFill>
+                        <a:srgbClr val="E3E3E3"/>
+                      </a:solidFill>
+                      <a:prstDash val="solid"/>
+                      <a:round/>
+                      <a:headEnd type="none" w="med" len="med"/>
+                      <a:tailEnd type="none" w="med" len="med"/>
+                    </a:lnT>
+                    <a:lnB w="12700" cap="flat" cmpd="sng" algn="ctr">
+                      <a:solidFill>
+                        <a:srgbClr val="E3E3E3"/>
+                      </a:solidFill>
+                      <a:prstDash val="solid"/>
+                      <a:round/>
+                      <a:headEnd type="none" w="med" len="med"/>
+                      <a:tailEnd type="none" w="med" len="med"/>
+                    </a:lnB>
+                    <a:solidFill>
+                      <a:srgbClr val="FFFFFF"/>
+                    </a:solidFill>
+                  </a:tcPr>
+                </a:tc>
+                <a:extLst>
+                  <a:ext uri="{0D108BD9-81ED-4DB2-BD59-A6C34878D82A}">
+                    <a16:rowId xmlns:a16="http://schemas.microsoft.com/office/drawing/2014/main" val="700628358"/>
+                  </a:ext>
+                </a:extLst>
+              </a:tr>
+              <a:tr h="621620">
+                <a:tc>
+                  <a:txBody>
+                    <a:bodyPr/>
+                    <a:lstStyle/>
+                    <a:p>
+                      <a:pPr fontAlgn="base"/>
+                      <a:r>
+                        <a:rPr lang="en-GB" sz="2000">
+                          <a:solidFill>
+                            <a:schemeClr val="tx1"/>
+                          </a:solidFill>
+                          <a:effectLst/>
+                        </a:rPr>
+                        <a:t>May involve brainstorming sessions and user interviews</a:t>
+                      </a:r>
+                    </a:p>
+                  </a:txBody>
+                  <a:tcPr marL="88803" marR="88803" marT="44401" marB="44401" anchor="ctr">
+                    <a:lnL w="9525" cap="flat" cmpd="sng" algn="ctr">
+                      <a:solidFill>
+                        <a:srgbClr val="E3E3E3"/>
+                      </a:solidFill>
+                      <a:prstDash val="solid"/>
+                      <a:round/>
+                      <a:headEnd type="none" w="med" len="med"/>
+                      <a:tailEnd type="none" w="med" len="med"/>
+                    </a:lnL>
+                    <a:lnR w="9525" cap="flat" cmpd="sng" algn="ctr">
+                      <a:solidFill>
+                        <a:srgbClr val="E3E3E3"/>
+                      </a:solidFill>
+                      <a:prstDash val="solid"/>
+                      <a:round/>
+                      <a:headEnd type="none" w="med" len="med"/>
+                      <a:tailEnd type="none" w="med" len="med"/>
+                    </a:lnR>
+                    <a:lnT w="12700" cap="flat" cmpd="sng" algn="ctr">
+                      <a:solidFill>
+                        <a:srgbClr val="E3E3E3"/>
+                      </a:solidFill>
+                      <a:prstDash val="solid"/>
+                      <a:round/>
+                      <a:headEnd type="none" w="med" len="med"/>
+                      <a:tailEnd type="none" w="med" len="med"/>
+                    </a:lnT>
+                    <a:lnB w="9525" cap="flat" cmpd="sng" algn="ctr">
+                      <a:solidFill>
+                        <a:srgbClr val="E3E3E3"/>
+                      </a:solidFill>
+                      <a:prstDash val="solid"/>
+                      <a:round/>
+                      <a:headEnd type="none" w="med" len="med"/>
+                      <a:tailEnd type="none" w="med" len="med"/>
+                    </a:lnB>
+                    <a:solidFill>
+                      <a:srgbClr val="FFFFFF"/>
+                    </a:solidFill>
+                  </a:tcPr>
+                </a:tc>
+                <a:tc>
+                  <a:txBody>
+                    <a:bodyPr/>
+                    <a:lstStyle/>
+                    <a:p>
+                      <a:pPr fontAlgn="base"/>
+                      <a:r>
+                        <a:rPr lang="en-GB" sz="2000" dirty="0">
+                          <a:solidFill>
+                            <a:schemeClr val="tx1"/>
+                          </a:solidFill>
+                          <a:effectLst/>
+                        </a:rPr>
+                        <a:t>Involves architectural decisions and technical trade-offs</a:t>
+                      </a:r>
+                    </a:p>
+                  </a:txBody>
+                  <a:tcPr marL="88803" marR="88803" marT="44401" marB="44401" anchor="ctr">
+                    <a:lnL w="9525" cap="flat" cmpd="sng" algn="ctr">
+                      <a:solidFill>
+                        <a:srgbClr val="E3E3E3"/>
+                      </a:solidFill>
+                      <a:prstDash val="solid"/>
+                      <a:round/>
+                      <a:headEnd type="none" w="med" len="med"/>
+                      <a:tailEnd type="none" w="med" len="med"/>
+                    </a:lnL>
+                    <a:lnR w="9525" cap="flat" cmpd="sng" algn="ctr">
+                      <a:solidFill>
+                        <a:srgbClr val="E3E3E3"/>
+                      </a:solidFill>
+                      <a:prstDash val="solid"/>
+                      <a:round/>
+                      <a:headEnd type="none" w="med" len="med"/>
+                      <a:tailEnd type="none" w="med" len="med"/>
+                    </a:lnR>
+                    <a:lnT w="12700" cap="flat" cmpd="sng" algn="ctr">
+                      <a:solidFill>
+                        <a:srgbClr val="E3E3E3"/>
+                      </a:solidFill>
+                      <a:prstDash val="solid"/>
+                      <a:round/>
+                      <a:headEnd type="none" w="med" len="med"/>
+                      <a:tailEnd type="none" w="med" len="med"/>
+                    </a:lnT>
+                    <a:lnB w="9525" cap="flat" cmpd="sng" algn="ctr">
+                      <a:solidFill>
+                        <a:srgbClr val="E3E3E3"/>
+                      </a:solidFill>
+                      <a:prstDash val="solid"/>
+                      <a:round/>
+                      <a:headEnd type="none" w="med" len="med"/>
+                      <a:tailEnd type="none" w="med" len="med"/>
+                    </a:lnB>
+                    <a:solidFill>
+                      <a:srgbClr val="FFFFFF"/>
+                    </a:solidFill>
+                  </a:tcPr>
+                </a:tc>
+                <a:extLst>
+                  <a:ext uri="{0D108BD9-81ED-4DB2-BD59-A6C34878D82A}">
+                    <a16:rowId xmlns:a16="http://schemas.microsoft.com/office/drawing/2014/main" val="3023893508"/>
+                  </a:ext>
+                </a:extLst>
+              </a:tr>
+            </a:tbl>
+          </a:graphicData>
+        </a:graphic>
+      </p:graphicFrame>
+    </p:spTree>
+    <p:extLst>
+      <p:ext uri="{BB962C8B-B14F-4D97-AF65-F5344CB8AC3E}">
+        <p14:creationId xmlns:p14="http://schemas.microsoft.com/office/powerpoint/2010/main" val="3924461794"/>
+      </p:ext>
+    </p:extLst>
+  </p:cSld>
+  <p:clrMapOvr>
+    <a:masterClrMapping/>
+  </p:clrMapOvr>
 </p:sld>
 </file>
 

</xml_diff>